<commit_message>
created the new BudgetCalculationCommand and ViewBudgetCommand
</commit_message>
<xml_diff>
--- a/docs/diagrams/BudgetCommandSequenceDiagram.pptx
+++ b/docs/diagrams/BudgetCommandSequenceDiagram.pptx
@@ -303,7 +303,7 @@
             <a:fld id="{1D8BD707-D9CF-40AE-B4C6-C98DA3205C09}" type="datetimeFigureOut">
               <a:rPr lang="en-US" smtClean="0"/>
               <a:pPr/>
-              <a:t>10/15/2018</a:t>
+              <a:t>10/16/2018</a:t>
             </a:fld>
             <a:endParaRPr lang="en-US"/>
           </a:p>
@@ -468,7 +468,7 @@
             <a:fld id="{1D8BD707-D9CF-40AE-B4C6-C98DA3205C09}" type="datetimeFigureOut">
               <a:rPr lang="en-US" smtClean="0"/>
               <a:pPr/>
-              <a:t>10/15/2018</a:t>
+              <a:t>10/16/2018</a:t>
             </a:fld>
             <a:endParaRPr lang="en-US"/>
           </a:p>
@@ -643,7 +643,7 @@
             <a:fld id="{1D8BD707-D9CF-40AE-B4C6-C98DA3205C09}" type="datetimeFigureOut">
               <a:rPr lang="en-US" smtClean="0"/>
               <a:pPr/>
-              <a:t>10/15/2018</a:t>
+              <a:t>10/16/2018</a:t>
             </a:fld>
             <a:endParaRPr lang="en-US"/>
           </a:p>
@@ -808,7 +808,7 @@
             <a:fld id="{1D8BD707-D9CF-40AE-B4C6-C98DA3205C09}" type="datetimeFigureOut">
               <a:rPr lang="en-US" smtClean="0"/>
               <a:pPr/>
-              <a:t>10/15/2018</a:t>
+              <a:t>10/16/2018</a:t>
             </a:fld>
             <a:endParaRPr lang="en-US"/>
           </a:p>
@@ -1050,7 +1050,7 @@
             <a:fld id="{1D8BD707-D9CF-40AE-B4C6-C98DA3205C09}" type="datetimeFigureOut">
               <a:rPr lang="en-US" smtClean="0"/>
               <a:pPr/>
-              <a:t>10/15/2018</a:t>
+              <a:t>10/16/2018</a:t>
             </a:fld>
             <a:endParaRPr lang="en-US"/>
           </a:p>
@@ -1332,7 +1332,7 @@
             <a:fld id="{1D8BD707-D9CF-40AE-B4C6-C98DA3205C09}" type="datetimeFigureOut">
               <a:rPr lang="en-US" smtClean="0"/>
               <a:pPr/>
-              <a:t>10/15/2018</a:t>
+              <a:t>10/16/2018</a:t>
             </a:fld>
             <a:endParaRPr lang="en-US"/>
           </a:p>
@@ -1748,7 +1748,7 @@
             <a:fld id="{1D8BD707-D9CF-40AE-B4C6-C98DA3205C09}" type="datetimeFigureOut">
               <a:rPr lang="en-US" smtClean="0"/>
               <a:pPr/>
-              <a:t>10/15/2018</a:t>
+              <a:t>10/16/2018</a:t>
             </a:fld>
             <a:endParaRPr lang="en-US"/>
           </a:p>
@@ -1862,7 +1862,7 @@
             <a:fld id="{1D8BD707-D9CF-40AE-B4C6-C98DA3205C09}" type="datetimeFigureOut">
               <a:rPr lang="en-US" smtClean="0"/>
               <a:pPr/>
-              <a:t>10/15/2018</a:t>
+              <a:t>10/16/2018</a:t>
             </a:fld>
             <a:endParaRPr lang="en-US"/>
           </a:p>
@@ -1954,7 +1954,7 @@
             <a:fld id="{1D8BD707-D9CF-40AE-B4C6-C98DA3205C09}" type="datetimeFigureOut">
               <a:rPr lang="en-US" smtClean="0"/>
               <a:pPr/>
-              <a:t>10/15/2018</a:t>
+              <a:t>10/16/2018</a:t>
             </a:fld>
             <a:endParaRPr lang="en-US"/>
           </a:p>
@@ -2226,7 +2226,7 @@
             <a:fld id="{1D8BD707-D9CF-40AE-B4C6-C98DA3205C09}" type="datetimeFigureOut">
               <a:rPr lang="en-US" smtClean="0"/>
               <a:pPr/>
-              <a:t>10/15/2018</a:t>
+              <a:t>10/16/2018</a:t>
             </a:fld>
             <a:endParaRPr lang="en-US"/>
           </a:p>
@@ -2475,7 +2475,7 @@
             <a:fld id="{1D8BD707-D9CF-40AE-B4C6-C98DA3205C09}" type="datetimeFigureOut">
               <a:rPr lang="en-US" smtClean="0"/>
               <a:pPr/>
-              <a:t>10/15/2018</a:t>
+              <a:t>10/16/2018</a:t>
             </a:fld>
             <a:endParaRPr lang="en-US"/>
           </a:p>
@@ -2683,7 +2683,7 @@
             <a:fld id="{1D8BD707-D9CF-40AE-B4C6-C98DA3205C09}" type="datetimeFigureOut">
               <a:rPr lang="en-US" smtClean="0"/>
               <a:pPr/>
-              <a:t>10/15/2018</a:t>
+              <a:t>10/16/2018</a:t>
             </a:fld>
             <a:endParaRPr lang="en-US"/>
           </a:p>

</xml_diff>

<commit_message>
updated Dev Guide with diagrams
</commit_message>
<xml_diff>
--- a/docs/diagrams/BudgetCommandSequenceDiagram.pptx
+++ b/docs/diagrams/BudgetCommandSequenceDiagram.pptx
@@ -208,7 +208,7 @@
           <a:p>
             <a:fld id="{C8E77166-2E47-4FB3-9736-67392969F435}" type="datetimeFigureOut">
               <a:rPr lang="en-SG" smtClean="0"/>
-              <a:t>18/10/2018</a:t>
+              <a:t>11/11/2018</a:t>
             </a:fld>
             <a:endParaRPr lang="en-SG"/>
           </a:p>
@@ -520,7 +520,7 @@
           <a:bodyPr/>
           <a:lstStyle/>
           <a:p>
-            <a:endParaRPr lang="en-SG"/>
+            <a:endParaRPr lang="en-SG" dirty="0"/>
           </a:p>
         </p:txBody>
       </p:sp>
@@ -740,7 +740,7 @@
             <a:fld id="{1D8BD707-D9CF-40AE-B4C6-C98DA3205C09}" type="datetimeFigureOut">
               <a:rPr lang="en-US" smtClean="0"/>
               <a:pPr/>
-              <a:t>10/18/2018</a:t>
+              <a:t>11/11/2018</a:t>
             </a:fld>
             <a:endParaRPr lang="en-US"/>
           </a:p>
@@ -905,7 +905,7 @@
             <a:fld id="{1D8BD707-D9CF-40AE-B4C6-C98DA3205C09}" type="datetimeFigureOut">
               <a:rPr lang="en-US" smtClean="0"/>
               <a:pPr/>
-              <a:t>10/18/2018</a:t>
+              <a:t>11/11/2018</a:t>
             </a:fld>
             <a:endParaRPr lang="en-US"/>
           </a:p>
@@ -1080,7 +1080,7 @@
             <a:fld id="{1D8BD707-D9CF-40AE-B4C6-C98DA3205C09}" type="datetimeFigureOut">
               <a:rPr lang="en-US" smtClean="0"/>
               <a:pPr/>
-              <a:t>10/18/2018</a:t>
+              <a:t>11/11/2018</a:t>
             </a:fld>
             <a:endParaRPr lang="en-US"/>
           </a:p>
@@ -1245,7 +1245,7 @@
             <a:fld id="{1D8BD707-D9CF-40AE-B4C6-C98DA3205C09}" type="datetimeFigureOut">
               <a:rPr lang="en-US" smtClean="0"/>
               <a:pPr/>
-              <a:t>10/18/2018</a:t>
+              <a:t>11/11/2018</a:t>
             </a:fld>
             <a:endParaRPr lang="en-US"/>
           </a:p>
@@ -1487,7 +1487,7 @@
             <a:fld id="{1D8BD707-D9CF-40AE-B4C6-C98DA3205C09}" type="datetimeFigureOut">
               <a:rPr lang="en-US" smtClean="0"/>
               <a:pPr/>
-              <a:t>10/18/2018</a:t>
+              <a:t>11/11/2018</a:t>
             </a:fld>
             <a:endParaRPr lang="en-US"/>
           </a:p>
@@ -1769,7 +1769,7 @@
             <a:fld id="{1D8BD707-D9CF-40AE-B4C6-C98DA3205C09}" type="datetimeFigureOut">
               <a:rPr lang="en-US" smtClean="0"/>
               <a:pPr/>
-              <a:t>10/18/2018</a:t>
+              <a:t>11/11/2018</a:t>
             </a:fld>
             <a:endParaRPr lang="en-US"/>
           </a:p>
@@ -2185,7 +2185,7 @@
             <a:fld id="{1D8BD707-D9CF-40AE-B4C6-C98DA3205C09}" type="datetimeFigureOut">
               <a:rPr lang="en-US" smtClean="0"/>
               <a:pPr/>
-              <a:t>10/18/2018</a:t>
+              <a:t>11/11/2018</a:t>
             </a:fld>
             <a:endParaRPr lang="en-US"/>
           </a:p>
@@ -2299,7 +2299,7 @@
             <a:fld id="{1D8BD707-D9CF-40AE-B4C6-C98DA3205C09}" type="datetimeFigureOut">
               <a:rPr lang="en-US" smtClean="0"/>
               <a:pPr/>
-              <a:t>10/18/2018</a:t>
+              <a:t>11/11/2018</a:t>
             </a:fld>
             <a:endParaRPr lang="en-US"/>
           </a:p>
@@ -2391,7 +2391,7 @@
             <a:fld id="{1D8BD707-D9CF-40AE-B4C6-C98DA3205C09}" type="datetimeFigureOut">
               <a:rPr lang="en-US" smtClean="0"/>
               <a:pPr/>
-              <a:t>10/18/2018</a:t>
+              <a:t>11/11/2018</a:t>
             </a:fld>
             <a:endParaRPr lang="en-US"/>
           </a:p>
@@ -2663,7 +2663,7 @@
             <a:fld id="{1D8BD707-D9CF-40AE-B4C6-C98DA3205C09}" type="datetimeFigureOut">
               <a:rPr lang="en-US" smtClean="0"/>
               <a:pPr/>
-              <a:t>10/18/2018</a:t>
+              <a:t>11/11/2018</a:t>
             </a:fld>
             <a:endParaRPr lang="en-US"/>
           </a:p>
@@ -2912,7 +2912,7 @@
             <a:fld id="{1D8BD707-D9CF-40AE-B4C6-C98DA3205C09}" type="datetimeFigureOut">
               <a:rPr lang="en-US" smtClean="0"/>
               <a:pPr/>
-              <a:t>10/18/2018</a:t>
+              <a:t>11/11/2018</a:t>
             </a:fld>
             <a:endParaRPr lang="en-US"/>
           </a:p>
@@ -3120,7 +3120,7 @@
             <a:fld id="{1D8BD707-D9CF-40AE-B4C6-C98DA3205C09}" type="datetimeFigureOut">
               <a:rPr lang="en-US" smtClean="0"/>
               <a:pPr/>
-              <a:t>10/18/2018</a:t>
+              <a:t>11/11/2018</a:t>
             </a:fld>
             <a:endParaRPr lang="en-US"/>
           </a:p>
@@ -3491,45 +3491,12 @@
           <a:chExt cx="0" cy="0"/>
         </a:xfrm>
       </p:grpSpPr>
-      <p:cxnSp>
-        <p:nvCxnSpPr>
-          <p:cNvPr id="42" name="Straight Arrow Connector 41">
+      <p:grpSp>
+        <p:nvGrpSpPr>
+          <p:cNvPr id="138" name="Group 137">
             <a:extLst>
               <a:ext uri="{FF2B5EF4-FFF2-40B4-BE49-F238E27FC236}">
-                <a16:creationId xmlns:a16="http://schemas.microsoft.com/office/drawing/2014/main" id="{84777633-E515-4831-94F9-6ED03857EEED}"/>
-              </a:ext>
-            </a:extLst>
-          </p:cNvPr>
-          <p:cNvCxnSpPr>
-            <a:cxnSpLocks/>
-          </p:cNvCxnSpPr>
-          <p:nvPr/>
-        </p:nvCxnSpPr>
-        <p:spPr>
-          <a:xfrm>
-            <a:off x="-274204" y="1320602"/>
-            <a:ext cx="1492155" cy="1892"/>
-          </a:xfrm>
-          <a:prstGeom prst="straightConnector1">
-            <a:avLst/>
-          </a:prstGeom>
-          <a:noFill/>
-          <a:ln w="19050" cap="flat" cmpd="sng" algn="ctr">
-            <a:solidFill>
-              <a:srgbClr val="0070C0"/>
-            </a:solidFill>
-            <a:prstDash val="solid"/>
-            <a:tailEnd type="arrow"/>
-          </a:ln>
-          <a:effectLst/>
-        </p:spPr>
-      </p:cxnSp>
-      <p:grpSp>
-        <p:nvGrpSpPr>
-          <p:cNvPr id="2" name="Group 1">
-            <a:extLst>
-              <a:ext uri="{FF2B5EF4-FFF2-40B4-BE49-F238E27FC236}">
-                <a16:creationId xmlns:a16="http://schemas.microsoft.com/office/drawing/2014/main" id="{A3C5E994-12C6-4B7B-9E93-5F62BD771E5E}"/>
+                <a16:creationId xmlns:a16="http://schemas.microsoft.com/office/drawing/2014/main" id="{0BFFCE60-C830-4ED0-89C7-E4F1DFE30001}"/>
               </a:ext>
             </a:extLst>
           </p:cNvPr>
@@ -3538,18 +3505,18 @@
         </p:nvGrpSpPr>
         <p:grpSpPr>
           <a:xfrm>
-            <a:off x="-1663643" y="30895"/>
-            <a:ext cx="13246044" cy="4769705"/>
-            <a:chOff x="-1663644" y="30895"/>
-            <a:chExt cx="13627655" cy="4516207"/>
+            <a:off x="-1981198" y="133368"/>
+            <a:ext cx="12882916" cy="4400926"/>
+            <a:chOff x="-1981198" y="133368"/>
+            <a:chExt cx="12882916" cy="4400926"/>
           </a:xfrm>
         </p:grpSpPr>
         <p:sp>
           <p:nvSpPr>
-            <p:cNvPr id="4" name="Rectangle 65">
+            <p:cNvPr id="51" name="Rectangle 65">
               <a:extLst>
                 <a:ext uri="{FF2B5EF4-FFF2-40B4-BE49-F238E27FC236}">
-                  <a16:creationId xmlns:a16="http://schemas.microsoft.com/office/drawing/2014/main" id="{F5996B4B-99C7-4EB1-874C-CD80A7EBEFAB}"/>
+                  <a16:creationId xmlns:a16="http://schemas.microsoft.com/office/drawing/2014/main" id="{9D06950A-55B9-4BF4-A889-22A9EB3495CB}"/>
                 </a:ext>
               </a:extLst>
             </p:cNvPr>
@@ -3558,8 +3525,8 @@
           </p:nvSpPr>
           <p:spPr>
             <a:xfrm>
-              <a:off x="5369588" y="30895"/>
-              <a:ext cx="6594423" cy="4435670"/>
+              <a:off x="6456305" y="133368"/>
+              <a:ext cx="3903825" cy="4400926"/>
             </a:xfrm>
             <a:prstGeom prst="roundRect">
               <a:avLst>
@@ -3635,10 +3602,10 @@
         </p:sp>
         <p:sp>
           <p:nvSpPr>
-            <p:cNvPr id="5" name="Rectangle 65">
+            <p:cNvPr id="58" name="Rectangle 65">
               <a:extLst>
                 <a:ext uri="{FF2B5EF4-FFF2-40B4-BE49-F238E27FC236}">
-                  <a16:creationId xmlns:a16="http://schemas.microsoft.com/office/drawing/2014/main" id="{D6968AA9-17D4-46C4-BABA-6FF7329F68F1}"/>
+                  <a16:creationId xmlns:a16="http://schemas.microsoft.com/office/drawing/2014/main" id="{B47F9978-9834-4481-8B62-C3FA6E0FCAD4}"/>
                 </a:ext>
               </a:extLst>
             </p:cNvPr>
@@ -3647,8 +3614,8 @@
           </p:nvSpPr>
           <p:spPr>
             <a:xfrm>
-              <a:off x="-1600200" y="111432"/>
-              <a:ext cx="6932870" cy="4435670"/>
+              <a:off x="302012" y="147658"/>
+              <a:ext cx="5863964" cy="4343400"/>
             </a:xfrm>
             <a:prstGeom prst="roundRect">
               <a:avLst>
@@ -3722,54 +3689,12 @@
             </a:p>
           </p:txBody>
         </p:sp>
-        <p:cxnSp>
-          <p:nvCxnSpPr>
-            <p:cNvPr id="6" name="Straight Arrow Connector 5">
+        <p:sp>
+          <p:nvSpPr>
+            <p:cNvPr id="60" name="Rectangle 62">
               <a:extLst>
                 <a:ext uri="{FF2B5EF4-FFF2-40B4-BE49-F238E27FC236}">
-                  <a16:creationId xmlns:a16="http://schemas.microsoft.com/office/drawing/2014/main" id="{E4BB2333-CB17-4620-BC59-013876BA2728}"/>
-                </a:ext>
-              </a:extLst>
-            </p:cNvPr>
-            <p:cNvCxnSpPr/>
-            <p:nvPr/>
-          </p:nvCxnSpPr>
-          <p:spPr>
-            <a:xfrm>
-              <a:off x="-1447800" y="1218683"/>
-              <a:ext cx="1119851" cy="0"/>
-            </a:xfrm>
-            <a:prstGeom prst="straightConnector1">
-              <a:avLst/>
-            </a:prstGeom>
-            <a:ln w="19050">
-              <a:solidFill>
-                <a:srgbClr val="00B050"/>
-              </a:solidFill>
-              <a:tailEnd type="arrow"/>
-            </a:ln>
-          </p:spPr>
-          <p:style>
-            <a:lnRef idx="1">
-              <a:schemeClr val="accent1"/>
-            </a:lnRef>
-            <a:fillRef idx="0">
-              <a:schemeClr val="accent1"/>
-            </a:fillRef>
-            <a:effectRef idx="0">
-              <a:schemeClr val="accent1"/>
-            </a:effectRef>
-            <a:fontRef idx="minor">
-              <a:schemeClr val="tx1"/>
-            </a:fontRef>
-          </p:style>
-        </p:cxnSp>
-        <p:sp>
-          <p:nvSpPr>
-            <p:cNvPr id="34" name="Rectangle 62">
-              <a:extLst>
-                <a:ext uri="{FF2B5EF4-FFF2-40B4-BE49-F238E27FC236}">
-                  <a16:creationId xmlns:a16="http://schemas.microsoft.com/office/drawing/2014/main" id="{C9DBF92F-BF20-4443-948C-948D7DB7C963}"/>
+                  <a16:creationId xmlns:a16="http://schemas.microsoft.com/office/drawing/2014/main" id="{2D6F6B8E-2D2E-4424-A197-8ACB706A438A}"/>
                 </a:ext>
               </a:extLst>
             </p:cNvPr>
@@ -3778,7 +3703,7 @@
           </p:nvSpPr>
           <p:spPr>
             <a:xfrm>
-              <a:off x="-983755" y="500630"/>
+              <a:off x="883145" y="543946"/>
               <a:ext cx="1455629" cy="346760"/>
             </a:xfrm>
             <a:prstGeom prst="rect">
@@ -3869,10 +3794,10 @@
         </p:sp>
         <p:cxnSp>
           <p:nvCxnSpPr>
-            <p:cNvPr id="35" name="Straight Connector 34">
+            <p:cNvPr id="61" name="Straight Connector 60">
               <a:extLst>
                 <a:ext uri="{FF2B5EF4-FFF2-40B4-BE49-F238E27FC236}">
-                  <a16:creationId xmlns:a16="http://schemas.microsoft.com/office/drawing/2014/main" id="{0AA767DE-40F5-470E-BFE3-29A275AEDF94}"/>
+                  <a16:creationId xmlns:a16="http://schemas.microsoft.com/office/drawing/2014/main" id="{344825DC-7AF6-49F7-8406-A51587F0CD43}"/>
                 </a:ext>
               </a:extLst>
             </p:cNvPr>
@@ -3883,7 +3808,7 @@
           </p:nvCxnSpPr>
           <p:spPr>
             <a:xfrm>
-              <a:off x="-255941" y="864301"/>
+              <a:off x="1610959" y="907617"/>
               <a:ext cx="0" cy="3481399"/>
             </a:xfrm>
             <a:prstGeom prst="line">
@@ -3923,44 +3848,40 @@
         </p:cxnSp>
         <p:sp>
           <p:nvSpPr>
-            <p:cNvPr id="40" name="TextBox 39">
+            <p:cNvPr id="62" name="Rectangle 61">
               <a:extLst>
                 <a:ext uri="{FF2B5EF4-FFF2-40B4-BE49-F238E27FC236}">
-                  <a16:creationId xmlns:a16="http://schemas.microsoft.com/office/drawing/2014/main" id="{9024F439-343B-4420-B8AA-A5FDF8900E41}"/>
+                  <a16:creationId xmlns:a16="http://schemas.microsoft.com/office/drawing/2014/main" id="{B74290F8-7C3F-45B1-87B5-7B926260DD2E}"/>
                 </a:ext>
               </a:extLst>
             </p:cNvPr>
-            <p:cNvSpPr txBox="1"/>
+            <p:cNvSpPr/>
             <p:nvPr/>
           </p:nvSpPr>
           <p:spPr>
             <a:xfrm>
-              <a:off x="-823976" y="1088247"/>
-              <a:ext cx="1899551" cy="215444"/>
+              <a:off x="1538951" y="1258311"/>
+              <a:ext cx="152400" cy="2932689"/>
             </a:xfrm>
             <a:prstGeom prst="rect">
               <a:avLst/>
             </a:prstGeom>
-            <a:noFill/>
+            <a:solidFill>
+              <a:srgbClr val="0070C0"/>
+            </a:solidFill>
+            <a:ln w="9525" cap="flat" cmpd="sng" algn="ctr">
+              <a:solidFill>
+                <a:srgbClr val="0070C0"/>
+              </a:solidFill>
+              <a:prstDash val="solid"/>
+            </a:ln>
+            <a:effectLst/>
           </p:spPr>
           <p:txBody>
-            <a:bodyPr wrap="square" lIns="0" tIns="0" rIns="0" bIns="0" rtlCol="0">
-              <a:spAutoFit/>
-            </a:bodyPr>
-            <a:lstStyle>
-              <a:defPPr>
-                <a:defRPr lang="en-US"/>
-              </a:defPPr>
-              <a:lvl1pPr algn="r">
-                <a:defRPr sz="1400">
-                  <a:solidFill>
-                    <a:srgbClr val="0070C0"/>
-                  </a:solidFill>
-                </a:defRPr>
-              </a:lvl1pPr>
-            </a:lstStyle>
+            <a:bodyPr rtlCol="0" anchor="ctr"/>
+            <a:lstStyle/>
             <a:p>
-              <a:pPr marL="0" marR="0" lvl="0" indent="0" algn="r" defTabSz="914400" eaLnBrk="1" fontAlgn="auto" latinLnBrk="0" hangingPunct="1">
+              <a:pPr marL="0" marR="0" lvl="0" indent="0" algn="ctr" defTabSz="914400" eaLnBrk="1" fontAlgn="auto" latinLnBrk="0" hangingPunct="1">
                 <a:lnSpc>
                   <a:spcPct val="100000"/>
                 </a:lnSpc>
@@ -3977,43 +3898,29 @@
                 <a:tabLst/>
                 <a:defRPr/>
               </a:pPr>
-              <a:r>
-                <a:rPr kumimoji="0" lang="en-US" sz="1400" b="0" i="0" u="none" strike="noStrike" kern="0" cap="none" spc="0" normalizeH="0" baseline="0" noProof="0" dirty="0" err="1">
-                  <a:ln>
-                    <a:noFill/>
-                  </a:ln>
-                  <a:solidFill>
-                    <a:srgbClr val="0070C0"/>
-                  </a:solidFill>
-                  <a:effectLst/>
-                  <a:uLnTx/>
-                  <a:uFillTx/>
-                </a:rPr>
-                <a:t>parseCommand</a:t>
-              </a:r>
-              <a:r>
-                <a:rPr kumimoji="0" lang="en-US" sz="1400" b="0" i="0" u="none" strike="noStrike" kern="0" cap="none" spc="0" normalizeH="0" baseline="0" noProof="0" dirty="0">
-                  <a:ln>
-                    <a:noFill/>
-                  </a:ln>
-                  <a:solidFill>
-                    <a:srgbClr val="0070C0"/>
-                  </a:solidFill>
-                  <a:effectLst/>
-                  <a:uLnTx/>
-                  <a:uFillTx/>
-                </a:rPr>
-                <a:t>()</a:t>
-              </a:r>
+              <a:endParaRPr kumimoji="0" lang="en-SG" sz="1400" b="0" i="0" u="none" strike="noStrike" kern="0" cap="none" spc="0" normalizeH="0" baseline="0" noProof="0">
+                <a:ln>
+                  <a:noFill/>
+                </a:ln>
+                <a:solidFill>
+                  <a:prstClr val="black"/>
+                </a:solidFill>
+                <a:effectLst/>
+                <a:uLnTx/>
+                <a:uFillTx/>
+                <a:latin typeface="Calibri"/>
+                <a:ea typeface="+mn-ea"/>
+                <a:cs typeface="+mn-cs"/>
+              </a:endParaRPr>
             </a:p>
           </p:txBody>
         </p:sp>
         <p:sp>
           <p:nvSpPr>
-            <p:cNvPr id="36" name="Rectangle 62">
+            <p:cNvPr id="65" name="Rectangle 62">
               <a:extLst>
                 <a:ext uri="{FF2B5EF4-FFF2-40B4-BE49-F238E27FC236}">
-                  <a16:creationId xmlns:a16="http://schemas.microsoft.com/office/drawing/2014/main" id="{BDEC02E6-BEC5-4F2F-B301-BD64BA56F4B2}"/>
+                  <a16:creationId xmlns:a16="http://schemas.microsoft.com/office/drawing/2014/main" id="{1288649A-4AC4-40B7-B716-9D1CC522059E}"/>
                 </a:ext>
               </a:extLst>
             </p:cNvPr>
@@ -4022,8 +3929,8 @@
           </p:nvSpPr>
           <p:spPr>
             <a:xfrm>
-              <a:off x="711713" y="293016"/>
-              <a:ext cx="1219200" cy="467684"/>
+              <a:off x="2452126" y="228600"/>
+              <a:ext cx="976874" cy="668188"/>
             </a:xfrm>
             <a:prstGeom prst="rect">
               <a:avLst/>
@@ -4097,7 +4004,7 @@
                 <a:defRPr/>
               </a:pPr>
               <a:r>
-                <a:rPr kumimoji="0" lang="en-US" sz="1600" b="0" i="0" u="none" strike="noStrike" kern="0" cap="none" spc="0" normalizeH="0" baseline="0" noProof="0" dirty="0" err="1">
+                <a:rPr kumimoji="0" lang="en-US" sz="1600" b="0" i="0" u="none" strike="noStrike" kern="0" cap="none" spc="0" normalizeH="0" baseline="0" noProof="0" dirty="0">
                   <a:ln>
                     <a:noFill/>
                   </a:ln>
@@ -4111,7 +4018,43 @@
                   <a:ea typeface="+mn-ea"/>
                   <a:cs typeface="+mn-cs"/>
                 </a:rPr>
-                <a:t>BookParser</a:t>
+                <a:t>Book</a:t>
+              </a:r>
+            </a:p>
+            <a:p>
+              <a:pPr marL="0" marR="0" lvl="0" indent="0" algn="ctr" defTabSz="914400" eaLnBrk="1" fontAlgn="auto" latinLnBrk="0" hangingPunct="1">
+                <a:lnSpc>
+                  <a:spcPct val="100000"/>
+                </a:lnSpc>
+                <a:spcBef>
+                  <a:spcPts val="0"/>
+                </a:spcBef>
+                <a:spcAft>
+                  <a:spcPts val="0"/>
+                </a:spcAft>
+                <a:buClrTx/>
+                <a:buSzTx/>
+                <a:buFontTx/>
+                <a:buNone/>
+                <a:tabLst/>
+                <a:defRPr/>
+              </a:pPr>
+              <a:r>
+                <a:rPr kumimoji="0" lang="en-US" sz="1600" b="0" i="0" u="none" strike="noStrike" kern="0" cap="none" spc="0" normalizeH="0" baseline="0" noProof="0" dirty="0">
+                  <a:ln>
+                    <a:noFill/>
+                  </a:ln>
+                  <a:solidFill>
+                    <a:prstClr val="white"/>
+                  </a:solidFill>
+                  <a:effectLst/>
+                  <a:uLnTx/>
+                  <a:uFillTx/>
+                  <a:latin typeface="Calibri"/>
+                  <a:ea typeface="+mn-ea"/>
+                  <a:cs typeface="+mn-cs"/>
+                </a:rPr>
+                <a:t>Parser</a:t>
               </a:r>
               <a:endParaRPr kumimoji="0" lang="en-SG" sz="1600" b="0" i="0" u="none" strike="noStrike" kern="0" cap="none" spc="0" normalizeH="0" baseline="0" noProof="0" dirty="0">
                 <a:ln>
@@ -4132,10 +4075,10 @@
         </p:sp>
         <p:cxnSp>
           <p:nvCxnSpPr>
-            <p:cNvPr id="37" name="Straight Connector 36">
+            <p:cNvPr id="67" name="Straight Connector 66">
               <a:extLst>
                 <a:ext uri="{FF2B5EF4-FFF2-40B4-BE49-F238E27FC236}">
-                  <a16:creationId xmlns:a16="http://schemas.microsoft.com/office/drawing/2014/main" id="{D8AF580E-B831-43B0-A56A-F2D4DFE0E8DE}"/>
+                  <a16:creationId xmlns:a16="http://schemas.microsoft.com/office/drawing/2014/main" id="{92349DBE-E2B6-4B21-BC04-1320FC7BAE0D}"/>
                 </a:ext>
               </a:extLst>
             </p:cNvPr>
@@ -4145,9 +4088,9 @@
             <p:nvPr/>
           </p:nvCxnSpPr>
           <p:spPr>
-            <a:xfrm>
-              <a:off x="1332154" y="777611"/>
-              <a:ext cx="0" cy="1482984"/>
+            <a:xfrm flipH="1">
+              <a:off x="3048000" y="907617"/>
+              <a:ext cx="5327" cy="1683183"/>
             </a:xfrm>
             <a:prstGeom prst="line">
               <a:avLst/>
@@ -4186,10 +4129,10 @@
         </p:cxnSp>
         <p:sp>
           <p:nvSpPr>
-            <p:cNvPr id="38" name="Rectangle 37">
+            <p:cNvPr id="68" name="Rectangle 67">
               <a:extLst>
                 <a:ext uri="{FF2B5EF4-FFF2-40B4-BE49-F238E27FC236}">
-                  <a16:creationId xmlns:a16="http://schemas.microsoft.com/office/drawing/2014/main" id="{309F8B48-1691-4137-9B8D-957989879ECF}"/>
+                  <a16:creationId xmlns:a16="http://schemas.microsoft.com/office/drawing/2014/main" id="{93787602-ADEB-41E9-BD83-E8B0B05B654A}"/>
                 </a:ext>
               </a:extLst>
             </p:cNvPr>
@@ -4198,8 +4141,8 @@
           </p:nvSpPr>
           <p:spPr>
             <a:xfrm>
-              <a:off x="1253105" y="1235804"/>
-              <a:ext cx="154408" cy="767790"/>
+              <a:off x="2993191" y="1365809"/>
+              <a:ext cx="137339" cy="1072591"/>
             </a:xfrm>
             <a:prstGeom prst="rect">
               <a:avLst/>
@@ -4255,44 +4198,65 @@
         </p:sp>
         <p:cxnSp>
           <p:nvCxnSpPr>
-            <p:cNvPr id="39" name="Straight Arrow Connector 38">
+            <p:cNvPr id="71" name="Straight Connector 70">
               <a:extLst>
                 <a:ext uri="{FF2B5EF4-FFF2-40B4-BE49-F238E27FC236}">
-                  <a16:creationId xmlns:a16="http://schemas.microsoft.com/office/drawing/2014/main" id="{34F21A44-514B-4CA5-BC36-77E8B6F9DCBA}"/>
+                  <a16:creationId xmlns:a16="http://schemas.microsoft.com/office/drawing/2014/main" id="{8205EF9B-4F44-4F5C-88F8-45DC9718CF59}"/>
                 </a:ext>
               </a:extLst>
             </p:cNvPr>
             <p:cNvCxnSpPr>
               <a:cxnSpLocks/>
-              <a:endCxn id="41" idx="1"/>
+              <a:stCxn id="89" idx="2"/>
             </p:cNvCxnSpPr>
             <p:nvPr/>
           </p:nvCxnSpPr>
           <p:spPr>
             <a:xfrm>
-              <a:off x="1395988" y="1500755"/>
-              <a:ext cx="824631" cy="0"/>
+              <a:off x="5603906" y="1255855"/>
+              <a:ext cx="3764" cy="2807836"/>
             </a:xfrm>
-            <a:prstGeom prst="straightConnector1">
+            <a:prstGeom prst="line">
               <a:avLst/>
             </a:prstGeom>
-            <a:noFill/>
+            <a:gradFill rotWithShape="1">
+              <a:gsLst>
+                <a:gs pos="0">
+                  <a:srgbClr val="4F81BD">
+                    <a:tint val="50000"/>
+                    <a:satMod val="300000"/>
+                  </a:srgbClr>
+                </a:gs>
+                <a:gs pos="35000">
+                  <a:srgbClr val="4F81BD">
+                    <a:tint val="37000"/>
+                    <a:satMod val="300000"/>
+                  </a:srgbClr>
+                </a:gs>
+                <a:gs pos="100000">
+                  <a:srgbClr val="4F81BD">
+                    <a:tint val="15000"/>
+                    <a:satMod val="350000"/>
+                  </a:srgbClr>
+                </a:gs>
+              </a:gsLst>
+              <a:lin ang="16200000" scaled="1"/>
+            </a:gradFill>
             <a:ln w="19050" cap="flat" cmpd="sng" algn="ctr">
               <a:solidFill>
                 <a:srgbClr val="0070C0"/>
               </a:solidFill>
-              <a:prstDash val="solid"/>
-              <a:tailEnd type="arrow"/>
+              <a:prstDash val="sysDash"/>
             </a:ln>
             <a:effectLst/>
           </p:spPr>
         </p:cxnSp>
         <p:sp>
           <p:nvSpPr>
-            <p:cNvPr id="41" name="Rectangle 62">
+            <p:cNvPr id="72" name="Rectangle 71">
               <a:extLst>
                 <a:ext uri="{FF2B5EF4-FFF2-40B4-BE49-F238E27FC236}">
-                  <a16:creationId xmlns:a16="http://schemas.microsoft.com/office/drawing/2014/main" id="{484AB518-F322-430A-9312-1EA1A8C08767}"/>
+                  <a16:creationId xmlns:a16="http://schemas.microsoft.com/office/drawing/2014/main" id="{24880F95-F7A5-4A76-8B2B-59771887172C}"/>
                 </a:ext>
               </a:extLst>
             </p:cNvPr>
@@ -4301,8 +4265,8 @@
           </p:nvSpPr>
           <p:spPr>
             <a:xfrm>
-              <a:off x="2220619" y="1195969"/>
-              <a:ext cx="1295302" cy="609572"/>
+              <a:off x="5527861" y="1665448"/>
+              <a:ext cx="154435" cy="496694"/>
             </a:xfrm>
             <a:prstGeom prst="rect">
               <a:avLst/>
@@ -4310,7 +4274,7 @@
             <a:solidFill>
               <a:srgbClr val="0070C0"/>
             </a:solidFill>
-            <a:ln w="19050" cap="flat" cmpd="sng" algn="ctr">
+            <a:ln w="9525" cap="flat" cmpd="sng" algn="ctr">
               <a:solidFill>
                 <a:srgbClr val="0070C0"/>
               </a:solidFill>
@@ -4339,101 +4303,12 @@
                 <a:tabLst/>
                 <a:defRPr/>
               </a:pPr>
-              <a:r>
-                <a:rPr kumimoji="0" lang="en-US" sz="1600" b="0" i="0" u="none" strike="noStrike" kern="0" cap="none" spc="0" normalizeH="0" baseline="0" noProof="0" dirty="0">
-                  <a:ln>
-                    <a:noFill/>
-                  </a:ln>
-                  <a:solidFill>
-                    <a:prstClr val="white"/>
-                  </a:solidFill>
-                  <a:effectLst/>
-                  <a:uLnTx/>
-                  <a:uFillTx/>
-                  <a:latin typeface="Calibri"/>
-                  <a:ea typeface="+mn-ea"/>
-                  <a:cs typeface="+mn-cs"/>
-                </a:rPr>
-                <a:t>:Budget</a:t>
-              </a:r>
-            </a:p>
-            <a:p>
-              <a:pPr marL="0" marR="0" lvl="0" indent="0" algn="ctr" defTabSz="914400" eaLnBrk="1" fontAlgn="auto" latinLnBrk="0" hangingPunct="1">
-                <a:lnSpc>
-                  <a:spcPct val="100000"/>
-                </a:lnSpc>
-                <a:spcBef>
-                  <a:spcPts val="0"/>
-                </a:spcBef>
-                <a:spcAft>
-                  <a:spcPts val="0"/>
-                </a:spcAft>
-                <a:buClrTx/>
-                <a:buSzTx/>
-                <a:buFontTx/>
-                <a:buNone/>
-                <a:tabLst/>
-                <a:defRPr/>
-              </a:pPr>
-              <a:r>
-                <a:rPr kumimoji="0" lang="en-US" sz="1600" b="0" i="0" u="none" strike="noStrike" kern="0" cap="none" spc="0" normalizeH="0" baseline="0" noProof="0" dirty="0">
-                  <a:ln>
-                    <a:noFill/>
-                  </a:ln>
-                  <a:solidFill>
-                    <a:prstClr val="white"/>
-                  </a:solidFill>
-                  <a:effectLst/>
-                  <a:uLnTx/>
-                  <a:uFillTx/>
-                  <a:latin typeface="Calibri"/>
-                  <a:ea typeface="+mn-ea"/>
-                  <a:cs typeface="+mn-cs"/>
-                </a:rPr>
-                <a:t>Command</a:t>
-              </a:r>
-            </a:p>
-            <a:p>
-              <a:pPr marL="0" marR="0" lvl="0" indent="0" algn="ctr" defTabSz="914400" eaLnBrk="1" fontAlgn="auto" latinLnBrk="0" hangingPunct="1">
-                <a:lnSpc>
-                  <a:spcPct val="100000"/>
-                </a:lnSpc>
-                <a:spcBef>
-                  <a:spcPts val="0"/>
-                </a:spcBef>
-                <a:spcAft>
-                  <a:spcPts val="0"/>
-                </a:spcAft>
-                <a:buClrTx/>
-                <a:buSzTx/>
-                <a:buFontTx/>
-                <a:buNone/>
-                <a:tabLst/>
-                <a:defRPr/>
-              </a:pPr>
-              <a:r>
-                <a:rPr kumimoji="0" lang="en-US" sz="1600" b="0" i="0" u="none" strike="noStrike" kern="0" cap="none" spc="0" normalizeH="0" baseline="0" noProof="0" dirty="0">
-                  <a:ln>
-                    <a:noFill/>
-                  </a:ln>
-                  <a:solidFill>
-                    <a:prstClr val="white"/>
-                  </a:solidFill>
-                  <a:effectLst/>
-                  <a:uLnTx/>
-                  <a:uFillTx/>
-                  <a:latin typeface="Calibri"/>
-                  <a:ea typeface="+mn-ea"/>
-                  <a:cs typeface="+mn-cs"/>
-                </a:rPr>
-                <a:t>Parser</a:t>
-              </a:r>
-              <a:endParaRPr kumimoji="0" lang="en-SG" sz="1600" b="0" i="0" u="none" strike="noStrike" kern="0" cap="none" spc="0" normalizeH="0" baseline="0" noProof="0" dirty="0">
+              <a:endParaRPr kumimoji="0" lang="en-SG" sz="1400" b="0" i="0" u="none" strike="noStrike" kern="0" cap="none" spc="0" normalizeH="0" baseline="0" noProof="0" dirty="0">
                 <a:ln>
                   <a:noFill/>
                 </a:ln>
                 <a:solidFill>
-                  <a:prstClr val="white"/>
+                  <a:prstClr val="black"/>
                 </a:solidFill>
                 <a:effectLst/>
                 <a:uLnTx/>
@@ -4445,279 +4320,12 @@
             </a:p>
           </p:txBody>
         </p:sp>
-        <p:sp>
-          <p:nvSpPr>
-            <p:cNvPr id="21" name="Rectangle 62">
+        <p:cxnSp>
+          <p:nvCxnSpPr>
+            <p:cNvPr id="73" name="Straight Arrow Connector 72">
               <a:extLst>
                 <a:ext uri="{FF2B5EF4-FFF2-40B4-BE49-F238E27FC236}">
-                  <a16:creationId xmlns:a16="http://schemas.microsoft.com/office/drawing/2014/main" id="{4269CEDE-D860-47BD-BB94-DA66E0F350D7}"/>
-                </a:ext>
-              </a:extLst>
-            </p:cNvPr>
-            <p:cNvSpPr/>
-            <p:nvPr/>
-          </p:nvSpPr>
-          <p:spPr>
-            <a:xfrm>
-              <a:off x="3832849" y="1399523"/>
-              <a:ext cx="1219200" cy="467684"/>
-            </a:xfrm>
-            <a:prstGeom prst="rect">
-              <a:avLst/>
-            </a:prstGeom>
-            <a:solidFill>
-              <a:srgbClr val="0070C0"/>
-            </a:solidFill>
-            <a:ln w="19050" cap="flat" cmpd="sng" algn="ctr">
-              <a:solidFill>
-                <a:srgbClr val="0070C0"/>
-              </a:solidFill>
-              <a:prstDash val="solid"/>
-            </a:ln>
-            <a:effectLst/>
-          </p:spPr>
-          <p:txBody>
-            <a:bodyPr rtlCol="0" anchor="ctr"/>
-            <a:lstStyle/>
-            <a:p>
-              <a:pPr marL="0" marR="0" lvl="0" indent="0" algn="ctr" defTabSz="914400" eaLnBrk="1" fontAlgn="auto" latinLnBrk="0" hangingPunct="1">
-                <a:lnSpc>
-                  <a:spcPct val="100000"/>
-                </a:lnSpc>
-                <a:spcBef>
-                  <a:spcPts val="0"/>
-                </a:spcBef>
-                <a:spcAft>
-                  <a:spcPts val="0"/>
-                </a:spcAft>
-                <a:buClrTx/>
-                <a:buSzTx/>
-                <a:buFontTx/>
-                <a:buNone/>
-                <a:tabLst/>
-                <a:defRPr/>
-              </a:pPr>
-              <a:r>
-                <a:rPr kumimoji="0" lang="en-US" sz="1600" i="0" u="none" strike="noStrike" kern="0" cap="none" spc="0" normalizeH="0" baseline="0" noProof="0" dirty="0">
-                  <a:ln>
-                    <a:noFill/>
-                  </a:ln>
-                  <a:solidFill>
-                    <a:prstClr val="white"/>
-                  </a:solidFill>
-                  <a:effectLst/>
-                  <a:uLnTx/>
-                  <a:uFillTx/>
-                  <a:latin typeface="Calibri"/>
-                  <a:ea typeface="+mn-ea"/>
-                  <a:cs typeface="+mn-cs"/>
-                </a:rPr>
-                <a:t>:</a:t>
-              </a:r>
-              <a:r>
-                <a:rPr lang="en-US" sz="1600" kern="0" dirty="0">
-                  <a:solidFill>
-                    <a:prstClr val="white"/>
-                  </a:solidFill>
-                  <a:latin typeface="Calibri"/>
-                </a:rPr>
-                <a:t>Budget</a:t>
-              </a:r>
-            </a:p>
-            <a:p>
-              <a:pPr marL="0" marR="0" lvl="0" indent="0" algn="ctr" defTabSz="914400" eaLnBrk="1" fontAlgn="auto" latinLnBrk="0" hangingPunct="1">
-                <a:lnSpc>
-                  <a:spcPct val="100000"/>
-                </a:lnSpc>
-                <a:spcBef>
-                  <a:spcPts val="0"/>
-                </a:spcBef>
-                <a:spcAft>
-                  <a:spcPts val="0"/>
-                </a:spcAft>
-                <a:buClrTx/>
-                <a:buSzTx/>
-                <a:buFontTx/>
-                <a:buNone/>
-                <a:tabLst/>
-                <a:defRPr/>
-              </a:pPr>
-              <a:r>
-                <a:rPr lang="en-US" sz="1600" kern="0" dirty="0">
-                  <a:solidFill>
-                    <a:prstClr val="white"/>
-                  </a:solidFill>
-                  <a:latin typeface="Calibri"/>
-                </a:rPr>
-                <a:t>Command</a:t>
-              </a:r>
-              <a:endParaRPr kumimoji="0" lang="en-US" sz="1600" i="0" u="none" strike="noStrike" kern="0" cap="none" spc="0" normalizeH="0" baseline="0" noProof="0" dirty="0">
-                <a:ln>
-                  <a:noFill/>
-                </a:ln>
-                <a:solidFill>
-                  <a:prstClr val="white"/>
-                </a:solidFill>
-                <a:effectLst/>
-                <a:uLnTx/>
-                <a:uFillTx/>
-                <a:latin typeface="Calibri"/>
-                <a:ea typeface="+mn-ea"/>
-                <a:cs typeface="+mn-cs"/>
-              </a:endParaRPr>
-            </a:p>
-          </p:txBody>
-        </p:sp>
-        <p:grpSp>
-          <p:nvGrpSpPr>
-            <p:cNvPr id="13" name="Group 12">
-              <a:extLst>
-                <a:ext uri="{FF2B5EF4-FFF2-40B4-BE49-F238E27FC236}">
-                  <a16:creationId xmlns:a16="http://schemas.microsoft.com/office/drawing/2014/main" id="{8A5B8B96-B972-4763-8A5F-FC1610FA5529}"/>
-                </a:ext>
-              </a:extLst>
-            </p:cNvPr>
-            <p:cNvGrpSpPr/>
-            <p:nvPr/>
-          </p:nvGrpSpPr>
-          <p:grpSpPr>
-            <a:xfrm>
-              <a:off x="2803812" y="1805541"/>
-              <a:ext cx="154408" cy="1482984"/>
-              <a:chOff x="2803812" y="1805541"/>
-              <a:chExt cx="154408" cy="1482984"/>
-            </a:xfrm>
-          </p:grpSpPr>
-          <p:cxnSp>
-            <p:nvCxnSpPr>
-              <p:cNvPr id="22" name="Straight Connector 21">
-                <a:extLst>
-                  <a:ext uri="{FF2B5EF4-FFF2-40B4-BE49-F238E27FC236}">
-                    <a16:creationId xmlns:a16="http://schemas.microsoft.com/office/drawing/2014/main" id="{FBB60BB9-0141-4399-AFE3-8832F9E00FD8}"/>
-                  </a:ext>
-                </a:extLst>
-              </p:cNvPr>
-              <p:cNvCxnSpPr>
-                <a:cxnSpLocks/>
-              </p:cNvCxnSpPr>
-              <p:nvPr/>
-            </p:nvCxnSpPr>
-            <p:spPr>
-              <a:xfrm>
-                <a:off x="2881016" y="1805541"/>
-                <a:ext cx="0" cy="1482984"/>
-              </a:xfrm>
-              <a:prstGeom prst="line">
-                <a:avLst/>
-              </a:prstGeom>
-              <a:gradFill rotWithShape="1">
-                <a:gsLst>
-                  <a:gs pos="0">
-                    <a:srgbClr val="4F81BD">
-                      <a:tint val="50000"/>
-                      <a:satMod val="300000"/>
-                    </a:srgbClr>
-                  </a:gs>
-                  <a:gs pos="35000">
-                    <a:srgbClr val="4F81BD">
-                      <a:tint val="37000"/>
-                      <a:satMod val="300000"/>
-                    </a:srgbClr>
-                  </a:gs>
-                  <a:gs pos="100000">
-                    <a:srgbClr val="4F81BD">
-                      <a:tint val="15000"/>
-                      <a:satMod val="350000"/>
-                    </a:srgbClr>
-                  </a:gs>
-                </a:gsLst>
-                <a:lin ang="16200000" scaled="1"/>
-              </a:gradFill>
-              <a:ln w="19050" cap="flat" cmpd="sng" algn="ctr">
-                <a:solidFill>
-                  <a:srgbClr val="0070C0"/>
-                </a:solidFill>
-                <a:prstDash val="sysDash"/>
-              </a:ln>
-              <a:effectLst/>
-            </p:spPr>
-          </p:cxnSp>
-          <p:sp>
-            <p:nvSpPr>
-              <p:cNvPr id="23" name="Rectangle 22">
-                <a:extLst>
-                  <a:ext uri="{FF2B5EF4-FFF2-40B4-BE49-F238E27FC236}">
-                    <a16:creationId xmlns:a16="http://schemas.microsoft.com/office/drawing/2014/main" id="{19D34A78-93F3-4D64-A8D1-94884B295D2C}"/>
-                  </a:ext>
-                </a:extLst>
-              </p:cNvPr>
-              <p:cNvSpPr/>
-              <p:nvPr/>
-            </p:nvSpPr>
-            <p:spPr>
-              <a:xfrm>
-                <a:off x="2803812" y="2081248"/>
-                <a:ext cx="154408" cy="767790"/>
-              </a:xfrm>
-              <a:prstGeom prst="rect">
-                <a:avLst/>
-              </a:prstGeom>
-              <a:solidFill>
-                <a:srgbClr val="0070C0"/>
-              </a:solidFill>
-              <a:ln w="9525" cap="flat" cmpd="sng" algn="ctr">
-                <a:solidFill>
-                  <a:srgbClr val="0070C0"/>
-                </a:solidFill>
-                <a:prstDash val="solid"/>
-              </a:ln>
-              <a:effectLst/>
-            </p:spPr>
-            <p:txBody>
-              <a:bodyPr rtlCol="0" anchor="ctr"/>
-              <a:lstStyle/>
-              <a:p>
-                <a:pPr marL="0" marR="0" lvl="0" indent="0" algn="ctr" defTabSz="914400" eaLnBrk="1" fontAlgn="auto" latinLnBrk="0" hangingPunct="1">
-                  <a:lnSpc>
-                    <a:spcPct val="100000"/>
-                  </a:lnSpc>
-                  <a:spcBef>
-                    <a:spcPts val="0"/>
-                  </a:spcBef>
-                  <a:spcAft>
-                    <a:spcPts val="0"/>
-                  </a:spcAft>
-                  <a:buClrTx/>
-                  <a:buSzTx/>
-                  <a:buFontTx/>
-                  <a:buNone/>
-                  <a:tabLst/>
-                  <a:defRPr/>
-                </a:pPr>
-                <a:endParaRPr kumimoji="0" lang="en-SG" sz="1400" b="0" i="0" u="none" strike="noStrike" kern="0" cap="none" spc="0" normalizeH="0" baseline="0" noProof="0">
-                  <a:ln>
-                    <a:noFill/>
-                  </a:ln>
-                  <a:solidFill>
-                    <a:prstClr val="black"/>
-                  </a:solidFill>
-                  <a:effectLst/>
-                  <a:uLnTx/>
-                  <a:uFillTx/>
-                  <a:latin typeface="Calibri"/>
-                  <a:ea typeface="+mn-ea"/>
-                  <a:cs typeface="+mn-cs"/>
-                </a:endParaRPr>
-              </a:p>
-            </p:txBody>
-          </p:sp>
-        </p:grpSp>
-        <p:cxnSp>
-          <p:nvCxnSpPr>
-            <p:cNvPr id="24" name="Straight Arrow Connector 23">
-              <a:extLst>
-                <a:ext uri="{FF2B5EF4-FFF2-40B4-BE49-F238E27FC236}">
-                  <a16:creationId xmlns:a16="http://schemas.microsoft.com/office/drawing/2014/main" id="{CE83F39C-5558-4216-B34D-982FD9777A4D}"/>
+                  <a16:creationId xmlns:a16="http://schemas.microsoft.com/office/drawing/2014/main" id="{2AD61E1F-1104-4533-AD81-53F5B5C087C5}"/>
                 </a:ext>
               </a:extLst>
             </p:cNvPr>
@@ -4728,8 +4336,106 @@
           </p:nvCxnSpPr>
           <p:spPr>
             <a:xfrm>
-              <a:off x="2958220" y="2260595"/>
-              <a:ext cx="1308980" cy="0"/>
+              <a:off x="-259126" y="1261999"/>
+              <a:ext cx="1798077" cy="0"/>
+            </a:xfrm>
+            <a:prstGeom prst="straightConnector1">
+              <a:avLst/>
+            </a:prstGeom>
+            <a:noFill/>
+            <a:ln w="19050" cap="flat" cmpd="sng" algn="ctr">
+              <a:solidFill>
+                <a:srgbClr val="00B050"/>
+              </a:solidFill>
+              <a:prstDash val="solid"/>
+              <a:tailEnd type="arrow"/>
+            </a:ln>
+            <a:effectLst/>
+          </p:spPr>
+        </p:cxnSp>
+        <p:sp>
+          <p:nvSpPr>
+            <p:cNvPr id="74" name="TextBox 73">
+              <a:extLst>
+                <a:ext uri="{FF2B5EF4-FFF2-40B4-BE49-F238E27FC236}">
+                  <a16:creationId xmlns:a16="http://schemas.microsoft.com/office/drawing/2014/main" id="{D16FB676-6BFC-4747-8ADB-884FB4D7EF9E}"/>
+                </a:ext>
+              </a:extLst>
+            </p:cNvPr>
+            <p:cNvSpPr txBox="1"/>
+            <p:nvPr/>
+          </p:nvSpPr>
+          <p:spPr>
+            <a:xfrm>
+              <a:off x="-1981198" y="990601"/>
+              <a:ext cx="3444144" cy="215444"/>
+            </a:xfrm>
+            <a:prstGeom prst="rect">
+              <a:avLst/>
+            </a:prstGeom>
+            <a:noFill/>
+          </p:spPr>
+          <p:txBody>
+            <a:bodyPr wrap="square" lIns="0" tIns="0" rIns="0" bIns="0" rtlCol="0">
+              <a:spAutoFit/>
+            </a:bodyPr>
+            <a:lstStyle/>
+            <a:p>
+              <a:pPr lvl="0" algn="r"/>
+              <a:r>
+                <a:rPr kumimoji="0" lang="en-US" sz="1400" b="0" i="0" u="none" strike="noStrike" kern="0" cap="none" spc="0" normalizeH="0" baseline="0" noProof="0" dirty="0">
+                  <a:ln>
+                    <a:noFill/>
+                  </a:ln>
+                  <a:solidFill>
+                    <a:srgbClr val="0070C0"/>
+                  </a:solidFill>
+                  <a:effectLst/>
+                  <a:uLnTx/>
+                  <a:uFillTx/>
+                </a:rPr>
+                <a:t>execute</a:t>
+              </a:r>
+              <a:r>
+                <a:rPr lang="en-US" sz="1400" kern="0" dirty="0">
+                  <a:solidFill>
+                    <a:srgbClr val="0070C0"/>
+                  </a:solidFill>
+                </a:rPr>
+                <a:t>(“budget input”)</a:t>
+              </a:r>
+              <a:endParaRPr kumimoji="0" lang="en-US" sz="1400" b="0" i="0" u="none" strike="noStrike" kern="0" cap="none" spc="0" normalizeH="0" baseline="0" noProof="0" dirty="0">
+                <a:ln>
+                  <a:noFill/>
+                </a:ln>
+                <a:solidFill>
+                  <a:srgbClr val="0070C0"/>
+                </a:solidFill>
+                <a:effectLst/>
+                <a:uLnTx/>
+                <a:uFillTx/>
+              </a:endParaRPr>
+            </a:p>
+          </p:txBody>
+        </p:sp>
+        <p:cxnSp>
+          <p:nvCxnSpPr>
+            <p:cNvPr id="75" name="Straight Arrow Connector 74">
+              <a:extLst>
+                <a:ext uri="{FF2B5EF4-FFF2-40B4-BE49-F238E27FC236}">
+                  <a16:creationId xmlns:a16="http://schemas.microsoft.com/office/drawing/2014/main" id="{698620F2-ECE4-4605-B38F-72EFC569A759}"/>
+                </a:ext>
+              </a:extLst>
+            </p:cNvPr>
+            <p:cNvCxnSpPr>
+              <a:cxnSpLocks/>
+            </p:cNvCxnSpPr>
+            <p:nvPr/>
+          </p:nvCxnSpPr>
+          <p:spPr>
+            <a:xfrm flipV="1">
+              <a:off x="4448731" y="1665448"/>
+              <a:ext cx="1091589" cy="2"/>
             </a:xfrm>
             <a:prstGeom prst="straightConnector1">
               <a:avLst/>
@@ -4745,156 +4451,12 @@
             <a:effectLst/>
           </p:spPr>
         </p:cxnSp>
-        <p:grpSp>
-          <p:nvGrpSpPr>
-            <p:cNvPr id="27" name="Group 26">
+        <p:sp>
+          <p:nvSpPr>
+            <p:cNvPr id="76" name="TextBox 75">
               <a:extLst>
                 <a:ext uri="{FF2B5EF4-FFF2-40B4-BE49-F238E27FC236}">
-                  <a16:creationId xmlns:a16="http://schemas.microsoft.com/office/drawing/2014/main" id="{D8C2B96C-6965-4008-AD4D-5C7DB29A64B6}"/>
-                </a:ext>
-              </a:extLst>
-            </p:cNvPr>
-            <p:cNvGrpSpPr/>
-            <p:nvPr/>
-          </p:nvGrpSpPr>
-          <p:grpSpPr>
-            <a:xfrm>
-              <a:off x="4312856" y="1883513"/>
-              <a:ext cx="163797" cy="2111246"/>
-              <a:chOff x="2803812" y="1805541"/>
-              <a:chExt cx="154408" cy="2223703"/>
-            </a:xfrm>
-          </p:grpSpPr>
-          <p:cxnSp>
-            <p:nvCxnSpPr>
-              <p:cNvPr id="28" name="Straight Connector 27">
-                <a:extLst>
-                  <a:ext uri="{FF2B5EF4-FFF2-40B4-BE49-F238E27FC236}">
-                    <a16:creationId xmlns:a16="http://schemas.microsoft.com/office/drawing/2014/main" id="{54CCBF35-D248-4D65-899B-B0AF07DDE17D}"/>
-                  </a:ext>
-                </a:extLst>
-              </p:cNvPr>
-              <p:cNvCxnSpPr>
-                <a:cxnSpLocks/>
-              </p:cNvCxnSpPr>
-              <p:nvPr/>
-            </p:nvCxnSpPr>
-            <p:spPr>
-              <a:xfrm>
-                <a:off x="2881016" y="1805541"/>
-                <a:ext cx="0" cy="2223703"/>
-              </a:xfrm>
-              <a:prstGeom prst="line">
-                <a:avLst/>
-              </a:prstGeom>
-              <a:gradFill rotWithShape="1">
-                <a:gsLst>
-                  <a:gs pos="0">
-                    <a:srgbClr val="4F81BD">
-                      <a:tint val="50000"/>
-                      <a:satMod val="300000"/>
-                    </a:srgbClr>
-                  </a:gs>
-                  <a:gs pos="35000">
-                    <a:srgbClr val="4F81BD">
-                      <a:tint val="37000"/>
-                      <a:satMod val="300000"/>
-                    </a:srgbClr>
-                  </a:gs>
-                  <a:gs pos="100000">
-                    <a:srgbClr val="4F81BD">
-                      <a:tint val="15000"/>
-                      <a:satMod val="350000"/>
-                    </a:srgbClr>
-                  </a:gs>
-                </a:gsLst>
-                <a:lin ang="16200000" scaled="1"/>
-              </a:gradFill>
-              <a:ln w="19050" cap="flat" cmpd="sng" algn="ctr">
-                <a:solidFill>
-                  <a:srgbClr val="0070C0"/>
-                </a:solidFill>
-                <a:prstDash val="sysDash"/>
-              </a:ln>
-              <a:effectLst/>
-            </p:spPr>
-          </p:cxnSp>
-          <p:sp>
-            <p:nvSpPr>
-              <p:cNvPr id="29" name="Rectangle 28">
-                <a:extLst>
-                  <a:ext uri="{FF2B5EF4-FFF2-40B4-BE49-F238E27FC236}">
-                    <a16:creationId xmlns:a16="http://schemas.microsoft.com/office/drawing/2014/main" id="{F6952E45-FB08-4061-BFD2-E7AD31182637}"/>
-                  </a:ext>
-                </a:extLst>
-              </p:cNvPr>
-              <p:cNvSpPr/>
-              <p:nvPr/>
-            </p:nvSpPr>
-            <p:spPr>
-              <a:xfrm>
-                <a:off x="2803812" y="2143134"/>
-                <a:ext cx="154408" cy="767790"/>
-              </a:xfrm>
-              <a:prstGeom prst="rect">
-                <a:avLst/>
-              </a:prstGeom>
-              <a:solidFill>
-                <a:srgbClr val="0070C0"/>
-              </a:solidFill>
-              <a:ln w="9525" cap="flat" cmpd="sng" algn="ctr">
-                <a:solidFill>
-                  <a:srgbClr val="0070C0"/>
-                </a:solidFill>
-                <a:prstDash val="solid"/>
-              </a:ln>
-              <a:effectLst/>
-            </p:spPr>
-            <p:txBody>
-              <a:bodyPr rtlCol="0" anchor="ctr"/>
-              <a:lstStyle/>
-              <a:p>
-                <a:pPr marL="0" marR="0" lvl="0" indent="0" algn="ctr" defTabSz="914400" eaLnBrk="1" fontAlgn="auto" latinLnBrk="0" hangingPunct="1">
-                  <a:lnSpc>
-                    <a:spcPct val="100000"/>
-                  </a:lnSpc>
-                  <a:spcBef>
-                    <a:spcPts val="0"/>
-                  </a:spcBef>
-                  <a:spcAft>
-                    <a:spcPts val="0"/>
-                  </a:spcAft>
-                  <a:buClrTx/>
-                  <a:buSzTx/>
-                  <a:buFontTx/>
-                  <a:buNone/>
-                  <a:tabLst/>
-                  <a:defRPr/>
-                </a:pPr>
-                <a:endParaRPr kumimoji="0" lang="en-SG" sz="1400" b="0" i="0" u="none" strike="noStrike" kern="0" cap="none" spc="0" normalizeH="0" baseline="0" noProof="0">
-                  <a:ln>
-                    <a:noFill/>
-                  </a:ln>
-                  <a:solidFill>
-                    <a:prstClr val="black"/>
-                  </a:solidFill>
-                  <a:effectLst/>
-                  <a:uLnTx/>
-                  <a:uFillTx/>
-                  <a:latin typeface="Calibri"/>
-                  <a:ea typeface="+mn-ea"/>
-                  <a:cs typeface="+mn-cs"/>
-                </a:endParaRPr>
-              </a:p>
-            </p:txBody>
-          </p:sp>
-        </p:grpSp>
-        <p:sp>
-          <p:nvSpPr>
-            <p:cNvPr id="43" name="TextBox 42">
-              <a:extLst>
-                <a:ext uri="{FF2B5EF4-FFF2-40B4-BE49-F238E27FC236}">
-                  <a16:creationId xmlns:a16="http://schemas.microsoft.com/office/drawing/2014/main" id="{07892C90-686B-47A6-A303-495154EF5C8F}"/>
+                  <a16:creationId xmlns:a16="http://schemas.microsoft.com/office/drawing/2014/main" id="{EE2578CA-8092-4219-A2AF-3C2BE560BCDD}"/>
                 </a:ext>
               </a:extLst>
             </p:cNvPr>
@@ -4903,70 +4465,8 @@
           </p:nvSpPr>
           <p:spPr>
             <a:xfrm>
-              <a:off x="-1663644" y="985899"/>
-              <a:ext cx="1424846" cy="215444"/>
-            </a:xfrm>
-            <a:prstGeom prst="rect">
-              <a:avLst/>
-            </a:prstGeom>
-            <a:noFill/>
-          </p:spPr>
-          <p:txBody>
-            <a:bodyPr wrap="square" lIns="0" tIns="0" rIns="0" bIns="0" rtlCol="0">
-              <a:spAutoFit/>
-            </a:bodyPr>
-            <a:lstStyle/>
-            <a:p>
-              <a:pPr marL="0" marR="0" lvl="0" indent="0" algn="r" defTabSz="914400" eaLnBrk="1" fontAlgn="auto" latinLnBrk="0" hangingPunct="1">
-                <a:lnSpc>
-                  <a:spcPct val="100000"/>
-                </a:lnSpc>
-                <a:spcBef>
-                  <a:spcPts val="0"/>
-                </a:spcBef>
-                <a:spcAft>
-                  <a:spcPts val="0"/>
-                </a:spcAft>
-                <a:buClrTx/>
-                <a:buSzTx/>
-                <a:buFontTx/>
-                <a:buNone/>
-                <a:tabLst/>
-                <a:defRPr/>
-              </a:pPr>
-              <a:r>
-                <a:rPr kumimoji="0" lang="en-US" sz="1400" b="0" i="0" u="none" strike="noStrike" kern="0" cap="none" spc="0" normalizeH="0" baseline="0" noProof="0" dirty="0">
-                  <a:ln>
-                    <a:noFill/>
-                  </a:ln>
-                  <a:solidFill>
-                    <a:srgbClr val="0070C0"/>
-                  </a:solidFill>
-                  <a:effectLst/>
-                  <a:uLnTx/>
-                  <a:uFillTx/>
-                </a:rPr>
-                <a:t>execute(“budget”)</a:t>
-              </a:r>
-            </a:p>
-          </p:txBody>
-        </p:sp>
-        <p:sp>
-          <p:nvSpPr>
-            <p:cNvPr id="44" name="TextBox 43">
-              <a:extLst>
-                <a:ext uri="{FF2B5EF4-FFF2-40B4-BE49-F238E27FC236}">
-                  <a16:creationId xmlns:a16="http://schemas.microsoft.com/office/drawing/2014/main" id="{B6920C07-CA31-4C94-B9C2-568C7CE10663}"/>
-                </a:ext>
-              </a:extLst>
-            </p:cNvPr>
-            <p:cNvSpPr txBox="1"/>
-            <p:nvPr/>
-          </p:nvSpPr>
-          <p:spPr>
-            <a:xfrm>
-              <a:off x="4262397" y="2274953"/>
-              <a:ext cx="1298078" cy="184666"/>
+              <a:off x="3243421" y="2484071"/>
+              <a:ext cx="855809" cy="215444"/>
             </a:xfrm>
             <a:prstGeom prst="rect">
               <a:avLst/>
@@ -5008,266 +4508,28 @@
                 <a:defRPr/>
               </a:pPr>
               <a:r>
-                <a:rPr lang="en-US" sz="1200" kern="0" dirty="0" err="1">
-                  <a:solidFill>
-                    <a:srgbClr val="8064A2">
-                      <a:lumMod val="75000"/>
-                    </a:srgbClr>
-                  </a:solidFill>
-                </a:rPr>
-                <a:t>addClub</a:t>
-              </a:r>
-              <a:r>
-                <a:rPr kumimoji="0" lang="en-US" sz="1200" b="0" i="0" u="none" strike="noStrike" kern="0" cap="none" spc="0" normalizeH="0" baseline="0" noProof="0" dirty="0">
+                <a:rPr kumimoji="0" lang="en-US" sz="1400" b="0" i="0" u="none" strike="noStrike" kern="0" cap="none" spc="0" normalizeH="0" baseline="0" noProof="0" dirty="0">
                   <a:ln>
                     <a:noFill/>
                   </a:ln>
                   <a:solidFill>
-                    <a:srgbClr val="7030A0"/>
+                    <a:srgbClr val="0070C0"/>
                   </a:solidFill>
                   <a:effectLst/>
                   <a:uLnTx/>
                   <a:uFillTx/>
                 </a:rPr>
-                <a:t>(</a:t>
+                <a:t>execute()</a:t>
               </a:r>
-              <a:r>
-                <a:rPr kumimoji="0" lang="en-US" sz="1200" b="0" i="0" u="none" strike="noStrike" kern="0" cap="none" spc="0" normalizeH="0" baseline="0" noProof="0" dirty="0" err="1">
-                  <a:ln>
-                    <a:noFill/>
-                  </a:ln>
-                  <a:solidFill>
-                    <a:srgbClr val="7030A0"/>
-                  </a:solidFill>
-                  <a:effectLst/>
-                  <a:uLnTx/>
-                  <a:uFillTx/>
-                </a:rPr>
-                <a:t>toAdd</a:t>
-              </a:r>
-              <a:r>
-                <a:rPr kumimoji="0" lang="en-US" sz="1200" b="0" i="0" u="none" strike="noStrike" kern="0" cap="none" spc="0" normalizeH="0" baseline="0" noProof="0" dirty="0">
-                  <a:ln>
-                    <a:noFill/>
-                  </a:ln>
-                  <a:solidFill>
-                    <a:srgbClr val="7030A0"/>
-                  </a:solidFill>
-                  <a:effectLst/>
-                  <a:uLnTx/>
-                  <a:uFillTx/>
-                </a:rPr>
-                <a:t>)</a:t>
-              </a:r>
-              <a:endParaRPr kumimoji="0" lang="en-US" sz="1200" b="0" i="0" u="none" strike="noStrike" kern="0" cap="none" spc="0" normalizeH="0" baseline="0" noProof="0" dirty="0">
-                <a:ln>
-                  <a:noFill/>
-                </a:ln>
-                <a:solidFill>
-                  <a:srgbClr val="0070C0"/>
-                </a:solidFill>
-                <a:effectLst/>
-                <a:uLnTx/>
-                <a:uFillTx/>
-              </a:endParaRPr>
-            </a:p>
-          </p:txBody>
-        </p:sp>
-        <p:sp>
-          <p:nvSpPr>
-            <p:cNvPr id="45" name="Rectangle 62">
-              <a:extLst>
-                <a:ext uri="{FF2B5EF4-FFF2-40B4-BE49-F238E27FC236}">
-                  <a16:creationId xmlns:a16="http://schemas.microsoft.com/office/drawing/2014/main" id="{2AB27F27-D627-414B-9994-5ACC4C06F43A}"/>
-                </a:ext>
-              </a:extLst>
-            </p:cNvPr>
-            <p:cNvSpPr/>
-            <p:nvPr/>
-          </p:nvSpPr>
-          <p:spPr>
-            <a:xfrm>
-              <a:off x="6403645" y="2011947"/>
-              <a:ext cx="2181777" cy="335427"/>
-            </a:xfrm>
-            <a:prstGeom prst="rect">
-              <a:avLst/>
-            </a:prstGeom>
-            <a:solidFill>
-              <a:srgbClr val="7030A0"/>
-            </a:solidFill>
-            <a:ln w="19050" cap="flat" cmpd="sng" algn="ctr">
-              <a:solidFill>
-                <a:srgbClr val="7030A0"/>
-              </a:solidFill>
-              <a:prstDash val="solid"/>
-            </a:ln>
-            <a:effectLst/>
-          </p:spPr>
-          <p:txBody>
-            <a:bodyPr rtlCol="0" anchor="ctr"/>
-            <a:lstStyle/>
-            <a:p>
-              <a:pPr marL="0" marR="0" lvl="0" indent="0" algn="ctr" defTabSz="914400" eaLnBrk="1" fontAlgn="auto" latinLnBrk="0" hangingPunct="1">
-                <a:lnSpc>
-                  <a:spcPct val="100000"/>
-                </a:lnSpc>
-                <a:spcBef>
-                  <a:spcPts val="0"/>
-                </a:spcBef>
-                <a:spcAft>
-                  <a:spcPts val="0"/>
-                </a:spcAft>
-                <a:buClrTx/>
-                <a:buSzTx/>
-                <a:buFontTx/>
-                <a:buNone/>
-                <a:tabLst/>
-                <a:defRPr/>
-              </a:pPr>
-              <a:r>
-                <a:rPr kumimoji="0" lang="en-US" sz="1600" b="0" i="0" u="none" strike="noStrike" kern="0" cap="none" spc="0" normalizeH="0" baseline="0" noProof="0" dirty="0">
-                  <a:ln>
-                    <a:noFill/>
-                  </a:ln>
-                  <a:solidFill>
-                    <a:prstClr val="white"/>
-                  </a:solidFill>
-                  <a:effectLst/>
-                  <a:uLnTx/>
-                  <a:uFillTx/>
-                  <a:latin typeface="Calibri"/>
-                  <a:ea typeface="+mn-ea"/>
-                  <a:cs typeface="+mn-cs"/>
-                </a:rPr>
-                <a:t>:</a:t>
-              </a:r>
-              <a:r>
-                <a:rPr kumimoji="0" lang="en-US" sz="1600" b="0" i="0" u="none" strike="noStrike" kern="0" cap="none" spc="0" normalizeH="0" baseline="0" noProof="0" dirty="0" err="1">
-                  <a:ln>
-                    <a:noFill/>
-                  </a:ln>
-                  <a:solidFill>
-                    <a:prstClr val="white"/>
-                  </a:solidFill>
-                  <a:effectLst/>
-                  <a:uLnTx/>
-                  <a:uFillTx/>
-                  <a:latin typeface="Calibri"/>
-                  <a:ea typeface="+mn-ea"/>
-                  <a:cs typeface="+mn-cs"/>
-                </a:rPr>
-                <a:t>AddressBook</a:t>
-              </a:r>
-              <a:endParaRPr kumimoji="0" lang="en-SG" sz="1600" b="0" i="0" u="none" strike="noStrike" kern="0" cap="none" spc="0" normalizeH="0" baseline="0" noProof="0" dirty="0">
-                <a:ln>
-                  <a:noFill/>
-                </a:ln>
-                <a:solidFill>
-                  <a:prstClr val="white"/>
-                </a:solidFill>
-                <a:effectLst/>
-                <a:uLnTx/>
-                <a:uFillTx/>
-                <a:latin typeface="Calibri"/>
-                <a:ea typeface="+mn-ea"/>
-                <a:cs typeface="+mn-cs"/>
-              </a:endParaRPr>
-            </a:p>
-          </p:txBody>
-        </p:sp>
-        <p:sp>
-          <p:nvSpPr>
-            <p:cNvPr id="46" name="Rectangle 62">
-              <a:extLst>
-                <a:ext uri="{FF2B5EF4-FFF2-40B4-BE49-F238E27FC236}">
-                  <a16:creationId xmlns:a16="http://schemas.microsoft.com/office/drawing/2014/main" id="{7EFBA169-1111-4186-9556-3C27D266469F}"/>
-                </a:ext>
-              </a:extLst>
-            </p:cNvPr>
-            <p:cNvSpPr/>
-            <p:nvPr/>
-          </p:nvSpPr>
-          <p:spPr>
-            <a:xfrm>
-              <a:off x="5456255" y="1805541"/>
-              <a:ext cx="841636" cy="300180"/>
-            </a:xfrm>
-            <a:prstGeom prst="rect">
-              <a:avLst/>
-            </a:prstGeom>
-            <a:solidFill>
-              <a:srgbClr val="7030A0"/>
-            </a:solidFill>
-            <a:ln w="19050" cap="flat" cmpd="sng" algn="ctr">
-              <a:solidFill>
-                <a:srgbClr val="7030A0"/>
-              </a:solidFill>
-              <a:prstDash val="solid"/>
-            </a:ln>
-            <a:effectLst/>
-          </p:spPr>
-          <p:txBody>
-            <a:bodyPr rtlCol="0" anchor="ctr"/>
-            <a:lstStyle/>
-            <a:p>
-              <a:pPr marL="0" marR="0" lvl="0" indent="0" algn="ctr" defTabSz="914400" eaLnBrk="1" fontAlgn="auto" latinLnBrk="0" hangingPunct="1">
-                <a:lnSpc>
-                  <a:spcPct val="100000"/>
-                </a:lnSpc>
-                <a:spcBef>
-                  <a:spcPts val="0"/>
-                </a:spcBef>
-                <a:spcAft>
-                  <a:spcPts val="0"/>
-                </a:spcAft>
-                <a:buClrTx/>
-                <a:buSzTx/>
-                <a:buFontTx/>
-                <a:buNone/>
-                <a:tabLst/>
-                <a:defRPr/>
-              </a:pPr>
-              <a:r>
-                <a:rPr kumimoji="0" lang="en-US" sz="1600" b="0" i="0" u="none" strike="noStrike" kern="0" cap="none" spc="0" normalizeH="0" baseline="0" noProof="0" dirty="0">
-                  <a:ln>
-                    <a:noFill/>
-                  </a:ln>
-                  <a:solidFill>
-                    <a:prstClr val="white"/>
-                  </a:solidFill>
-                  <a:effectLst/>
-                  <a:uLnTx/>
-                  <a:uFillTx/>
-                  <a:latin typeface="Calibri"/>
-                  <a:ea typeface="+mn-ea"/>
-                  <a:cs typeface="+mn-cs"/>
-                </a:rPr>
-                <a:t>: Model</a:t>
-              </a:r>
-              <a:endParaRPr kumimoji="0" lang="en-SG" sz="1600" b="0" i="0" u="none" strike="noStrike" kern="0" cap="none" spc="0" normalizeH="0" baseline="0" noProof="0" dirty="0">
-                <a:ln>
-                  <a:noFill/>
-                </a:ln>
-                <a:solidFill>
-                  <a:prstClr val="white"/>
-                </a:solidFill>
-                <a:effectLst/>
-                <a:uLnTx/>
-                <a:uFillTx/>
-                <a:latin typeface="Calibri"/>
-                <a:ea typeface="+mn-ea"/>
-                <a:cs typeface="+mn-cs"/>
-              </a:endParaRPr>
             </a:p>
           </p:txBody>
         </p:sp>
         <p:cxnSp>
           <p:nvCxnSpPr>
-            <p:cNvPr id="47" name="Straight Connector 46">
+            <p:cNvPr id="77" name="Straight Arrow Connector 76">
               <a:extLst>
                 <a:ext uri="{FF2B5EF4-FFF2-40B4-BE49-F238E27FC236}">
-                  <a16:creationId xmlns:a16="http://schemas.microsoft.com/office/drawing/2014/main" id="{E923800B-AF79-4AD5-B051-E5A9F48589B9}"/>
+                  <a16:creationId xmlns:a16="http://schemas.microsoft.com/office/drawing/2014/main" id="{870ADAF6-FC54-4BD2-93AB-93F20739A241}"/>
                 </a:ext>
               </a:extLst>
             </p:cNvPr>
@@ -5277,51 +4539,97 @@
             <p:nvPr/>
           </p:nvCxnSpPr>
           <p:spPr>
-            <a:xfrm flipH="1">
-              <a:off x="5892981" y="2096647"/>
-              <a:ext cx="3959" cy="1735710"/>
+            <a:xfrm>
+              <a:off x="4495663" y="2133600"/>
+              <a:ext cx="1067732" cy="0"/>
             </a:xfrm>
-            <a:prstGeom prst="line">
+            <a:prstGeom prst="straightConnector1">
               <a:avLst/>
             </a:prstGeom>
-            <a:gradFill rotWithShape="1">
-              <a:gsLst>
-                <a:gs pos="0">
-                  <a:srgbClr val="4F81BD">
-                    <a:tint val="50000"/>
-                    <a:satMod val="300000"/>
-                  </a:srgbClr>
-                </a:gs>
-                <a:gs pos="35000">
-                  <a:srgbClr val="4F81BD">
-                    <a:tint val="37000"/>
-                    <a:satMod val="300000"/>
-                  </a:srgbClr>
-                </a:gs>
-                <a:gs pos="100000">
-                  <a:srgbClr val="4F81BD">
-                    <a:tint val="15000"/>
-                    <a:satMod val="350000"/>
-                  </a:srgbClr>
-                </a:gs>
-              </a:gsLst>
-              <a:lin ang="16200000" scaled="1"/>
-            </a:gradFill>
+            <a:noFill/>
             <a:ln w="19050" cap="flat" cmpd="sng" algn="ctr">
               <a:solidFill>
-                <a:srgbClr val="7030A0"/>
+                <a:srgbClr val="0070C0"/>
               </a:solidFill>
               <a:prstDash val="sysDash"/>
+              <a:headEnd type="arrow" w="med" len="med"/>
+              <a:tailEnd type="none" w="med" len="med"/>
+            </a:ln>
+            <a:effectLst/>
+          </p:spPr>
+        </p:cxnSp>
+        <p:cxnSp>
+          <p:nvCxnSpPr>
+            <p:cNvPr id="78" name="Straight Arrow Connector 77">
+              <a:extLst>
+                <a:ext uri="{FF2B5EF4-FFF2-40B4-BE49-F238E27FC236}">
+                  <a16:creationId xmlns:a16="http://schemas.microsoft.com/office/drawing/2014/main" id="{9035EF4C-E830-471D-86F1-7F2702E33E46}"/>
+                </a:ext>
+              </a:extLst>
+            </p:cNvPr>
+            <p:cNvCxnSpPr>
+              <a:cxnSpLocks/>
+            </p:cNvCxnSpPr>
+            <p:nvPr/>
+          </p:nvCxnSpPr>
+          <p:spPr>
+            <a:xfrm>
+              <a:off x="1709096" y="2438400"/>
+              <a:ext cx="1301841" cy="0"/>
+            </a:xfrm>
+            <a:prstGeom prst="straightConnector1">
+              <a:avLst/>
+            </a:prstGeom>
+            <a:noFill/>
+            <a:ln w="19050" cap="flat" cmpd="sng" algn="ctr">
+              <a:solidFill>
+                <a:srgbClr val="0070C0"/>
+              </a:solidFill>
+              <a:prstDash val="sysDash"/>
+              <a:headEnd type="arrow" w="med" len="med"/>
+              <a:tailEnd type="none" w="med" len="med"/>
+            </a:ln>
+            <a:effectLst/>
+          </p:spPr>
+        </p:cxnSp>
+        <p:cxnSp>
+          <p:nvCxnSpPr>
+            <p:cNvPr id="79" name="Straight Arrow Connector 78">
+              <a:extLst>
+                <a:ext uri="{FF2B5EF4-FFF2-40B4-BE49-F238E27FC236}">
+                  <a16:creationId xmlns:a16="http://schemas.microsoft.com/office/drawing/2014/main" id="{A8D2948C-16A6-45CD-B348-FD01E151A055}"/>
+                </a:ext>
+              </a:extLst>
+            </p:cNvPr>
+            <p:cNvCxnSpPr/>
+            <p:nvPr/>
+          </p:nvCxnSpPr>
+          <p:spPr>
+            <a:xfrm>
+              <a:off x="380999" y="4191000"/>
+              <a:ext cx="1196051" cy="0"/>
+            </a:xfrm>
+            <a:prstGeom prst="straightConnector1">
+              <a:avLst/>
+            </a:prstGeom>
+            <a:noFill/>
+            <a:ln w="19050" cap="flat" cmpd="sng" algn="ctr">
+              <a:solidFill>
+                <a:srgbClr val="4F81BD"/>
+              </a:solidFill>
+              <a:prstDash val="sysDash"/>
+              <a:headEnd type="arrow" w="med" len="med"/>
+              <a:tailEnd type="none" w="med" len="med"/>
             </a:ln>
             <a:effectLst/>
           </p:spPr>
         </p:cxnSp>
         <p:sp>
           <p:nvSpPr>
-            <p:cNvPr id="48" name="Rectangle 47">
+            <p:cNvPr id="80" name="Rectangle 79">
               <a:extLst>
                 <a:ext uri="{FF2B5EF4-FFF2-40B4-BE49-F238E27FC236}">
-                  <a16:creationId xmlns:a16="http://schemas.microsoft.com/office/drawing/2014/main" id="{DD8B3787-D012-4DD1-B5FD-63B8646DE20A}"/>
+                  <a16:creationId xmlns:a16="http://schemas.microsoft.com/office/drawing/2014/main" id="{3321D4BF-69D3-482B-AA67-AECB66B0084E}"/>
                 </a:ext>
               </a:extLst>
             </p:cNvPr>
@@ -5330,18 +4638,18 @@
           </p:nvSpPr>
           <p:spPr>
             <a:xfrm>
-              <a:off x="5794017" y="2401447"/>
-              <a:ext cx="168896" cy="775693"/>
+              <a:off x="5526488" y="2731313"/>
+              <a:ext cx="161322" cy="1307285"/>
             </a:xfrm>
             <a:prstGeom prst="rect">
               <a:avLst/>
             </a:prstGeom>
             <a:solidFill>
-              <a:srgbClr val="7030A0"/>
+              <a:srgbClr val="0070C0"/>
             </a:solidFill>
             <a:ln w="9525" cap="flat" cmpd="sng" algn="ctr">
               <a:solidFill>
-                <a:srgbClr val="7030A0"/>
+                <a:srgbClr val="0070C0"/>
               </a:solidFill>
               <a:prstDash val="solid"/>
             </a:ln>
@@ -5385,200 +4693,12 @@
             </a:p>
           </p:txBody>
         </p:sp>
-        <p:cxnSp>
-          <p:nvCxnSpPr>
-            <p:cNvPr id="50" name="Straight Connector 49">
+        <p:sp>
+          <p:nvSpPr>
+            <p:cNvPr id="81" name="TextBox 80">
               <a:extLst>
                 <a:ext uri="{FF2B5EF4-FFF2-40B4-BE49-F238E27FC236}">
-                  <a16:creationId xmlns:a16="http://schemas.microsoft.com/office/drawing/2014/main" id="{195E7B6F-2CDC-42BF-84D0-77819D591F7D}"/>
-                </a:ext>
-              </a:extLst>
-            </p:cNvPr>
-            <p:cNvCxnSpPr>
-              <a:cxnSpLocks/>
-            </p:cNvCxnSpPr>
-            <p:nvPr/>
-          </p:nvCxnSpPr>
-          <p:spPr>
-            <a:xfrm>
-              <a:off x="7494533" y="2314696"/>
-              <a:ext cx="17996" cy="1467648"/>
-            </a:xfrm>
-            <a:prstGeom prst="line">
-              <a:avLst/>
-            </a:prstGeom>
-            <a:gradFill rotWithShape="1">
-              <a:gsLst>
-                <a:gs pos="0">
-                  <a:srgbClr val="4F81BD">
-                    <a:tint val="50000"/>
-                    <a:satMod val="300000"/>
-                  </a:srgbClr>
-                </a:gs>
-                <a:gs pos="35000">
-                  <a:srgbClr val="4F81BD">
-                    <a:tint val="37000"/>
-                    <a:satMod val="300000"/>
-                  </a:srgbClr>
-                </a:gs>
-                <a:gs pos="100000">
-                  <a:srgbClr val="4F81BD">
-                    <a:tint val="15000"/>
-                    <a:satMod val="350000"/>
-                  </a:srgbClr>
-                </a:gs>
-              </a:gsLst>
-              <a:lin ang="16200000" scaled="1"/>
-            </a:gradFill>
-            <a:ln w="19050" cap="flat" cmpd="sng" algn="ctr">
-              <a:solidFill>
-                <a:srgbClr val="7030A0"/>
-              </a:solidFill>
-              <a:prstDash val="sysDash"/>
-            </a:ln>
-            <a:effectLst/>
-          </p:spPr>
-        </p:cxnSp>
-        <p:cxnSp>
-          <p:nvCxnSpPr>
-            <p:cNvPr id="52" name="Straight Arrow Connector 51">
-              <a:extLst>
-                <a:ext uri="{FF2B5EF4-FFF2-40B4-BE49-F238E27FC236}">
-                  <a16:creationId xmlns:a16="http://schemas.microsoft.com/office/drawing/2014/main" id="{3C5D5EB0-A2B2-4F8F-B5D9-A15A661DB83D}"/>
-                </a:ext>
-              </a:extLst>
-            </p:cNvPr>
-            <p:cNvCxnSpPr>
-              <a:cxnSpLocks/>
-            </p:cNvCxnSpPr>
-            <p:nvPr/>
-          </p:nvCxnSpPr>
-          <p:spPr>
-            <a:xfrm>
-              <a:off x="5950481" y="2626180"/>
-              <a:ext cx="1470216" cy="0"/>
-            </a:xfrm>
-            <a:prstGeom prst="straightConnector1">
-              <a:avLst/>
-            </a:prstGeom>
-            <a:noFill/>
-            <a:ln w="19050" cap="flat" cmpd="sng" algn="ctr">
-              <a:solidFill>
-                <a:srgbClr val="7030A0"/>
-              </a:solidFill>
-              <a:prstDash val="solid"/>
-              <a:tailEnd type="arrow"/>
-            </a:ln>
-            <a:effectLst/>
-          </p:spPr>
-        </p:cxnSp>
-        <p:cxnSp>
-          <p:nvCxnSpPr>
-            <p:cNvPr id="53" name="Straight Arrow Connector 52">
-              <a:extLst>
-                <a:ext uri="{FF2B5EF4-FFF2-40B4-BE49-F238E27FC236}">
-                  <a16:creationId xmlns:a16="http://schemas.microsoft.com/office/drawing/2014/main" id="{8A2B4583-6A53-4869-8249-FD84E870FB6E}"/>
-                </a:ext>
-              </a:extLst>
-            </p:cNvPr>
-            <p:cNvCxnSpPr>
-              <a:cxnSpLocks/>
-            </p:cNvCxnSpPr>
-            <p:nvPr/>
-          </p:nvCxnSpPr>
-          <p:spPr>
-            <a:xfrm flipV="1">
-              <a:off x="5892981" y="3277540"/>
-              <a:ext cx="1470216" cy="6325"/>
-            </a:xfrm>
-            <a:prstGeom prst="straightConnector1">
-              <a:avLst/>
-            </a:prstGeom>
-            <a:noFill/>
-            <a:ln w="19050" cap="flat" cmpd="sng" algn="ctr">
-              <a:solidFill>
-                <a:srgbClr val="7030A0"/>
-              </a:solidFill>
-              <a:prstDash val="sysDash"/>
-              <a:headEnd type="arrow" w="med" len="med"/>
-              <a:tailEnd type="none" w="med" len="med"/>
-            </a:ln>
-            <a:effectLst/>
-          </p:spPr>
-        </p:cxnSp>
-        <p:cxnSp>
-          <p:nvCxnSpPr>
-            <p:cNvPr id="54" name="Straight Arrow Connector 53">
-              <a:extLst>
-                <a:ext uri="{FF2B5EF4-FFF2-40B4-BE49-F238E27FC236}">
-                  <a16:creationId xmlns:a16="http://schemas.microsoft.com/office/drawing/2014/main" id="{3D34977F-C5F3-427E-AD35-A354A9BEEBE7}"/>
-                </a:ext>
-              </a:extLst>
-            </p:cNvPr>
-            <p:cNvCxnSpPr>
-              <a:cxnSpLocks/>
-            </p:cNvCxnSpPr>
-            <p:nvPr/>
-          </p:nvCxnSpPr>
-          <p:spPr>
-            <a:xfrm>
-              <a:off x="4442449" y="3429000"/>
-              <a:ext cx="1425607" cy="0"/>
-            </a:xfrm>
-            <a:prstGeom prst="straightConnector1">
-              <a:avLst/>
-            </a:prstGeom>
-            <a:noFill/>
-            <a:ln w="19050" cap="flat" cmpd="sng" algn="ctr">
-              <a:solidFill>
-                <a:srgbClr val="7030A0"/>
-              </a:solidFill>
-              <a:prstDash val="sysDash"/>
-              <a:headEnd type="arrow" w="med" len="med"/>
-              <a:tailEnd type="none" w="med" len="med"/>
-            </a:ln>
-            <a:effectLst/>
-          </p:spPr>
-        </p:cxnSp>
-        <p:cxnSp>
-          <p:nvCxnSpPr>
-            <p:cNvPr id="55" name="Straight Arrow Connector 54">
-              <a:extLst>
-                <a:ext uri="{FF2B5EF4-FFF2-40B4-BE49-F238E27FC236}">
-                  <a16:creationId xmlns:a16="http://schemas.microsoft.com/office/drawing/2014/main" id="{DB645EF0-E9FB-4ACA-A44D-E487CA7CE1A7}"/>
-                </a:ext>
-              </a:extLst>
-            </p:cNvPr>
-            <p:cNvCxnSpPr>
-              <a:cxnSpLocks/>
-            </p:cNvCxnSpPr>
-            <p:nvPr/>
-          </p:nvCxnSpPr>
-          <p:spPr>
-            <a:xfrm>
-              <a:off x="4467265" y="2434307"/>
-              <a:ext cx="1308980" cy="0"/>
-            </a:xfrm>
-            <a:prstGeom prst="straightConnector1">
-              <a:avLst/>
-            </a:prstGeom>
-            <a:noFill/>
-            <a:ln w="19050" cap="flat" cmpd="sng" algn="ctr">
-              <a:solidFill>
-                <a:srgbClr val="0070C0"/>
-              </a:solidFill>
-              <a:prstDash val="solid"/>
-              <a:tailEnd type="arrow"/>
-            </a:ln>
-            <a:effectLst/>
-          </p:spPr>
-        </p:cxnSp>
-        <p:sp>
-          <p:nvSpPr>
-            <p:cNvPr id="49" name="TextBox 48">
-              <a:extLst>
-                <a:ext uri="{FF2B5EF4-FFF2-40B4-BE49-F238E27FC236}">
-                  <a16:creationId xmlns:a16="http://schemas.microsoft.com/office/drawing/2014/main" id="{2181D954-D0EA-4C97-B16D-8A3368C05E7E}"/>
+                  <a16:creationId xmlns:a16="http://schemas.microsoft.com/office/drawing/2014/main" id="{34B2AF23-9788-4A94-99B0-C0F7338D787F}"/>
                 </a:ext>
               </a:extLst>
             </p:cNvPr>
@@ -5587,8 +4707,8 @@
           </p:nvSpPr>
           <p:spPr>
             <a:xfrm>
-              <a:off x="5771441" y="2421481"/>
-              <a:ext cx="1298078" cy="184666"/>
+              <a:off x="325316" y="1020032"/>
+              <a:ext cx="2495490" cy="369332"/>
             </a:xfrm>
             <a:prstGeom prst="rect">
               <a:avLst/>
@@ -5612,46 +4732,20 @@
               </a:lvl1pPr>
             </a:lstStyle>
             <a:p>
-              <a:pPr marL="0" marR="0" lvl="0" indent="0" algn="r" defTabSz="914400" eaLnBrk="1" fontAlgn="auto" latinLnBrk="0" hangingPunct="1">
-                <a:lnSpc>
-                  <a:spcPct val="100000"/>
-                </a:lnSpc>
-                <a:spcBef>
-                  <a:spcPts val="0"/>
-                </a:spcBef>
-                <a:spcAft>
-                  <a:spcPts val="0"/>
-                </a:spcAft>
-                <a:buClrTx/>
-                <a:buSzTx/>
-                <a:buFontTx/>
-                <a:buNone/>
-                <a:tabLst/>
-                <a:defRPr/>
-              </a:pPr>
+              <a:pPr lvl="0"/>
               <a:r>
-                <a:rPr lang="en-US" sz="1200" kern="0" dirty="0" err="1">
-                  <a:solidFill>
-                    <a:srgbClr val="8064A2">
-                      <a:lumMod val="75000"/>
-                    </a:srgbClr>
-                  </a:solidFill>
-                </a:rPr>
-                <a:t>addClub</a:t>
-              </a:r>
-              <a:r>
-                <a:rPr kumimoji="0" lang="en-US" sz="1200" b="0" i="0" u="none" strike="noStrike" kern="0" cap="none" spc="0" normalizeH="0" baseline="0" noProof="0" dirty="0">
+                <a:rPr kumimoji="0" lang="en-US" sz="1200" b="0" i="0" u="none" strike="noStrike" kern="0" cap="none" spc="0" normalizeH="0" baseline="0" noProof="0" dirty="0" err="1">
                   <a:ln>
                     <a:noFill/>
                   </a:ln>
                   <a:solidFill>
-                    <a:srgbClr val="7030A0"/>
+                    <a:srgbClr val="0070C0"/>
                   </a:solidFill>
                   <a:effectLst/>
                   <a:uLnTx/>
                   <a:uFillTx/>
                 </a:rPr>
-                <a:t>(club)</a:t>
+                <a:t>parseCommand</a:t>
               </a:r>
               <a:endParaRPr kumimoji="0" lang="en-US" sz="1200" b="0" i="0" u="none" strike="noStrike" kern="0" cap="none" spc="0" normalizeH="0" baseline="0" noProof="0" dirty="0">
                 <a:ln>
@@ -5665,196 +4759,49 @@
                 <a:uFillTx/>
               </a:endParaRPr>
             </a:p>
+            <a:p>
+              <a:pPr lvl="0"/>
+              <a:r>
+                <a:rPr kumimoji="0" lang="en-US" sz="1200" b="0" i="0" u="none" strike="noStrike" kern="0" cap="none" spc="0" normalizeH="0" baseline="0" noProof="0" dirty="0">
+                  <a:ln>
+                    <a:noFill/>
+                  </a:ln>
+                  <a:solidFill>
+                    <a:srgbClr val="0070C0"/>
+                  </a:solidFill>
+                  <a:effectLst/>
+                  <a:uLnTx/>
+                  <a:uFillTx/>
+                </a:rPr>
+                <a:t>(“</a:t>
+              </a:r>
+              <a:r>
+                <a:rPr lang="en-US" sz="1200" kern="0" dirty="0"/>
+                <a:t>budget input</a:t>
+              </a:r>
+              <a:r>
+                <a:rPr kumimoji="0" lang="en-US" sz="1200" b="0" i="0" u="none" strike="noStrike" kern="0" cap="none" spc="0" normalizeH="0" baseline="0" noProof="0" dirty="0">
+                  <a:ln>
+                    <a:noFill/>
+                  </a:ln>
+                  <a:solidFill>
+                    <a:srgbClr val="0070C0"/>
+                  </a:solidFill>
+                  <a:effectLst/>
+                  <a:uLnTx/>
+                  <a:uFillTx/>
+                </a:rPr>
+                <a:t>”)</a:t>
+              </a:r>
+            </a:p>
           </p:txBody>
         </p:sp>
         <p:sp>
           <p:nvSpPr>
-            <p:cNvPr id="56" name="Rectangle 62">
+            <p:cNvPr id="82" name="TextBox 81">
               <a:extLst>
                 <a:ext uri="{FF2B5EF4-FFF2-40B4-BE49-F238E27FC236}">
-                  <a16:creationId xmlns:a16="http://schemas.microsoft.com/office/drawing/2014/main" id="{8853E9EA-D89D-48B7-AC90-3BB4C08A9423}"/>
-                </a:ext>
-              </a:extLst>
-            </p:cNvPr>
-            <p:cNvSpPr/>
-            <p:nvPr/>
-          </p:nvSpPr>
-          <p:spPr>
-            <a:xfrm>
-              <a:off x="8891821" y="2233733"/>
-              <a:ext cx="2181777" cy="335427"/>
-            </a:xfrm>
-            <a:prstGeom prst="rect">
-              <a:avLst/>
-            </a:prstGeom>
-            <a:solidFill>
-              <a:srgbClr val="7030A0"/>
-            </a:solidFill>
-            <a:ln w="19050" cap="flat" cmpd="sng" algn="ctr">
-              <a:solidFill>
-                <a:srgbClr val="7030A0"/>
-              </a:solidFill>
-              <a:prstDash val="solid"/>
-            </a:ln>
-            <a:effectLst/>
-          </p:spPr>
-          <p:txBody>
-            <a:bodyPr rtlCol="0" anchor="ctr"/>
-            <a:lstStyle/>
-            <a:p>
-              <a:pPr marL="0" marR="0" lvl="0" indent="0" algn="ctr" defTabSz="914400" eaLnBrk="1" fontAlgn="auto" latinLnBrk="0" hangingPunct="1">
-                <a:lnSpc>
-                  <a:spcPct val="100000"/>
-                </a:lnSpc>
-                <a:spcBef>
-                  <a:spcPts val="0"/>
-                </a:spcBef>
-                <a:spcAft>
-                  <a:spcPts val="0"/>
-                </a:spcAft>
-                <a:buClrTx/>
-                <a:buSzTx/>
-                <a:buFontTx/>
-                <a:buNone/>
-                <a:tabLst/>
-                <a:defRPr/>
-              </a:pPr>
-              <a:r>
-                <a:rPr kumimoji="0" lang="en-US" sz="1600" b="0" i="0" u="none" strike="noStrike" kern="0" cap="none" spc="0" normalizeH="0" baseline="0" noProof="0" dirty="0">
-                  <a:ln>
-                    <a:noFill/>
-                  </a:ln>
-                  <a:solidFill>
-                    <a:prstClr val="white"/>
-                  </a:solidFill>
-                  <a:effectLst/>
-                  <a:uLnTx/>
-                  <a:uFillTx/>
-                  <a:latin typeface="Calibri"/>
-                  <a:ea typeface="+mn-ea"/>
-                  <a:cs typeface="+mn-cs"/>
-                </a:rPr>
-                <a:t>:</a:t>
-              </a:r>
-              <a:r>
-                <a:rPr lang="en-US" sz="1600" kern="0" dirty="0" err="1">
-                  <a:solidFill>
-                    <a:prstClr val="white"/>
-                  </a:solidFill>
-                  <a:latin typeface="Calibri"/>
-                </a:rPr>
-                <a:t>UniqueClubsList</a:t>
-              </a:r>
-              <a:endParaRPr kumimoji="0" lang="en-SG" sz="1600" b="0" i="0" u="none" strike="noStrike" kern="0" cap="none" spc="0" normalizeH="0" baseline="0" noProof="0" dirty="0">
-                <a:ln>
-                  <a:noFill/>
-                </a:ln>
-                <a:solidFill>
-                  <a:prstClr val="white"/>
-                </a:solidFill>
-                <a:effectLst/>
-                <a:uLnTx/>
-                <a:uFillTx/>
-                <a:latin typeface="Calibri"/>
-                <a:ea typeface="+mn-ea"/>
-                <a:cs typeface="+mn-cs"/>
-              </a:endParaRPr>
-            </a:p>
-          </p:txBody>
-        </p:sp>
-        <p:cxnSp>
-          <p:nvCxnSpPr>
-            <p:cNvPr id="57" name="Straight Connector 56">
-              <a:extLst>
-                <a:ext uri="{FF2B5EF4-FFF2-40B4-BE49-F238E27FC236}">
-                  <a16:creationId xmlns:a16="http://schemas.microsoft.com/office/drawing/2014/main" id="{98620C22-93D1-4A51-8E5B-6902E679B880}"/>
-                </a:ext>
-              </a:extLst>
-            </p:cNvPr>
-            <p:cNvCxnSpPr>
-              <a:cxnSpLocks/>
-            </p:cNvCxnSpPr>
-            <p:nvPr/>
-          </p:nvCxnSpPr>
-          <p:spPr>
-            <a:xfrm>
-              <a:off x="10076060" y="2527111"/>
-              <a:ext cx="17996" cy="1467648"/>
-            </a:xfrm>
-            <a:prstGeom prst="line">
-              <a:avLst/>
-            </a:prstGeom>
-            <a:gradFill rotWithShape="1">
-              <a:gsLst>
-                <a:gs pos="0">
-                  <a:srgbClr val="4F81BD">
-                    <a:tint val="50000"/>
-                    <a:satMod val="300000"/>
-                  </a:srgbClr>
-                </a:gs>
-                <a:gs pos="35000">
-                  <a:srgbClr val="4F81BD">
-                    <a:tint val="37000"/>
-                    <a:satMod val="300000"/>
-                  </a:srgbClr>
-                </a:gs>
-                <a:gs pos="100000">
-                  <a:srgbClr val="4F81BD">
-                    <a:tint val="15000"/>
-                    <a:satMod val="350000"/>
-                  </a:srgbClr>
-                </a:gs>
-              </a:gsLst>
-              <a:lin ang="16200000" scaled="1"/>
-            </a:gradFill>
-            <a:ln w="19050" cap="flat" cmpd="sng" algn="ctr">
-              <a:solidFill>
-                <a:srgbClr val="7030A0"/>
-              </a:solidFill>
-              <a:prstDash val="sysDash"/>
-            </a:ln>
-            <a:effectLst/>
-          </p:spPr>
-        </p:cxnSp>
-        <p:cxnSp>
-          <p:nvCxnSpPr>
-            <p:cNvPr id="59" name="Straight Arrow Connector 58">
-              <a:extLst>
-                <a:ext uri="{FF2B5EF4-FFF2-40B4-BE49-F238E27FC236}">
-                  <a16:creationId xmlns:a16="http://schemas.microsoft.com/office/drawing/2014/main" id="{DFFCED6F-44CF-4480-9CD0-E8F98714DD42}"/>
-                </a:ext>
-              </a:extLst>
-            </p:cNvPr>
-            <p:cNvCxnSpPr>
-              <a:cxnSpLocks/>
-            </p:cNvCxnSpPr>
-            <p:nvPr/>
-          </p:nvCxnSpPr>
-          <p:spPr>
-            <a:xfrm>
-              <a:off x="7503531" y="2743200"/>
-              <a:ext cx="2558115" cy="0"/>
-            </a:xfrm>
-            <a:prstGeom prst="straightConnector1">
-              <a:avLst/>
-            </a:prstGeom>
-            <a:noFill/>
-            <a:ln w="19050" cap="flat" cmpd="sng" algn="ctr">
-              <a:solidFill>
-                <a:srgbClr val="7030A0"/>
-              </a:solidFill>
-              <a:prstDash val="solid"/>
-              <a:tailEnd type="arrow"/>
-            </a:ln>
-            <a:effectLst/>
-          </p:spPr>
-        </p:cxnSp>
-        <p:sp>
-          <p:nvSpPr>
-            <p:cNvPr id="63" name="TextBox 62">
-              <a:extLst>
-                <a:ext uri="{FF2B5EF4-FFF2-40B4-BE49-F238E27FC236}">
-                  <a16:creationId xmlns:a16="http://schemas.microsoft.com/office/drawing/2014/main" id="{4592A930-4FA8-434D-98F2-12187868844C}"/>
+                  <a16:creationId xmlns:a16="http://schemas.microsoft.com/office/drawing/2014/main" id="{9017EBF7-EBA7-48BF-BC97-0F5FC263D1F1}"/>
                 </a:ext>
               </a:extLst>
             </p:cNvPr>
@@ -5863,181 +4810,7 @@
           </p:nvSpPr>
           <p:spPr>
             <a:xfrm>
-              <a:off x="7414641" y="2525780"/>
-              <a:ext cx="1298078" cy="184666"/>
-            </a:xfrm>
-            <a:prstGeom prst="rect">
-              <a:avLst/>
-            </a:prstGeom>
-            <a:noFill/>
-          </p:spPr>
-          <p:txBody>
-            <a:bodyPr wrap="square" lIns="0" tIns="0" rIns="0" bIns="0" rtlCol="0">
-              <a:spAutoFit/>
-            </a:bodyPr>
-            <a:lstStyle>
-              <a:defPPr>
-                <a:defRPr lang="en-US"/>
-              </a:defPPr>
-              <a:lvl1pPr algn="r">
-                <a:defRPr sz="1400">
-                  <a:solidFill>
-                    <a:srgbClr val="0070C0"/>
-                  </a:solidFill>
-                </a:defRPr>
-              </a:lvl1pPr>
-            </a:lstStyle>
-            <a:p>
-              <a:pPr marL="0" marR="0" lvl="0" indent="0" algn="r" defTabSz="914400" eaLnBrk="1" fontAlgn="auto" latinLnBrk="0" hangingPunct="1">
-                <a:lnSpc>
-                  <a:spcPct val="100000"/>
-                </a:lnSpc>
-                <a:spcBef>
-                  <a:spcPts val="0"/>
-                </a:spcBef>
-                <a:spcAft>
-                  <a:spcPts val="0"/>
-                </a:spcAft>
-                <a:buClrTx/>
-                <a:buSzTx/>
-                <a:buFontTx/>
-                <a:buNone/>
-                <a:tabLst/>
-                <a:defRPr/>
-              </a:pPr>
-              <a:r>
-                <a:rPr lang="en-US" sz="1200" kern="0" dirty="0" err="1">
-                  <a:solidFill>
-                    <a:srgbClr val="8064A2">
-                      <a:lumMod val="75000"/>
-                    </a:srgbClr>
-                  </a:solidFill>
-                </a:rPr>
-                <a:t>addClub</a:t>
-              </a:r>
-              <a:r>
-                <a:rPr kumimoji="0" lang="en-US" sz="1200" b="0" i="0" u="none" strike="noStrike" kern="0" cap="none" spc="0" normalizeH="0" baseline="0" noProof="0" dirty="0">
-                  <a:ln>
-                    <a:noFill/>
-                  </a:ln>
-                  <a:solidFill>
-                    <a:srgbClr val="7030A0"/>
-                  </a:solidFill>
-                  <a:effectLst/>
-                  <a:uLnTx/>
-                  <a:uFillTx/>
-                </a:rPr>
-                <a:t>(c)</a:t>
-              </a:r>
-              <a:endParaRPr kumimoji="0" lang="en-US" sz="1200" b="0" i="0" u="none" strike="noStrike" kern="0" cap="none" spc="0" normalizeH="0" baseline="0" noProof="0" dirty="0">
-                <a:ln>
-                  <a:noFill/>
-                </a:ln>
-                <a:solidFill>
-                  <a:srgbClr val="0070C0"/>
-                </a:solidFill>
-                <a:effectLst/>
-                <a:uLnTx/>
-                <a:uFillTx/>
-              </a:endParaRPr>
-            </a:p>
-          </p:txBody>
-        </p:sp>
-        <p:cxnSp>
-          <p:nvCxnSpPr>
-            <p:cNvPr id="64" name="Straight Arrow Connector 63">
-              <a:extLst>
-                <a:ext uri="{FF2B5EF4-FFF2-40B4-BE49-F238E27FC236}">
-                  <a16:creationId xmlns:a16="http://schemas.microsoft.com/office/drawing/2014/main" id="{9D522352-9BC6-41C5-912F-12EA2C3B4E64}"/>
-                </a:ext>
-              </a:extLst>
-            </p:cNvPr>
-            <p:cNvCxnSpPr>
-              <a:cxnSpLocks/>
-            </p:cNvCxnSpPr>
-            <p:nvPr/>
-          </p:nvCxnSpPr>
-          <p:spPr>
-            <a:xfrm flipV="1">
-              <a:off x="7494533" y="3095894"/>
-              <a:ext cx="2581527" cy="1"/>
-            </a:xfrm>
-            <a:prstGeom prst="straightConnector1">
-              <a:avLst/>
-            </a:prstGeom>
-            <a:noFill/>
-            <a:ln w="19050" cap="flat" cmpd="sng" algn="ctr">
-              <a:solidFill>
-                <a:srgbClr val="7030A0"/>
-              </a:solidFill>
-              <a:prstDash val="sysDash"/>
-              <a:headEnd type="arrow" w="med" len="med"/>
-              <a:tailEnd type="none" w="med" len="med"/>
-            </a:ln>
-            <a:effectLst/>
-          </p:spPr>
-        </p:cxnSp>
-        <p:cxnSp>
-          <p:nvCxnSpPr>
-            <p:cNvPr id="66" name="Straight Arrow Connector 65">
-              <a:extLst>
-                <a:ext uri="{FF2B5EF4-FFF2-40B4-BE49-F238E27FC236}">
-                  <a16:creationId xmlns:a16="http://schemas.microsoft.com/office/drawing/2014/main" id="{5DA15B12-E6FD-4FE6-9667-E6A64A139BBF}"/>
-                </a:ext>
-              </a:extLst>
-            </p:cNvPr>
-            <p:cNvCxnSpPr>
-              <a:cxnSpLocks/>
-            </p:cNvCxnSpPr>
-            <p:nvPr/>
-          </p:nvCxnSpPr>
-          <p:spPr>
-            <a:xfrm>
-              <a:off x="-218807" y="3657600"/>
-              <a:ext cx="4613561" cy="0"/>
-            </a:xfrm>
-            <a:prstGeom prst="straightConnector1">
-              <a:avLst/>
-            </a:prstGeom>
-            <a:ln w="19050">
-              <a:solidFill>
-                <a:srgbClr val="0070C0"/>
-              </a:solidFill>
-              <a:prstDash val="sysDash"/>
-              <a:headEnd type="arrow" w="med" len="med"/>
-              <a:tailEnd type="none" w="med" len="med"/>
-            </a:ln>
-          </p:spPr>
-          <p:style>
-            <a:lnRef idx="1">
-              <a:schemeClr val="accent1"/>
-            </a:lnRef>
-            <a:fillRef idx="0">
-              <a:schemeClr val="accent1"/>
-            </a:fillRef>
-            <a:effectRef idx="0">
-              <a:schemeClr val="accent1"/>
-            </a:effectRef>
-            <a:fontRef idx="minor">
-              <a:schemeClr val="tx1"/>
-            </a:fontRef>
-          </p:style>
-        </p:cxnSp>
-        <p:sp>
-          <p:nvSpPr>
-            <p:cNvPr id="69" name="TextBox 68">
-              <a:extLst>
-                <a:ext uri="{FF2B5EF4-FFF2-40B4-BE49-F238E27FC236}">
-                  <a16:creationId xmlns:a16="http://schemas.microsoft.com/office/drawing/2014/main" id="{4CD56779-7500-4B3A-9FB1-7E3A2E254101}"/>
-                </a:ext>
-              </a:extLst>
-            </p:cNvPr>
-            <p:cNvSpPr txBox="1"/>
-            <p:nvPr/>
-          </p:nvSpPr>
-          <p:spPr>
-            <a:xfrm>
-              <a:off x="1059331" y="3407475"/>
+              <a:off x="645270" y="3945901"/>
               <a:ext cx="762000" cy="215444"/>
             </a:xfrm>
             <a:prstGeom prst="rect">
@@ -6096,12 +4869,85 @@
             </a:p>
           </p:txBody>
         </p:sp>
+        <p:sp>
+          <p:nvSpPr>
+            <p:cNvPr id="84" name="TextBox 83">
+              <a:extLst>
+                <a:ext uri="{FF2B5EF4-FFF2-40B4-BE49-F238E27FC236}">
+                  <a16:creationId xmlns:a16="http://schemas.microsoft.com/office/drawing/2014/main" id="{1334DCA1-7E06-44EA-AA6C-7D7034CB027B}"/>
+                </a:ext>
+              </a:extLst>
+            </p:cNvPr>
+            <p:cNvSpPr txBox="1"/>
+            <p:nvPr/>
+          </p:nvSpPr>
+          <p:spPr>
+            <a:xfrm>
+              <a:off x="1877103" y="2226109"/>
+              <a:ext cx="606361" cy="215444"/>
+            </a:xfrm>
+            <a:prstGeom prst="rect">
+              <a:avLst/>
+            </a:prstGeom>
+            <a:noFill/>
+          </p:spPr>
+          <p:txBody>
+            <a:bodyPr wrap="square" lIns="0" tIns="0" rIns="0" bIns="0" rtlCol="0">
+              <a:spAutoFit/>
+            </a:bodyPr>
+            <a:lstStyle>
+              <a:defPPr>
+                <a:defRPr lang="en-US"/>
+              </a:defPPr>
+              <a:lvl1pPr algn="r">
+                <a:defRPr sz="1400">
+                  <a:solidFill>
+                    <a:srgbClr val="0070C0"/>
+                  </a:solidFill>
+                </a:defRPr>
+              </a:lvl1pPr>
+            </a:lstStyle>
+            <a:p>
+              <a:pPr marL="0" marR="0" lvl="0" indent="0" algn="r" defTabSz="914400" eaLnBrk="1" fontAlgn="auto" latinLnBrk="0" hangingPunct="1">
+                <a:lnSpc>
+                  <a:spcPct val="100000"/>
+                </a:lnSpc>
+                <a:spcBef>
+                  <a:spcPts val="0"/>
+                </a:spcBef>
+                <a:spcAft>
+                  <a:spcPts val="0"/>
+                </a:spcAft>
+                <a:buClrTx/>
+                <a:buSzTx/>
+                <a:buFontTx/>
+                <a:buNone/>
+                <a:tabLst/>
+                <a:defRPr/>
+              </a:pPr>
+              <a:r>
+                <a:rPr kumimoji="0" lang="en-US" sz="1400" b="0" i="0" u="none" strike="noStrike" kern="0" cap="none" spc="0" normalizeH="0" baseline="0" noProof="0" dirty="0">
+                  <a:ln>
+                    <a:noFill/>
+                  </a:ln>
+                  <a:solidFill>
+                    <a:srgbClr val="0070C0"/>
+                  </a:solidFill>
+                  <a:effectLst/>
+                  <a:uLnTx/>
+                  <a:uFillTx/>
+                </a:rPr>
+                <a:t>u</a:t>
+              </a:r>
+            </a:p>
+          </p:txBody>
+        </p:sp>
         <p:cxnSp>
           <p:nvCxnSpPr>
-            <p:cNvPr id="70" name="Straight Arrow Connector 69">
+            <p:cNvPr id="88" name="Straight Arrow Connector 87">
               <a:extLst>
                 <a:ext uri="{FF2B5EF4-FFF2-40B4-BE49-F238E27FC236}">
-                  <a16:creationId xmlns:a16="http://schemas.microsoft.com/office/drawing/2014/main" id="{EE747B88-FBBC-4489-9593-39719093EE30}"/>
+                  <a16:creationId xmlns:a16="http://schemas.microsoft.com/office/drawing/2014/main" id="{7561E11F-C0D7-448D-B61F-8559B00DDAB7}"/>
                 </a:ext>
               </a:extLst>
             </p:cNvPr>
@@ -6112,8 +4958,486 @@
           </p:nvCxnSpPr>
           <p:spPr>
             <a:xfrm>
-              <a:off x="-1371600" y="3832357"/>
-              <a:ext cx="1082517" cy="0"/>
+              <a:off x="5685755" y="2975344"/>
+              <a:ext cx="1847919" cy="0"/>
+            </a:xfrm>
+            <a:prstGeom prst="straightConnector1">
+              <a:avLst/>
+            </a:prstGeom>
+            <a:noFill/>
+            <a:ln w="19050" cap="flat" cmpd="sng" algn="ctr">
+              <a:solidFill>
+                <a:srgbClr val="0070C0"/>
+              </a:solidFill>
+              <a:prstDash val="solid"/>
+              <a:tailEnd type="arrow"/>
+            </a:ln>
+            <a:effectLst/>
+          </p:spPr>
+        </p:cxnSp>
+        <p:sp>
+          <p:nvSpPr>
+            <p:cNvPr id="89" name="Rectangle 62">
+              <a:extLst>
+                <a:ext uri="{FF2B5EF4-FFF2-40B4-BE49-F238E27FC236}">
+                  <a16:creationId xmlns:a16="http://schemas.microsoft.com/office/drawing/2014/main" id="{82841891-9F6B-40B2-B6C2-EEB903AAAFF9}"/>
+                </a:ext>
+              </a:extLst>
+            </p:cNvPr>
+            <p:cNvSpPr/>
+            <p:nvPr/>
+          </p:nvSpPr>
+          <p:spPr>
+            <a:xfrm>
+              <a:off x="5057088" y="794317"/>
+              <a:ext cx="1093635" cy="461538"/>
+            </a:xfrm>
+            <a:prstGeom prst="rect">
+              <a:avLst/>
+            </a:prstGeom>
+            <a:solidFill>
+              <a:srgbClr val="0070C0"/>
+            </a:solidFill>
+            <a:ln w="19050" cap="flat" cmpd="sng" algn="ctr">
+              <a:solidFill>
+                <a:srgbClr val="0070C0"/>
+              </a:solidFill>
+              <a:prstDash val="solid"/>
+            </a:ln>
+            <a:effectLst/>
+          </p:spPr>
+          <p:txBody>
+            <a:bodyPr rtlCol="0" anchor="ctr"/>
+            <a:lstStyle/>
+            <a:p>
+              <a:pPr marL="0" marR="0" lvl="0" indent="0" algn="ctr" defTabSz="914400" eaLnBrk="1" fontAlgn="auto" latinLnBrk="0" hangingPunct="1">
+                <a:lnSpc>
+                  <a:spcPct val="100000"/>
+                </a:lnSpc>
+                <a:spcBef>
+                  <a:spcPts val="0"/>
+                </a:spcBef>
+                <a:spcAft>
+                  <a:spcPts val="0"/>
+                </a:spcAft>
+                <a:buClrTx/>
+                <a:buSzTx/>
+                <a:buFontTx/>
+                <a:buNone/>
+                <a:tabLst/>
+                <a:defRPr/>
+              </a:pPr>
+              <a:r>
+                <a:rPr kumimoji="0" lang="en-US" sz="1600" b="0" i="0" u="none" strike="noStrike" kern="0" cap="none" spc="0" normalizeH="0" baseline="0" noProof="0" dirty="0">
+                  <a:ln>
+                    <a:noFill/>
+                  </a:ln>
+                  <a:solidFill>
+                    <a:prstClr val="white"/>
+                  </a:solidFill>
+                  <a:effectLst/>
+                  <a:uLnTx/>
+                  <a:uFillTx/>
+                  <a:latin typeface="Calibri"/>
+                  <a:ea typeface="+mn-ea"/>
+                  <a:cs typeface="+mn-cs"/>
+                </a:rPr>
+                <a:t>:Budget</a:t>
+              </a:r>
+              <a:br>
+                <a:rPr kumimoji="0" lang="en-US" sz="1600" b="0" i="0" u="none" strike="noStrike" kern="0" cap="none" spc="0" normalizeH="0" baseline="0" noProof="0" dirty="0">
+                  <a:ln>
+                    <a:noFill/>
+                  </a:ln>
+                  <a:solidFill>
+                    <a:prstClr val="white"/>
+                  </a:solidFill>
+                  <a:effectLst/>
+                  <a:uLnTx/>
+                  <a:uFillTx/>
+                  <a:latin typeface="Calibri"/>
+                  <a:ea typeface="+mn-ea"/>
+                  <a:cs typeface="+mn-cs"/>
+                </a:rPr>
+              </a:br>
+              <a:r>
+                <a:rPr kumimoji="0" lang="en-US" sz="1600" b="0" i="0" u="none" strike="noStrike" kern="0" cap="none" spc="0" normalizeH="0" baseline="0" noProof="0" dirty="0">
+                  <a:ln>
+                    <a:noFill/>
+                  </a:ln>
+                  <a:solidFill>
+                    <a:prstClr val="white"/>
+                  </a:solidFill>
+                  <a:effectLst/>
+                  <a:uLnTx/>
+                  <a:uFillTx/>
+                  <a:latin typeface="Calibri"/>
+                  <a:ea typeface="+mn-ea"/>
+                  <a:cs typeface="+mn-cs"/>
+                </a:rPr>
+                <a:t>Command</a:t>
+              </a:r>
+              <a:endParaRPr kumimoji="0" lang="en-SG" sz="1600" b="0" i="0" u="none" strike="noStrike" kern="0" cap="none" spc="0" normalizeH="0" baseline="0" noProof="0" dirty="0">
+                <a:ln>
+                  <a:noFill/>
+                </a:ln>
+                <a:solidFill>
+                  <a:prstClr val="white"/>
+                </a:solidFill>
+                <a:effectLst/>
+                <a:uLnTx/>
+                <a:uFillTx/>
+                <a:latin typeface="Calibri"/>
+                <a:ea typeface="+mn-ea"/>
+                <a:cs typeface="+mn-cs"/>
+              </a:endParaRPr>
+            </a:p>
+          </p:txBody>
+        </p:sp>
+        <p:cxnSp>
+          <p:nvCxnSpPr>
+            <p:cNvPr id="90" name="Straight Arrow Connector 89">
+              <a:extLst>
+                <a:ext uri="{FF2B5EF4-FFF2-40B4-BE49-F238E27FC236}">
+                  <a16:creationId xmlns:a16="http://schemas.microsoft.com/office/drawing/2014/main" id="{88522D9A-9D25-49E4-A890-D30322A0BED5}"/>
+                </a:ext>
+              </a:extLst>
+            </p:cNvPr>
+            <p:cNvCxnSpPr>
+              <a:cxnSpLocks/>
+            </p:cNvCxnSpPr>
+            <p:nvPr/>
+          </p:nvCxnSpPr>
+          <p:spPr>
+            <a:xfrm>
+              <a:off x="1691351" y="2731314"/>
+              <a:ext cx="3832164" cy="1"/>
+            </a:xfrm>
+            <a:prstGeom prst="straightConnector1">
+              <a:avLst/>
+            </a:prstGeom>
+            <a:noFill/>
+            <a:ln w="19050" cap="flat" cmpd="sng" algn="ctr">
+              <a:solidFill>
+                <a:srgbClr val="0070C0"/>
+              </a:solidFill>
+              <a:prstDash val="solid"/>
+              <a:tailEnd type="arrow"/>
+            </a:ln>
+            <a:effectLst/>
+          </p:spPr>
+        </p:cxnSp>
+        <p:cxnSp>
+          <p:nvCxnSpPr>
+            <p:cNvPr id="91" name="Straight Arrow Connector 90">
+              <a:extLst>
+                <a:ext uri="{FF2B5EF4-FFF2-40B4-BE49-F238E27FC236}">
+                  <a16:creationId xmlns:a16="http://schemas.microsoft.com/office/drawing/2014/main" id="{D18A722C-280B-42A2-9699-154FC167FB84}"/>
+                </a:ext>
+              </a:extLst>
+            </p:cNvPr>
+            <p:cNvCxnSpPr>
+              <a:cxnSpLocks/>
+            </p:cNvCxnSpPr>
+            <p:nvPr/>
+          </p:nvCxnSpPr>
+          <p:spPr>
+            <a:xfrm>
+              <a:off x="1709096" y="1420585"/>
+              <a:ext cx="1284096" cy="0"/>
+            </a:xfrm>
+            <a:prstGeom prst="straightConnector1">
+              <a:avLst/>
+            </a:prstGeom>
+            <a:noFill/>
+            <a:ln w="19050" cap="flat" cmpd="sng" algn="ctr">
+              <a:solidFill>
+                <a:srgbClr val="0070C0"/>
+              </a:solidFill>
+              <a:prstDash val="solid"/>
+              <a:tailEnd type="arrow"/>
+            </a:ln>
+            <a:effectLst/>
+          </p:spPr>
+        </p:cxnSp>
+        <p:grpSp>
+          <p:nvGrpSpPr>
+            <p:cNvPr id="92" name="Group 91">
+              <a:extLst>
+                <a:ext uri="{FF2B5EF4-FFF2-40B4-BE49-F238E27FC236}">
+                  <a16:creationId xmlns:a16="http://schemas.microsoft.com/office/drawing/2014/main" id="{E0ECC221-3028-4E89-A278-209FE99E19C2}"/>
+                </a:ext>
+              </a:extLst>
+            </p:cNvPr>
+            <p:cNvGrpSpPr/>
+            <p:nvPr/>
+          </p:nvGrpSpPr>
+          <p:grpSpPr>
+            <a:xfrm>
+              <a:off x="1691998" y="3791076"/>
+              <a:ext cx="3831517" cy="245386"/>
+              <a:chOff x="1691998" y="3791076"/>
+              <a:chExt cx="3831517" cy="245386"/>
+            </a:xfrm>
+          </p:grpSpPr>
+          <p:sp>
+            <p:nvSpPr>
+              <p:cNvPr id="93" name="TextBox 92">
+                <a:extLst>
+                  <a:ext uri="{FF2B5EF4-FFF2-40B4-BE49-F238E27FC236}">
+                    <a16:creationId xmlns:a16="http://schemas.microsoft.com/office/drawing/2014/main" id="{B4EDC3A8-C05E-4255-A06D-CF36D0953E26}"/>
+                  </a:ext>
+                </a:extLst>
+              </p:cNvPr>
+              <p:cNvSpPr txBox="1"/>
+              <p:nvPr/>
+            </p:nvSpPr>
+            <p:spPr>
+              <a:xfrm>
+                <a:off x="3272755" y="3791076"/>
+                <a:ext cx="621216" cy="215444"/>
+              </a:xfrm>
+              <a:prstGeom prst="rect">
+                <a:avLst/>
+              </a:prstGeom>
+              <a:noFill/>
+            </p:spPr>
+            <p:txBody>
+              <a:bodyPr wrap="square" lIns="0" tIns="0" rIns="0" bIns="0" rtlCol="0">
+                <a:spAutoFit/>
+              </a:bodyPr>
+              <a:lstStyle>
+                <a:defPPr>
+                  <a:defRPr lang="en-US"/>
+                </a:defPPr>
+                <a:lvl1pPr algn="r">
+                  <a:defRPr sz="1400">
+                    <a:solidFill>
+                      <a:srgbClr val="0070C0"/>
+                    </a:solidFill>
+                  </a:defRPr>
+                </a:lvl1pPr>
+              </a:lstStyle>
+              <a:p>
+                <a:pPr marL="0" marR="0" lvl="0" indent="0" algn="r" defTabSz="914400" eaLnBrk="1" fontAlgn="auto" latinLnBrk="0" hangingPunct="1">
+                  <a:lnSpc>
+                    <a:spcPct val="100000"/>
+                  </a:lnSpc>
+                  <a:spcBef>
+                    <a:spcPts val="0"/>
+                  </a:spcBef>
+                  <a:spcAft>
+                    <a:spcPts val="0"/>
+                  </a:spcAft>
+                  <a:buClrTx/>
+                  <a:buSzTx/>
+                  <a:buFontTx/>
+                  <a:buNone/>
+                  <a:tabLst/>
+                  <a:defRPr/>
+                </a:pPr>
+                <a:r>
+                  <a:rPr kumimoji="0" lang="en-US" sz="1400" b="0" i="0" u="none" strike="noStrike" kern="0" cap="none" spc="0" normalizeH="0" baseline="0" noProof="0" dirty="0">
+                    <a:ln>
+                      <a:noFill/>
+                    </a:ln>
+                    <a:solidFill>
+                      <a:srgbClr val="0070C0"/>
+                    </a:solidFill>
+                    <a:effectLst/>
+                    <a:uLnTx/>
+                    <a:uFillTx/>
+                  </a:rPr>
+                  <a:t>result</a:t>
+                </a:r>
+              </a:p>
+            </p:txBody>
+          </p:sp>
+          <p:cxnSp>
+            <p:nvCxnSpPr>
+              <p:cNvPr id="94" name="Straight Arrow Connector 93">
+                <a:extLst>
+                  <a:ext uri="{FF2B5EF4-FFF2-40B4-BE49-F238E27FC236}">
+                    <a16:creationId xmlns:a16="http://schemas.microsoft.com/office/drawing/2014/main" id="{9F843F8A-80DA-411C-9BB6-9316399DA84E}"/>
+                  </a:ext>
+                </a:extLst>
+              </p:cNvPr>
+              <p:cNvCxnSpPr>
+                <a:cxnSpLocks/>
+              </p:cNvCxnSpPr>
+              <p:nvPr/>
+            </p:nvCxnSpPr>
+            <p:spPr>
+              <a:xfrm>
+                <a:off x="1691998" y="4036462"/>
+                <a:ext cx="3831517" cy="0"/>
+              </a:xfrm>
+              <a:prstGeom prst="straightConnector1">
+                <a:avLst/>
+              </a:prstGeom>
+              <a:noFill/>
+              <a:ln w="19050" cap="flat" cmpd="sng" algn="ctr">
+                <a:solidFill>
+                  <a:srgbClr val="0070C0"/>
+                </a:solidFill>
+                <a:prstDash val="sysDash"/>
+                <a:headEnd type="arrow" w="med" len="med"/>
+                <a:tailEnd type="none" w="med" len="med"/>
+              </a:ln>
+              <a:effectLst/>
+            </p:spPr>
+          </p:cxnSp>
+        </p:grpSp>
+        <p:cxnSp>
+          <p:nvCxnSpPr>
+            <p:cNvPr id="101" name="Straight Arrow Connector 100">
+              <a:extLst>
+                <a:ext uri="{FF2B5EF4-FFF2-40B4-BE49-F238E27FC236}">
+                  <a16:creationId xmlns:a16="http://schemas.microsoft.com/office/drawing/2014/main" id="{42CFB2C0-CE03-4C5C-9138-B6275F25EDE5}"/>
+                </a:ext>
+              </a:extLst>
+            </p:cNvPr>
+            <p:cNvCxnSpPr>
+              <a:cxnSpLocks/>
+              <a:endCxn id="87" idx="2"/>
+            </p:cNvCxnSpPr>
+            <p:nvPr/>
+          </p:nvCxnSpPr>
+          <p:spPr>
+            <a:xfrm>
+              <a:off x="5682296" y="3701430"/>
+              <a:ext cx="1935826" cy="0"/>
+            </a:xfrm>
+            <a:prstGeom prst="straightConnector1">
+              <a:avLst/>
+            </a:prstGeom>
+            <a:noFill/>
+            <a:ln w="19050" cap="flat" cmpd="sng" algn="ctr">
+              <a:solidFill>
+                <a:srgbClr val="7030A0"/>
+              </a:solidFill>
+              <a:prstDash val="sysDash"/>
+              <a:headEnd type="arrow" w="med" len="med"/>
+              <a:tailEnd type="none" w="med" len="med"/>
+            </a:ln>
+            <a:effectLst/>
+          </p:spPr>
+        </p:cxnSp>
+        <p:sp>
+          <p:nvSpPr>
+            <p:cNvPr id="102" name="Rectangle 101">
+              <a:extLst>
+                <a:ext uri="{FF2B5EF4-FFF2-40B4-BE49-F238E27FC236}">
+                  <a16:creationId xmlns:a16="http://schemas.microsoft.com/office/drawing/2014/main" id="{85F8F1C4-47B3-499B-AD06-A6CB52442977}"/>
+                </a:ext>
+              </a:extLst>
+            </p:cNvPr>
+            <p:cNvSpPr/>
+            <p:nvPr/>
+          </p:nvSpPr>
+          <p:spPr>
+            <a:xfrm>
+              <a:off x="4299036" y="1408007"/>
+              <a:ext cx="196627" cy="952052"/>
+            </a:xfrm>
+            <a:prstGeom prst="rect">
+              <a:avLst/>
+            </a:prstGeom>
+            <a:solidFill>
+              <a:srgbClr val="0070C0"/>
+            </a:solidFill>
+            <a:ln>
+              <a:solidFill>
+                <a:srgbClr val="0070C0"/>
+              </a:solidFill>
+            </a:ln>
+            <a:effectLst/>
+          </p:spPr>
+          <p:style>
+            <a:lnRef idx="1">
+              <a:schemeClr val="accent3"/>
+            </a:lnRef>
+            <a:fillRef idx="2">
+              <a:schemeClr val="accent3"/>
+            </a:fillRef>
+            <a:effectRef idx="1">
+              <a:schemeClr val="accent3"/>
+            </a:effectRef>
+            <a:fontRef idx="minor">
+              <a:schemeClr val="dk1"/>
+            </a:fontRef>
+          </p:style>
+          <p:txBody>
+            <a:bodyPr rtlCol="0" anchor="ctr"/>
+            <a:lstStyle/>
+            <a:p>
+              <a:pPr algn="ctr"/>
+              <a:endParaRPr lang="en-SG" sz="1400"/>
+            </a:p>
+          </p:txBody>
+        </p:sp>
+        <p:cxnSp>
+          <p:nvCxnSpPr>
+            <p:cNvPr id="103" name="Straight Arrow Connector 102">
+              <a:extLst>
+                <a:ext uri="{FF2B5EF4-FFF2-40B4-BE49-F238E27FC236}">
+                  <a16:creationId xmlns:a16="http://schemas.microsoft.com/office/drawing/2014/main" id="{3ADE4606-5A10-49F9-B6A8-6211F439A617}"/>
+                </a:ext>
+              </a:extLst>
+            </p:cNvPr>
+            <p:cNvCxnSpPr>
+              <a:cxnSpLocks/>
+            </p:cNvCxnSpPr>
+            <p:nvPr/>
+          </p:nvCxnSpPr>
+          <p:spPr>
+            <a:xfrm flipV="1">
+              <a:off x="3087516" y="1419411"/>
+              <a:ext cx="1198120" cy="1"/>
+            </a:xfrm>
+            <a:prstGeom prst="straightConnector1">
+              <a:avLst/>
+            </a:prstGeom>
+            <a:ln w="19050">
+              <a:solidFill>
+                <a:srgbClr val="0070C0"/>
+              </a:solidFill>
+              <a:tailEnd type="arrow"/>
+            </a:ln>
+          </p:spPr>
+          <p:style>
+            <a:lnRef idx="1">
+              <a:schemeClr val="accent1"/>
+            </a:lnRef>
+            <a:fillRef idx="0">
+              <a:schemeClr val="accent1"/>
+            </a:fillRef>
+            <a:effectRef idx="0">
+              <a:schemeClr val="accent1"/>
+            </a:effectRef>
+            <a:fontRef idx="minor">
+              <a:schemeClr val="tx1"/>
+            </a:fontRef>
+          </p:style>
+        </p:cxnSp>
+        <p:cxnSp>
+          <p:nvCxnSpPr>
+            <p:cNvPr id="104" name="Straight Arrow Connector 103">
+              <a:extLst>
+                <a:ext uri="{FF2B5EF4-FFF2-40B4-BE49-F238E27FC236}">
+                  <a16:creationId xmlns:a16="http://schemas.microsoft.com/office/drawing/2014/main" id="{0A1DE569-3892-4001-B925-B7C35DFB3FA7}"/>
+                </a:ext>
+              </a:extLst>
+            </p:cNvPr>
+            <p:cNvCxnSpPr>
+              <a:cxnSpLocks/>
+            </p:cNvCxnSpPr>
+            <p:nvPr/>
+          </p:nvCxnSpPr>
+          <p:spPr>
+            <a:xfrm>
+              <a:off x="3130530" y="2362200"/>
+              <a:ext cx="1168506" cy="0"/>
             </a:xfrm>
             <a:prstGeom prst="straightConnector1">
               <a:avLst/>
@@ -6144,10 +5468,10 @@
         </p:cxnSp>
         <p:sp>
           <p:nvSpPr>
-            <p:cNvPr id="16" name="Rectangle 15">
+            <p:cNvPr id="106" name="Rectangle 62">
               <a:extLst>
                 <a:ext uri="{FF2B5EF4-FFF2-40B4-BE49-F238E27FC236}">
-                  <a16:creationId xmlns:a16="http://schemas.microsoft.com/office/drawing/2014/main" id="{E4FBAC76-8EC1-4F4C-832A-764E6F2441A6}"/>
+                  <a16:creationId xmlns:a16="http://schemas.microsoft.com/office/drawing/2014/main" id="{65A4AF51-9D63-4273-B29B-7687C49D8405}"/>
                 </a:ext>
               </a:extLst>
             </p:cNvPr>
@@ -6156,62 +5480,1410 @@
           </p:nvSpPr>
           <p:spPr>
             <a:xfrm>
-              <a:off x="-1128598" y="3472934"/>
-              <a:ext cx="604653" cy="307777"/>
+              <a:off x="3771832" y="219852"/>
+              <a:ext cx="1188390" cy="1036003"/>
             </a:xfrm>
             <a:prstGeom prst="rect">
               <a:avLst/>
             </a:prstGeom>
+            <a:solidFill>
+              <a:srgbClr val="0070C0"/>
+            </a:solidFill>
+            <a:ln w="19050">
+              <a:solidFill>
+                <a:srgbClr val="0070C0"/>
+              </a:solidFill>
+            </a:ln>
+            <a:effectLst/>
+          </p:spPr>
+          <p:style>
+            <a:lnRef idx="1">
+              <a:schemeClr val="accent2"/>
+            </a:lnRef>
+            <a:fillRef idx="2">
+              <a:schemeClr val="accent2"/>
+            </a:fillRef>
+            <a:effectRef idx="1">
+              <a:schemeClr val="accent2"/>
+            </a:effectRef>
+            <a:fontRef idx="minor">
+              <a:schemeClr val="dk1"/>
+            </a:fontRef>
+          </p:style>
+          <p:txBody>
+            <a:bodyPr rtlCol="0" anchor="ctr"/>
+            <a:lstStyle/>
+            <a:p>
+              <a:pPr algn="ctr"/>
+              <a:r>
+                <a:rPr lang="en-US" sz="1600" dirty="0">
+                  <a:solidFill>
+                    <a:schemeClr val="bg1"/>
+                  </a:solidFill>
+                </a:rPr>
+                <a:t>:Budget</a:t>
+              </a:r>
+            </a:p>
+            <a:p>
+              <a:pPr algn="ctr"/>
+              <a:r>
+                <a:rPr lang="en-US" sz="1600" dirty="0">
+                  <a:solidFill>
+                    <a:schemeClr val="bg1"/>
+                  </a:solidFill>
+                </a:rPr>
+                <a:t>Command</a:t>
+              </a:r>
+            </a:p>
+            <a:p>
+              <a:pPr algn="ctr"/>
+              <a:r>
+                <a:rPr lang="en-US" sz="1600" dirty="0">
+                  <a:solidFill>
+                    <a:schemeClr val="bg1"/>
+                  </a:solidFill>
+                </a:rPr>
+                <a:t>Parser</a:t>
+              </a:r>
+              <a:endParaRPr lang="en-SG" sz="1600" dirty="0">
+                <a:solidFill>
+                  <a:schemeClr val="bg1"/>
+                </a:solidFill>
+              </a:endParaRPr>
+            </a:p>
+          </p:txBody>
+        </p:sp>
+        <p:cxnSp>
+          <p:nvCxnSpPr>
+            <p:cNvPr id="108" name="Straight Connector 107">
+              <a:extLst>
+                <a:ext uri="{FF2B5EF4-FFF2-40B4-BE49-F238E27FC236}">
+                  <a16:creationId xmlns:a16="http://schemas.microsoft.com/office/drawing/2014/main" id="{C4092920-534A-4B6A-BF39-1477843C56F3}"/>
+                </a:ext>
+              </a:extLst>
+            </p:cNvPr>
+            <p:cNvCxnSpPr>
+              <a:cxnSpLocks/>
+            </p:cNvCxnSpPr>
+            <p:nvPr/>
+          </p:nvCxnSpPr>
+          <p:spPr>
+            <a:xfrm>
+              <a:off x="4375291" y="1257233"/>
+              <a:ext cx="8272" cy="1228216"/>
+            </a:xfrm>
+            <a:prstGeom prst="line">
+              <a:avLst/>
+            </a:prstGeom>
+            <a:gradFill rotWithShape="1">
+              <a:gsLst>
+                <a:gs pos="0">
+                  <a:srgbClr val="4F81BD">
+                    <a:tint val="50000"/>
+                    <a:satMod val="300000"/>
+                  </a:srgbClr>
+                </a:gs>
+                <a:gs pos="35000">
+                  <a:srgbClr val="4F81BD">
+                    <a:tint val="37000"/>
+                    <a:satMod val="300000"/>
+                  </a:srgbClr>
+                </a:gs>
+                <a:gs pos="100000">
+                  <a:srgbClr val="4F81BD">
+                    <a:tint val="15000"/>
+                    <a:satMod val="350000"/>
+                  </a:srgbClr>
+                </a:gs>
+              </a:gsLst>
+              <a:lin ang="16200000" scaled="1"/>
+            </a:gradFill>
+            <a:ln w="19050" cap="flat" cmpd="sng" algn="ctr">
+              <a:solidFill>
+                <a:srgbClr val="0070C0"/>
+              </a:solidFill>
+              <a:prstDash val="sysDash"/>
+            </a:ln>
+            <a:effectLst/>
+          </p:spPr>
+        </p:cxnSp>
+        <p:sp>
+          <p:nvSpPr>
+            <p:cNvPr id="110" name="TextBox 109">
+              <a:extLst>
+                <a:ext uri="{FF2B5EF4-FFF2-40B4-BE49-F238E27FC236}">
+                  <a16:creationId xmlns:a16="http://schemas.microsoft.com/office/drawing/2014/main" id="{E78837E9-ED38-418A-B4A8-65101F8C9FC6}"/>
+                </a:ext>
+              </a:extLst>
+            </p:cNvPr>
+            <p:cNvSpPr txBox="1"/>
+            <p:nvPr/>
+          </p:nvSpPr>
+          <p:spPr>
+            <a:xfrm>
+              <a:off x="2277404" y="1229067"/>
+              <a:ext cx="1830992" cy="215444"/>
+            </a:xfrm>
+            <a:prstGeom prst="rect">
+              <a:avLst/>
+            </a:prstGeom>
+            <a:noFill/>
           </p:spPr>
           <p:txBody>
-            <a:bodyPr wrap="none">
+            <a:bodyPr wrap="square" lIns="0" tIns="0" rIns="0" bIns="0" rtlCol="0">
               <a:spAutoFit/>
             </a:bodyPr>
-            <a:lstStyle/>
-            <a:p>
-              <a:r>
-                <a:rPr lang="en-US" sz="1400" kern="0" dirty="0">
+            <a:lstStyle>
+              <a:defPPr>
+                <a:defRPr lang="en-US"/>
+              </a:defPPr>
+              <a:lvl1pPr algn="r">
+                <a:defRPr sz="1400">
                   <a:solidFill>
                     <a:srgbClr val="0070C0"/>
                   </a:solidFill>
-                </a:rPr>
-                <a:t>result</a:t>
+                </a:defRPr>
+              </a:lvl1pPr>
+            </a:lstStyle>
+            <a:p>
+              <a:r>
+                <a:rPr lang="en-US" dirty="0"/>
+                <a:t>parse (input)</a:t>
               </a:r>
-              <a:endParaRPr lang="en-SG" dirty="0"/>
             </a:p>
           </p:txBody>
         </p:sp>
+        <p:sp>
+          <p:nvSpPr>
+            <p:cNvPr id="111" name="TextBox 110">
+              <a:extLst>
+                <a:ext uri="{FF2B5EF4-FFF2-40B4-BE49-F238E27FC236}">
+                  <a16:creationId xmlns:a16="http://schemas.microsoft.com/office/drawing/2014/main" id="{C408F701-B6FB-417A-AA28-5B585CAA4B11}"/>
+                </a:ext>
+              </a:extLst>
+            </p:cNvPr>
+            <p:cNvSpPr txBox="1"/>
+            <p:nvPr/>
+          </p:nvSpPr>
+          <p:spPr>
+            <a:xfrm>
+              <a:off x="5751632" y="2790678"/>
+              <a:ext cx="989196" cy="184666"/>
+            </a:xfrm>
+            <a:prstGeom prst="rect">
+              <a:avLst/>
+            </a:prstGeom>
+            <a:noFill/>
+            <a:ln>
+              <a:noFill/>
+            </a:ln>
+          </p:spPr>
+          <p:txBody>
+            <a:bodyPr wrap="square" lIns="0" tIns="0" rIns="0" bIns="0" rtlCol="0">
+              <a:spAutoFit/>
+            </a:bodyPr>
+            <a:lstStyle>
+              <a:defPPr>
+                <a:defRPr lang="en-US"/>
+              </a:defPPr>
+              <a:lvl1pPr algn="r">
+                <a:defRPr sz="1400">
+                  <a:solidFill>
+                    <a:srgbClr val="0070C0"/>
+                  </a:solidFill>
+                </a:defRPr>
+              </a:lvl1pPr>
+            </a:lstStyle>
+            <a:p>
+              <a:pPr marL="0" marR="0" lvl="0" indent="0" algn="r" defTabSz="914400" eaLnBrk="1" fontAlgn="auto" latinLnBrk="0" hangingPunct="1">
+                <a:lnSpc>
+                  <a:spcPct val="100000"/>
+                </a:lnSpc>
+                <a:spcBef>
+                  <a:spcPts val="0"/>
+                </a:spcBef>
+                <a:spcAft>
+                  <a:spcPts val="0"/>
+                </a:spcAft>
+                <a:buClrTx/>
+                <a:buSzTx/>
+                <a:buFontTx/>
+                <a:buNone/>
+                <a:tabLst/>
+                <a:defRPr/>
+              </a:pPr>
+              <a:r>
+                <a:rPr lang="en-US" sz="1200" kern="0" dirty="0" err="1">
+                  <a:solidFill>
+                    <a:srgbClr val="7030A0"/>
+                  </a:solidFill>
+                </a:rPr>
+                <a:t>addClub</a:t>
+              </a:r>
+              <a:r>
+                <a:rPr kumimoji="0" lang="en-US" sz="1200" b="0" i="0" u="none" strike="noStrike" kern="0" cap="none" spc="0" normalizeH="0" baseline="0" noProof="0" dirty="0">
+                  <a:ln>
+                    <a:noFill/>
+                  </a:ln>
+                  <a:solidFill>
+                    <a:srgbClr val="8064A2">
+                      <a:lumMod val="75000"/>
+                    </a:srgbClr>
+                  </a:solidFill>
+                  <a:effectLst/>
+                  <a:uLnTx/>
+                  <a:uFillTx/>
+                </a:rPr>
+                <a:t>(</a:t>
+              </a:r>
+              <a:r>
+                <a:rPr kumimoji="0" lang="en-US" sz="1200" b="0" i="0" u="none" strike="noStrike" kern="0" cap="none" spc="0" normalizeH="0" baseline="0" noProof="0" dirty="0" err="1">
+                  <a:ln>
+                    <a:noFill/>
+                  </a:ln>
+                  <a:solidFill>
+                    <a:srgbClr val="8064A2">
+                      <a:lumMod val="75000"/>
+                    </a:srgbClr>
+                  </a:solidFill>
+                  <a:effectLst/>
+                  <a:uLnTx/>
+                  <a:uFillTx/>
+                </a:rPr>
+                <a:t>toAdd</a:t>
+              </a:r>
+              <a:r>
+                <a:rPr kumimoji="0" lang="en-US" sz="1200" b="0" i="0" u="none" strike="noStrike" kern="0" cap="none" spc="0" normalizeH="0" baseline="0" noProof="0" dirty="0">
+                  <a:ln>
+                    <a:noFill/>
+                  </a:ln>
+                  <a:solidFill>
+                    <a:srgbClr val="8064A2">
+                      <a:lumMod val="75000"/>
+                    </a:srgbClr>
+                  </a:solidFill>
+                  <a:effectLst/>
+                  <a:uLnTx/>
+                  <a:uFillTx/>
+                </a:rPr>
+                <a:t>)</a:t>
+              </a:r>
+            </a:p>
+          </p:txBody>
+        </p:sp>
+        <p:grpSp>
+          <p:nvGrpSpPr>
+            <p:cNvPr id="33" name="Group 32">
+              <a:extLst>
+                <a:ext uri="{FF2B5EF4-FFF2-40B4-BE49-F238E27FC236}">
+                  <a16:creationId xmlns:a16="http://schemas.microsoft.com/office/drawing/2014/main" id="{E2BD9597-170C-48E7-B70F-3B86F5B02847}"/>
+                </a:ext>
+              </a:extLst>
+            </p:cNvPr>
+            <p:cNvGrpSpPr/>
+            <p:nvPr/>
+          </p:nvGrpSpPr>
+          <p:grpSpPr>
+            <a:xfrm>
+              <a:off x="7195912" y="2025034"/>
+              <a:ext cx="3705806" cy="2368351"/>
+              <a:chOff x="6549765" y="2057403"/>
+              <a:chExt cx="3705806" cy="2368351"/>
+            </a:xfrm>
+          </p:grpSpPr>
+          <p:sp>
+            <p:nvSpPr>
+              <p:cNvPr id="83" name="Rectangle 62">
+                <a:extLst>
+                  <a:ext uri="{FF2B5EF4-FFF2-40B4-BE49-F238E27FC236}">
+                    <a16:creationId xmlns:a16="http://schemas.microsoft.com/office/drawing/2014/main" id="{F6F2B2A6-5370-4E53-893C-879B19B5E10A}"/>
+                  </a:ext>
+                </a:extLst>
+              </p:cNvPr>
+              <p:cNvSpPr/>
+              <p:nvPr/>
+            </p:nvSpPr>
+            <p:spPr>
+              <a:xfrm>
+                <a:off x="7779950" y="2057403"/>
+                <a:ext cx="1454546" cy="846631"/>
+              </a:xfrm>
+              <a:prstGeom prst="rect">
+                <a:avLst/>
+              </a:prstGeom>
+              <a:solidFill>
+                <a:srgbClr val="7030A0"/>
+              </a:solidFill>
+              <a:ln w="19050" cap="flat" cmpd="sng" algn="ctr">
+                <a:solidFill>
+                  <a:srgbClr val="7030A0"/>
+                </a:solidFill>
+                <a:prstDash val="solid"/>
+              </a:ln>
+              <a:effectLst/>
+            </p:spPr>
+            <p:txBody>
+              <a:bodyPr rtlCol="0" anchor="ctr"/>
+              <a:lstStyle/>
+              <a:p>
+                <a:pPr marL="0" marR="0" lvl="0" indent="0" algn="ctr" defTabSz="914400" eaLnBrk="1" fontAlgn="auto" latinLnBrk="0" hangingPunct="1">
+                  <a:lnSpc>
+                    <a:spcPct val="100000"/>
+                  </a:lnSpc>
+                  <a:spcBef>
+                    <a:spcPts val="0"/>
+                  </a:spcBef>
+                  <a:spcAft>
+                    <a:spcPts val="0"/>
+                  </a:spcAft>
+                  <a:buClrTx/>
+                  <a:buSzTx/>
+                  <a:buFontTx/>
+                  <a:buNone/>
+                  <a:tabLst/>
+                  <a:defRPr/>
+                </a:pPr>
+                <a:r>
+                  <a:rPr kumimoji="0" lang="en-US" sz="1600" b="0" i="0" u="none" strike="noStrike" kern="0" cap="none" spc="0" normalizeH="0" baseline="0" noProof="0" dirty="0">
+                    <a:ln>
+                      <a:noFill/>
+                    </a:ln>
+                    <a:solidFill>
+                      <a:prstClr val="white"/>
+                    </a:solidFill>
+                    <a:effectLst/>
+                    <a:uLnTx/>
+                    <a:uFillTx/>
+                    <a:latin typeface="Calibri"/>
+                    <a:ea typeface="+mn-ea"/>
+                    <a:cs typeface="+mn-cs"/>
+                  </a:rPr>
+                  <a:t>:Versioned</a:t>
+                </a:r>
+              </a:p>
+              <a:p>
+                <a:pPr marL="0" marR="0" lvl="0" indent="0" algn="ctr" defTabSz="914400" eaLnBrk="1" fontAlgn="auto" latinLnBrk="0" hangingPunct="1">
+                  <a:lnSpc>
+                    <a:spcPct val="100000"/>
+                  </a:lnSpc>
+                  <a:spcBef>
+                    <a:spcPts val="0"/>
+                  </a:spcBef>
+                  <a:spcAft>
+                    <a:spcPts val="0"/>
+                  </a:spcAft>
+                  <a:buClrTx/>
+                  <a:buSzTx/>
+                  <a:buFontTx/>
+                  <a:buNone/>
+                  <a:tabLst/>
+                  <a:defRPr/>
+                </a:pPr>
+                <a:r>
+                  <a:rPr kumimoji="0" lang="en-US" sz="1600" b="0" i="0" u="none" strike="noStrike" kern="0" cap="none" spc="0" normalizeH="0" baseline="0" noProof="0" dirty="0" err="1">
+                    <a:ln>
+                      <a:noFill/>
+                    </a:ln>
+                    <a:solidFill>
+                      <a:prstClr val="white"/>
+                    </a:solidFill>
+                    <a:effectLst/>
+                    <a:uLnTx/>
+                    <a:uFillTx/>
+                    <a:latin typeface="Calibri"/>
+                    <a:ea typeface="+mn-ea"/>
+                    <a:cs typeface="+mn-cs"/>
+                  </a:rPr>
+                  <a:t>ClubBudget</a:t>
+                </a:r>
+                <a:endParaRPr kumimoji="0" lang="en-US" sz="1600" b="0" i="0" u="none" strike="noStrike" kern="0" cap="none" spc="0" normalizeH="0" baseline="0" noProof="0" dirty="0">
+                  <a:ln>
+                    <a:noFill/>
+                  </a:ln>
+                  <a:solidFill>
+                    <a:prstClr val="white"/>
+                  </a:solidFill>
+                  <a:effectLst/>
+                  <a:uLnTx/>
+                  <a:uFillTx/>
+                  <a:latin typeface="Calibri"/>
+                  <a:ea typeface="+mn-ea"/>
+                  <a:cs typeface="+mn-cs"/>
+                </a:endParaRPr>
+              </a:p>
+              <a:p>
+                <a:pPr marL="0" marR="0" lvl="0" indent="0" algn="ctr" defTabSz="914400" eaLnBrk="1" fontAlgn="auto" latinLnBrk="0" hangingPunct="1">
+                  <a:lnSpc>
+                    <a:spcPct val="100000"/>
+                  </a:lnSpc>
+                  <a:spcBef>
+                    <a:spcPts val="0"/>
+                  </a:spcBef>
+                  <a:spcAft>
+                    <a:spcPts val="0"/>
+                  </a:spcAft>
+                  <a:buClrTx/>
+                  <a:buSzTx/>
+                  <a:buFontTx/>
+                  <a:buNone/>
+                  <a:tabLst/>
+                  <a:defRPr/>
+                </a:pPr>
+                <a:r>
+                  <a:rPr kumimoji="0" lang="en-US" sz="1600" b="0" i="0" u="none" strike="noStrike" kern="0" cap="none" spc="0" normalizeH="0" baseline="0" noProof="0" dirty="0" err="1">
+                    <a:ln>
+                      <a:noFill/>
+                    </a:ln>
+                    <a:solidFill>
+                      <a:prstClr val="white"/>
+                    </a:solidFill>
+                    <a:effectLst/>
+                    <a:uLnTx/>
+                    <a:uFillTx/>
+                    <a:latin typeface="Calibri"/>
+                    <a:ea typeface="+mn-ea"/>
+                    <a:cs typeface="+mn-cs"/>
+                  </a:rPr>
+                  <a:t>ElementsBook</a:t>
+                </a:r>
+                <a:endParaRPr kumimoji="0" lang="en-SG" sz="1600" b="0" i="0" u="none" strike="noStrike" kern="0" cap="none" spc="0" normalizeH="0" baseline="0" noProof="0" dirty="0">
+                  <a:ln>
+                    <a:noFill/>
+                  </a:ln>
+                  <a:solidFill>
+                    <a:prstClr val="white"/>
+                  </a:solidFill>
+                  <a:effectLst/>
+                  <a:uLnTx/>
+                  <a:uFillTx/>
+                  <a:latin typeface="Calibri"/>
+                  <a:ea typeface="+mn-ea"/>
+                  <a:cs typeface="+mn-cs"/>
+                </a:endParaRPr>
+              </a:p>
+            </p:txBody>
+          </p:sp>
+          <p:sp>
+            <p:nvSpPr>
+              <p:cNvPr id="85" name="Rectangle 62">
+                <a:extLst>
+                  <a:ext uri="{FF2B5EF4-FFF2-40B4-BE49-F238E27FC236}">
+                    <a16:creationId xmlns:a16="http://schemas.microsoft.com/office/drawing/2014/main" id="{FDE9C394-CDFC-485F-A8FE-7675D352FBEE}"/>
+                  </a:ext>
+                </a:extLst>
+              </p:cNvPr>
+              <p:cNvSpPr/>
+              <p:nvPr/>
+            </p:nvSpPr>
+            <p:spPr>
+              <a:xfrm>
+                <a:off x="6549765" y="2362200"/>
+                <a:ext cx="841636" cy="300180"/>
+              </a:xfrm>
+              <a:prstGeom prst="rect">
+                <a:avLst/>
+              </a:prstGeom>
+              <a:solidFill>
+                <a:srgbClr val="7030A0"/>
+              </a:solidFill>
+              <a:ln w="19050" cap="flat" cmpd="sng" algn="ctr">
+                <a:solidFill>
+                  <a:srgbClr val="7030A0"/>
+                </a:solidFill>
+                <a:prstDash val="solid"/>
+              </a:ln>
+              <a:effectLst/>
+            </p:spPr>
+            <p:txBody>
+              <a:bodyPr rtlCol="0" anchor="ctr"/>
+              <a:lstStyle/>
+              <a:p>
+                <a:pPr marL="0" marR="0" lvl="0" indent="0" algn="ctr" defTabSz="914400" eaLnBrk="1" fontAlgn="auto" latinLnBrk="0" hangingPunct="1">
+                  <a:lnSpc>
+                    <a:spcPct val="100000"/>
+                  </a:lnSpc>
+                  <a:spcBef>
+                    <a:spcPts val="0"/>
+                  </a:spcBef>
+                  <a:spcAft>
+                    <a:spcPts val="0"/>
+                  </a:spcAft>
+                  <a:buClrTx/>
+                  <a:buSzTx/>
+                  <a:buFontTx/>
+                  <a:buNone/>
+                  <a:tabLst/>
+                  <a:defRPr/>
+                </a:pPr>
+                <a:r>
+                  <a:rPr kumimoji="0" lang="en-US" sz="1600" b="0" i="0" u="none" strike="noStrike" kern="0" cap="none" spc="0" normalizeH="0" baseline="0" noProof="0" dirty="0">
+                    <a:ln>
+                      <a:noFill/>
+                    </a:ln>
+                    <a:solidFill>
+                      <a:prstClr val="white"/>
+                    </a:solidFill>
+                    <a:effectLst/>
+                    <a:uLnTx/>
+                    <a:uFillTx/>
+                    <a:latin typeface="Calibri"/>
+                    <a:ea typeface="+mn-ea"/>
+                    <a:cs typeface="+mn-cs"/>
+                  </a:rPr>
+                  <a:t>: Model</a:t>
+                </a:r>
+                <a:endParaRPr kumimoji="0" lang="en-SG" sz="1600" b="0" i="0" u="none" strike="noStrike" kern="0" cap="none" spc="0" normalizeH="0" baseline="0" noProof="0" dirty="0">
+                  <a:ln>
+                    <a:noFill/>
+                  </a:ln>
+                  <a:solidFill>
+                    <a:prstClr val="white"/>
+                  </a:solidFill>
+                  <a:effectLst/>
+                  <a:uLnTx/>
+                  <a:uFillTx/>
+                  <a:latin typeface="Calibri"/>
+                  <a:ea typeface="+mn-ea"/>
+                  <a:cs typeface="+mn-cs"/>
+                </a:endParaRPr>
+              </a:p>
+            </p:txBody>
+          </p:sp>
+          <p:cxnSp>
+            <p:nvCxnSpPr>
+              <p:cNvPr id="86" name="Straight Connector 85">
+                <a:extLst>
+                  <a:ext uri="{FF2B5EF4-FFF2-40B4-BE49-F238E27FC236}">
+                    <a16:creationId xmlns:a16="http://schemas.microsoft.com/office/drawing/2014/main" id="{98AF0B24-2DC4-4C9E-B61A-9DC5FE650B50}"/>
+                  </a:ext>
+                </a:extLst>
+              </p:cNvPr>
+              <p:cNvCxnSpPr>
+                <a:cxnSpLocks/>
+              </p:cNvCxnSpPr>
+              <p:nvPr/>
+            </p:nvCxnSpPr>
+            <p:spPr>
+              <a:xfrm flipH="1">
+                <a:off x="6986491" y="2653306"/>
+                <a:ext cx="3959" cy="1735710"/>
+              </a:xfrm>
+              <a:prstGeom prst="line">
+                <a:avLst/>
+              </a:prstGeom>
+              <a:gradFill rotWithShape="1">
+                <a:gsLst>
+                  <a:gs pos="0">
+                    <a:srgbClr val="4F81BD">
+                      <a:tint val="50000"/>
+                      <a:satMod val="300000"/>
+                    </a:srgbClr>
+                  </a:gs>
+                  <a:gs pos="35000">
+                    <a:srgbClr val="4F81BD">
+                      <a:tint val="37000"/>
+                      <a:satMod val="300000"/>
+                    </a:srgbClr>
+                  </a:gs>
+                  <a:gs pos="100000">
+                    <a:srgbClr val="4F81BD">
+                      <a:tint val="15000"/>
+                      <a:satMod val="350000"/>
+                    </a:srgbClr>
+                  </a:gs>
+                </a:gsLst>
+                <a:lin ang="16200000" scaled="1"/>
+              </a:gradFill>
+              <a:ln w="19050" cap="flat" cmpd="sng" algn="ctr">
+                <a:solidFill>
+                  <a:srgbClr val="7030A0"/>
+                </a:solidFill>
+                <a:prstDash val="sysDash"/>
+              </a:ln>
+              <a:effectLst/>
+            </p:spPr>
+          </p:cxnSp>
+          <p:sp>
+            <p:nvSpPr>
+              <p:cNvPr id="87" name="Rectangle 86">
+                <a:extLst>
+                  <a:ext uri="{FF2B5EF4-FFF2-40B4-BE49-F238E27FC236}">
+                    <a16:creationId xmlns:a16="http://schemas.microsoft.com/office/drawing/2014/main" id="{158225D1-7303-434E-ACBB-5154F01D33C3}"/>
+                  </a:ext>
+                </a:extLst>
+              </p:cNvPr>
+              <p:cNvSpPr/>
+              <p:nvPr/>
+            </p:nvSpPr>
+            <p:spPr>
+              <a:xfrm>
+                <a:off x="6887527" y="2958106"/>
+                <a:ext cx="168896" cy="775693"/>
+              </a:xfrm>
+              <a:prstGeom prst="rect">
+                <a:avLst/>
+              </a:prstGeom>
+              <a:solidFill>
+                <a:srgbClr val="7030A0"/>
+              </a:solidFill>
+              <a:ln w="9525" cap="flat" cmpd="sng" algn="ctr">
+                <a:solidFill>
+                  <a:srgbClr val="7030A0"/>
+                </a:solidFill>
+                <a:prstDash val="solid"/>
+              </a:ln>
+              <a:effectLst/>
+            </p:spPr>
+            <p:txBody>
+              <a:bodyPr rtlCol="0" anchor="ctr"/>
+              <a:lstStyle/>
+              <a:p>
+                <a:pPr marL="0" marR="0" lvl="0" indent="0" algn="ctr" defTabSz="914400" eaLnBrk="1" fontAlgn="auto" latinLnBrk="0" hangingPunct="1">
+                  <a:lnSpc>
+                    <a:spcPct val="100000"/>
+                  </a:lnSpc>
+                  <a:spcBef>
+                    <a:spcPts val="0"/>
+                  </a:spcBef>
+                  <a:spcAft>
+                    <a:spcPts val="0"/>
+                  </a:spcAft>
+                  <a:buClrTx/>
+                  <a:buSzTx/>
+                  <a:buFontTx/>
+                  <a:buNone/>
+                  <a:tabLst/>
+                  <a:defRPr/>
+                </a:pPr>
+                <a:endParaRPr kumimoji="0" lang="en-SG" sz="1400" b="0" i="0" u="none" strike="noStrike" kern="0" cap="none" spc="0" normalizeH="0" baseline="0" noProof="0">
+                  <a:ln>
+                    <a:noFill/>
+                  </a:ln>
+                  <a:solidFill>
+                    <a:prstClr val="black"/>
+                  </a:solidFill>
+                  <a:effectLst/>
+                  <a:uLnTx/>
+                  <a:uFillTx/>
+                  <a:latin typeface="Calibri"/>
+                  <a:ea typeface="+mn-ea"/>
+                  <a:cs typeface="+mn-cs"/>
+                </a:endParaRPr>
+              </a:p>
+            </p:txBody>
+          </p:sp>
+          <p:cxnSp>
+            <p:nvCxnSpPr>
+              <p:cNvPr id="96" name="Straight Connector 95">
+                <a:extLst>
+                  <a:ext uri="{FF2B5EF4-FFF2-40B4-BE49-F238E27FC236}">
+                    <a16:creationId xmlns:a16="http://schemas.microsoft.com/office/drawing/2014/main" id="{2F5EB884-1E8F-449A-8F45-5DB9898FA733}"/>
+                  </a:ext>
+                </a:extLst>
+              </p:cNvPr>
+              <p:cNvCxnSpPr>
+                <a:cxnSpLocks/>
+              </p:cNvCxnSpPr>
+              <p:nvPr/>
+            </p:nvCxnSpPr>
+            <p:spPr>
+              <a:xfrm>
+                <a:off x="8588043" y="2871355"/>
+                <a:ext cx="17996" cy="1467648"/>
+              </a:xfrm>
+              <a:prstGeom prst="line">
+                <a:avLst/>
+              </a:prstGeom>
+              <a:gradFill rotWithShape="1">
+                <a:gsLst>
+                  <a:gs pos="0">
+                    <a:srgbClr val="4F81BD">
+                      <a:tint val="50000"/>
+                      <a:satMod val="300000"/>
+                    </a:srgbClr>
+                  </a:gs>
+                  <a:gs pos="35000">
+                    <a:srgbClr val="4F81BD">
+                      <a:tint val="37000"/>
+                      <a:satMod val="300000"/>
+                    </a:srgbClr>
+                  </a:gs>
+                  <a:gs pos="100000">
+                    <a:srgbClr val="4F81BD">
+                      <a:tint val="15000"/>
+                      <a:satMod val="350000"/>
+                    </a:srgbClr>
+                  </a:gs>
+                </a:gsLst>
+                <a:lin ang="16200000" scaled="1"/>
+              </a:gradFill>
+              <a:ln w="19050" cap="flat" cmpd="sng" algn="ctr">
+                <a:solidFill>
+                  <a:srgbClr val="7030A0"/>
+                </a:solidFill>
+                <a:prstDash val="sysDash"/>
+              </a:ln>
+              <a:effectLst/>
+            </p:spPr>
+          </p:cxnSp>
+          <p:sp>
+            <p:nvSpPr>
+              <p:cNvPr id="97" name="TextBox 96">
+                <a:extLst>
+                  <a:ext uri="{FF2B5EF4-FFF2-40B4-BE49-F238E27FC236}">
+                    <a16:creationId xmlns:a16="http://schemas.microsoft.com/office/drawing/2014/main" id="{9ABBC27F-DC44-439D-8635-DE0E52B28D60}"/>
+                  </a:ext>
+                </a:extLst>
+              </p:cNvPr>
+              <p:cNvSpPr txBox="1"/>
+              <p:nvPr/>
+            </p:nvSpPr>
+            <p:spPr>
+              <a:xfrm>
+                <a:off x="7267945" y="2975344"/>
+                <a:ext cx="951433" cy="184666"/>
+              </a:xfrm>
+              <a:prstGeom prst="rect">
+                <a:avLst/>
+              </a:prstGeom>
+              <a:noFill/>
+              <a:ln>
+                <a:noFill/>
+              </a:ln>
+            </p:spPr>
+            <p:txBody>
+              <a:bodyPr wrap="square" lIns="0" tIns="0" rIns="0" bIns="0" rtlCol="0">
+                <a:spAutoFit/>
+              </a:bodyPr>
+              <a:lstStyle>
+                <a:defPPr>
+                  <a:defRPr lang="en-US"/>
+                </a:defPPr>
+                <a:lvl1pPr algn="r">
+                  <a:defRPr sz="1400">
+                    <a:solidFill>
+                      <a:srgbClr val="0070C0"/>
+                    </a:solidFill>
+                  </a:defRPr>
+                </a:lvl1pPr>
+              </a:lstStyle>
+              <a:p>
+                <a:pPr marL="0" marR="0" lvl="0" indent="0" algn="r" defTabSz="914400" eaLnBrk="1" fontAlgn="auto" latinLnBrk="0" hangingPunct="1">
+                  <a:lnSpc>
+                    <a:spcPct val="100000"/>
+                  </a:lnSpc>
+                  <a:spcBef>
+                    <a:spcPts val="0"/>
+                  </a:spcBef>
+                  <a:spcAft>
+                    <a:spcPts val="0"/>
+                  </a:spcAft>
+                  <a:buClrTx/>
+                  <a:buSzTx/>
+                  <a:buFontTx/>
+                  <a:buNone/>
+                  <a:tabLst/>
+                  <a:defRPr/>
+                </a:pPr>
+                <a:r>
+                  <a:rPr kumimoji="0" lang="en-US" sz="1200" b="0" i="0" u="none" strike="noStrike" kern="0" cap="none" spc="0" normalizeH="0" baseline="0" noProof="0" dirty="0" err="1">
+                    <a:ln>
+                      <a:noFill/>
+                    </a:ln>
+                    <a:solidFill>
+                      <a:srgbClr val="8064A2">
+                        <a:lumMod val="75000"/>
+                      </a:srgbClr>
+                    </a:solidFill>
+                    <a:effectLst/>
+                    <a:uLnTx/>
+                    <a:uFillTx/>
+                  </a:rPr>
+                  <a:t>addC</a:t>
+                </a:r>
+                <a:r>
+                  <a:rPr lang="en-US" sz="1200" kern="0" dirty="0" err="1">
+                    <a:solidFill>
+                      <a:srgbClr val="8064A2">
+                        <a:lumMod val="75000"/>
+                      </a:srgbClr>
+                    </a:solidFill>
+                  </a:rPr>
+                  <a:t>lub</a:t>
+                </a:r>
+                <a:r>
+                  <a:rPr kumimoji="0" lang="en-US" sz="1200" b="0" i="0" u="none" strike="noStrike" kern="0" cap="none" spc="0" normalizeH="0" baseline="0" noProof="0" dirty="0">
+                    <a:ln>
+                      <a:noFill/>
+                    </a:ln>
+                    <a:solidFill>
+                      <a:srgbClr val="8064A2">
+                        <a:lumMod val="75000"/>
+                      </a:srgbClr>
+                    </a:solidFill>
+                    <a:effectLst/>
+                    <a:uLnTx/>
+                    <a:uFillTx/>
+                  </a:rPr>
+                  <a:t>(club)</a:t>
+                </a:r>
+              </a:p>
+            </p:txBody>
+          </p:sp>
+          <p:cxnSp>
+            <p:nvCxnSpPr>
+              <p:cNvPr id="99" name="Straight Arrow Connector 98">
+                <a:extLst>
+                  <a:ext uri="{FF2B5EF4-FFF2-40B4-BE49-F238E27FC236}">
+                    <a16:creationId xmlns:a16="http://schemas.microsoft.com/office/drawing/2014/main" id="{62090F4F-16BE-4E05-ACC1-5227C799BDD6}"/>
+                  </a:ext>
+                </a:extLst>
+              </p:cNvPr>
+              <p:cNvCxnSpPr>
+                <a:cxnSpLocks/>
+              </p:cNvCxnSpPr>
+              <p:nvPr/>
+            </p:nvCxnSpPr>
+            <p:spPr>
+              <a:xfrm>
+                <a:off x="7043991" y="3182839"/>
+                <a:ext cx="1470216" cy="0"/>
+              </a:xfrm>
+              <a:prstGeom prst="straightConnector1">
+                <a:avLst/>
+              </a:prstGeom>
+              <a:noFill/>
+              <a:ln w="19050" cap="flat" cmpd="sng" algn="ctr">
+                <a:solidFill>
+                  <a:srgbClr val="7030A0"/>
+                </a:solidFill>
+                <a:prstDash val="solid"/>
+                <a:tailEnd type="arrow"/>
+              </a:ln>
+              <a:effectLst/>
+            </p:spPr>
+          </p:cxnSp>
+          <p:cxnSp>
+            <p:nvCxnSpPr>
+              <p:cNvPr id="100" name="Straight Arrow Connector 99">
+                <a:extLst>
+                  <a:ext uri="{FF2B5EF4-FFF2-40B4-BE49-F238E27FC236}">
+                    <a16:creationId xmlns:a16="http://schemas.microsoft.com/office/drawing/2014/main" id="{A46B042B-D732-4316-ADA4-92A1954BAB67}"/>
+                  </a:ext>
+                </a:extLst>
+              </p:cNvPr>
+              <p:cNvCxnSpPr>
+                <a:cxnSpLocks/>
+              </p:cNvCxnSpPr>
+              <p:nvPr/>
+            </p:nvCxnSpPr>
+            <p:spPr>
+              <a:xfrm flipV="1">
+                <a:off x="7043991" y="3618356"/>
+                <a:ext cx="1470216" cy="6325"/>
+              </a:xfrm>
+              <a:prstGeom prst="straightConnector1">
+                <a:avLst/>
+              </a:prstGeom>
+              <a:noFill/>
+              <a:ln w="19050" cap="flat" cmpd="sng" algn="ctr">
+                <a:solidFill>
+                  <a:srgbClr val="7030A0"/>
+                </a:solidFill>
+                <a:prstDash val="sysDash"/>
+                <a:headEnd type="arrow" w="med" len="med"/>
+                <a:tailEnd type="none" w="med" len="med"/>
+              </a:ln>
+              <a:effectLst/>
+            </p:spPr>
+          </p:cxnSp>
+          <p:sp>
+            <p:nvSpPr>
+              <p:cNvPr id="112" name="Rectangle 62">
+                <a:extLst>
+                  <a:ext uri="{FF2B5EF4-FFF2-40B4-BE49-F238E27FC236}">
+                    <a16:creationId xmlns:a16="http://schemas.microsoft.com/office/drawing/2014/main" id="{597D835E-467E-42CC-8520-F3219B01E243}"/>
+                  </a:ext>
+                </a:extLst>
+              </p:cNvPr>
+              <p:cNvSpPr/>
+              <p:nvPr/>
+            </p:nvSpPr>
+            <p:spPr>
+              <a:xfrm>
+                <a:off x="9308332" y="2472473"/>
+                <a:ext cx="947239" cy="502871"/>
+              </a:xfrm>
+              <a:prstGeom prst="rect">
+                <a:avLst/>
+              </a:prstGeom>
+              <a:solidFill>
+                <a:srgbClr val="7030A0"/>
+              </a:solidFill>
+              <a:ln w="19050" cap="flat" cmpd="sng" algn="ctr">
+                <a:solidFill>
+                  <a:srgbClr val="7030A0"/>
+                </a:solidFill>
+                <a:prstDash val="solid"/>
+              </a:ln>
+              <a:effectLst/>
+            </p:spPr>
+            <p:txBody>
+              <a:bodyPr rtlCol="0" anchor="ctr"/>
+              <a:lstStyle/>
+              <a:p>
+                <a:pPr marL="0" marR="0" lvl="0" indent="0" algn="ctr" defTabSz="914400" eaLnBrk="1" fontAlgn="auto" latinLnBrk="0" hangingPunct="1">
+                  <a:lnSpc>
+                    <a:spcPct val="100000"/>
+                  </a:lnSpc>
+                  <a:spcBef>
+                    <a:spcPts val="0"/>
+                  </a:spcBef>
+                  <a:spcAft>
+                    <a:spcPts val="0"/>
+                  </a:spcAft>
+                  <a:buClrTx/>
+                  <a:buSzTx/>
+                  <a:buFontTx/>
+                  <a:buNone/>
+                  <a:tabLst/>
+                  <a:defRPr/>
+                </a:pPr>
+                <a:r>
+                  <a:rPr kumimoji="0" lang="en-US" sz="1600" b="0" i="0" u="none" strike="noStrike" kern="0" cap="none" spc="0" normalizeH="0" baseline="0" noProof="0" dirty="0">
+                    <a:ln>
+                      <a:noFill/>
+                    </a:ln>
+                    <a:solidFill>
+                      <a:prstClr val="white"/>
+                    </a:solidFill>
+                    <a:effectLst/>
+                    <a:uLnTx/>
+                    <a:uFillTx/>
+                    <a:latin typeface="Calibri"/>
+                    <a:ea typeface="+mn-ea"/>
+                    <a:cs typeface="+mn-cs"/>
+                  </a:rPr>
+                  <a:t>:Unique</a:t>
+                </a:r>
+              </a:p>
+              <a:p>
+                <a:pPr marL="0" marR="0" lvl="0" indent="0" algn="ctr" defTabSz="914400" eaLnBrk="1" fontAlgn="auto" latinLnBrk="0" hangingPunct="1">
+                  <a:lnSpc>
+                    <a:spcPct val="100000"/>
+                  </a:lnSpc>
+                  <a:spcBef>
+                    <a:spcPts val="0"/>
+                  </a:spcBef>
+                  <a:spcAft>
+                    <a:spcPts val="0"/>
+                  </a:spcAft>
+                  <a:buClrTx/>
+                  <a:buSzTx/>
+                  <a:buFontTx/>
+                  <a:buNone/>
+                  <a:tabLst/>
+                  <a:defRPr/>
+                </a:pPr>
+                <a:r>
+                  <a:rPr kumimoji="0" lang="en-US" sz="1600" b="0" i="0" u="none" strike="noStrike" kern="0" cap="none" spc="0" normalizeH="0" baseline="0" noProof="0" dirty="0" err="1">
+                    <a:ln>
+                      <a:noFill/>
+                    </a:ln>
+                    <a:solidFill>
+                      <a:prstClr val="white"/>
+                    </a:solidFill>
+                    <a:effectLst/>
+                    <a:uLnTx/>
+                    <a:uFillTx/>
+                    <a:latin typeface="Calibri"/>
+                    <a:ea typeface="+mn-ea"/>
+                    <a:cs typeface="+mn-cs"/>
+                  </a:rPr>
+                  <a:t>ClubsList</a:t>
+                </a:r>
+                <a:endParaRPr kumimoji="0" lang="en-SG" sz="1600" b="0" i="0" u="none" strike="noStrike" kern="0" cap="none" spc="0" normalizeH="0" baseline="0" noProof="0" dirty="0">
+                  <a:ln>
+                    <a:noFill/>
+                  </a:ln>
+                  <a:solidFill>
+                    <a:prstClr val="white"/>
+                  </a:solidFill>
+                  <a:effectLst/>
+                  <a:uLnTx/>
+                  <a:uFillTx/>
+                  <a:latin typeface="Calibri"/>
+                  <a:ea typeface="+mn-ea"/>
+                  <a:cs typeface="+mn-cs"/>
+                </a:endParaRPr>
+              </a:p>
+            </p:txBody>
+          </p:sp>
+          <p:cxnSp>
+            <p:nvCxnSpPr>
+              <p:cNvPr id="113" name="Straight Connector 112">
+                <a:extLst>
+                  <a:ext uri="{FF2B5EF4-FFF2-40B4-BE49-F238E27FC236}">
+                    <a16:creationId xmlns:a16="http://schemas.microsoft.com/office/drawing/2014/main" id="{8ABCED3C-CE6C-41E4-8892-B3353A5783F9}"/>
+                  </a:ext>
+                </a:extLst>
+              </p:cNvPr>
+              <p:cNvCxnSpPr>
+                <a:cxnSpLocks/>
+              </p:cNvCxnSpPr>
+              <p:nvPr/>
+            </p:nvCxnSpPr>
+            <p:spPr>
+              <a:xfrm>
+                <a:off x="9798975" y="2958106"/>
+                <a:ext cx="17996" cy="1467648"/>
+              </a:xfrm>
+              <a:prstGeom prst="line">
+                <a:avLst/>
+              </a:prstGeom>
+              <a:gradFill rotWithShape="1">
+                <a:gsLst>
+                  <a:gs pos="0">
+                    <a:srgbClr val="4F81BD">
+                      <a:tint val="50000"/>
+                      <a:satMod val="300000"/>
+                    </a:srgbClr>
+                  </a:gs>
+                  <a:gs pos="35000">
+                    <a:srgbClr val="4F81BD">
+                      <a:tint val="37000"/>
+                      <a:satMod val="300000"/>
+                    </a:srgbClr>
+                  </a:gs>
+                  <a:gs pos="100000">
+                    <a:srgbClr val="4F81BD">
+                      <a:tint val="15000"/>
+                      <a:satMod val="350000"/>
+                    </a:srgbClr>
+                  </a:gs>
+                </a:gsLst>
+                <a:lin ang="16200000" scaled="1"/>
+              </a:gradFill>
+              <a:ln w="19050" cap="flat" cmpd="sng" algn="ctr">
+                <a:solidFill>
+                  <a:srgbClr val="7030A0"/>
+                </a:solidFill>
+                <a:prstDash val="sysDash"/>
+              </a:ln>
+              <a:effectLst/>
+            </p:spPr>
+          </p:cxnSp>
+          <p:sp>
+            <p:nvSpPr>
+              <p:cNvPr id="114" name="TextBox 113">
+                <a:extLst>
+                  <a:ext uri="{FF2B5EF4-FFF2-40B4-BE49-F238E27FC236}">
+                    <a16:creationId xmlns:a16="http://schemas.microsoft.com/office/drawing/2014/main" id="{BA3227E4-47A7-4520-8557-336C683EF7EB}"/>
+                  </a:ext>
+                </a:extLst>
+              </p:cNvPr>
+              <p:cNvSpPr txBox="1"/>
+              <p:nvPr/>
+            </p:nvSpPr>
+            <p:spPr>
+              <a:xfrm>
+                <a:off x="8791702" y="3069105"/>
+                <a:ext cx="951433" cy="184666"/>
+              </a:xfrm>
+              <a:prstGeom prst="rect">
+                <a:avLst/>
+              </a:prstGeom>
+              <a:noFill/>
+              <a:ln>
+                <a:noFill/>
+              </a:ln>
+            </p:spPr>
+            <p:txBody>
+              <a:bodyPr wrap="square" lIns="0" tIns="0" rIns="0" bIns="0" rtlCol="0">
+                <a:spAutoFit/>
+              </a:bodyPr>
+              <a:lstStyle>
+                <a:defPPr>
+                  <a:defRPr lang="en-US"/>
+                </a:defPPr>
+                <a:lvl1pPr algn="r">
+                  <a:defRPr sz="1400">
+                    <a:solidFill>
+                      <a:srgbClr val="0070C0"/>
+                    </a:solidFill>
+                  </a:defRPr>
+                </a:lvl1pPr>
+              </a:lstStyle>
+              <a:p>
+                <a:pPr marL="0" marR="0" lvl="0" indent="0" algn="r" defTabSz="914400" eaLnBrk="1" fontAlgn="auto" latinLnBrk="0" hangingPunct="1">
+                  <a:lnSpc>
+                    <a:spcPct val="100000"/>
+                  </a:lnSpc>
+                  <a:spcBef>
+                    <a:spcPts val="0"/>
+                  </a:spcBef>
+                  <a:spcAft>
+                    <a:spcPts val="0"/>
+                  </a:spcAft>
+                  <a:buClrTx/>
+                  <a:buSzTx/>
+                  <a:buFontTx/>
+                  <a:buNone/>
+                  <a:tabLst/>
+                  <a:defRPr/>
+                </a:pPr>
+                <a:r>
+                  <a:rPr kumimoji="0" lang="en-US" sz="1200" b="0" i="0" u="none" strike="noStrike" kern="0" cap="none" spc="0" normalizeH="0" baseline="0" noProof="0" dirty="0" err="1">
+                    <a:ln>
+                      <a:noFill/>
+                    </a:ln>
+                    <a:solidFill>
+                      <a:srgbClr val="8064A2">
+                        <a:lumMod val="75000"/>
+                      </a:srgbClr>
+                    </a:solidFill>
+                    <a:effectLst/>
+                    <a:uLnTx/>
+                    <a:uFillTx/>
+                  </a:rPr>
+                  <a:t>addC</a:t>
+                </a:r>
+                <a:r>
+                  <a:rPr lang="en-US" sz="1200" kern="0" dirty="0" err="1">
+                    <a:solidFill>
+                      <a:srgbClr val="8064A2">
+                        <a:lumMod val="75000"/>
+                      </a:srgbClr>
+                    </a:solidFill>
+                  </a:rPr>
+                  <a:t>lub</a:t>
+                </a:r>
+                <a:r>
+                  <a:rPr kumimoji="0" lang="en-US" sz="1200" b="0" i="0" u="none" strike="noStrike" kern="0" cap="none" spc="0" normalizeH="0" baseline="0" noProof="0" dirty="0">
+                    <a:ln>
+                      <a:noFill/>
+                    </a:ln>
+                    <a:solidFill>
+                      <a:srgbClr val="8064A2">
+                        <a:lumMod val="75000"/>
+                      </a:srgbClr>
+                    </a:solidFill>
+                    <a:effectLst/>
+                    <a:uLnTx/>
+                    <a:uFillTx/>
+                  </a:rPr>
+                  <a:t>(club)</a:t>
+                </a:r>
+              </a:p>
+            </p:txBody>
+          </p:sp>
+          <p:cxnSp>
+            <p:nvCxnSpPr>
+              <p:cNvPr id="115" name="Straight Arrow Connector 114">
+                <a:extLst>
+                  <a:ext uri="{FF2B5EF4-FFF2-40B4-BE49-F238E27FC236}">
+                    <a16:creationId xmlns:a16="http://schemas.microsoft.com/office/drawing/2014/main" id="{5FDBE66E-D2A1-4952-BCBF-C1820926DD55}"/>
+                  </a:ext>
+                </a:extLst>
+              </p:cNvPr>
+              <p:cNvCxnSpPr>
+                <a:cxnSpLocks/>
+              </p:cNvCxnSpPr>
+              <p:nvPr/>
+            </p:nvCxnSpPr>
+            <p:spPr>
+              <a:xfrm>
+                <a:off x="8606039" y="3276600"/>
+                <a:ext cx="1128511" cy="4763"/>
+              </a:xfrm>
+              <a:prstGeom prst="straightConnector1">
+                <a:avLst/>
+              </a:prstGeom>
+              <a:noFill/>
+              <a:ln w="19050" cap="flat" cmpd="sng" algn="ctr">
+                <a:solidFill>
+                  <a:srgbClr val="7030A0"/>
+                </a:solidFill>
+                <a:prstDash val="solid"/>
+                <a:tailEnd type="arrow"/>
+              </a:ln>
+              <a:effectLst/>
+            </p:spPr>
+          </p:cxnSp>
+          <p:sp>
+            <p:nvSpPr>
+              <p:cNvPr id="116" name="Rectangle 115">
+                <a:extLst>
+                  <a:ext uri="{FF2B5EF4-FFF2-40B4-BE49-F238E27FC236}">
+                    <a16:creationId xmlns:a16="http://schemas.microsoft.com/office/drawing/2014/main" id="{A9A4268A-0D8B-4E47-82FE-CC4CDC487BB2}"/>
+                  </a:ext>
+                </a:extLst>
+              </p:cNvPr>
+              <p:cNvSpPr/>
+              <p:nvPr/>
+            </p:nvSpPr>
+            <p:spPr>
+              <a:xfrm>
+                <a:off x="8525199" y="3160011"/>
+                <a:ext cx="168896" cy="475764"/>
+              </a:xfrm>
+              <a:prstGeom prst="rect">
+                <a:avLst/>
+              </a:prstGeom>
+              <a:solidFill>
+                <a:srgbClr val="7030A0"/>
+              </a:solidFill>
+              <a:ln w="9525" cap="flat" cmpd="sng" algn="ctr">
+                <a:solidFill>
+                  <a:srgbClr val="7030A0"/>
+                </a:solidFill>
+                <a:prstDash val="solid"/>
+              </a:ln>
+              <a:effectLst/>
+            </p:spPr>
+            <p:txBody>
+              <a:bodyPr rtlCol="0" anchor="ctr"/>
+              <a:lstStyle/>
+              <a:p>
+                <a:pPr marL="0" marR="0" lvl="0" indent="0" algn="ctr" defTabSz="914400" eaLnBrk="1" fontAlgn="auto" latinLnBrk="0" hangingPunct="1">
+                  <a:lnSpc>
+                    <a:spcPct val="100000"/>
+                  </a:lnSpc>
+                  <a:spcBef>
+                    <a:spcPts val="0"/>
+                  </a:spcBef>
+                  <a:spcAft>
+                    <a:spcPts val="0"/>
+                  </a:spcAft>
+                  <a:buClrTx/>
+                  <a:buSzTx/>
+                  <a:buFontTx/>
+                  <a:buNone/>
+                  <a:tabLst/>
+                  <a:defRPr/>
+                </a:pPr>
+                <a:endParaRPr kumimoji="0" lang="en-SG" sz="1400" b="0" i="0" u="none" strike="noStrike" kern="0" cap="none" spc="0" normalizeH="0" baseline="0" noProof="0">
+                  <a:ln>
+                    <a:noFill/>
+                  </a:ln>
+                  <a:solidFill>
+                    <a:prstClr val="black"/>
+                  </a:solidFill>
+                  <a:effectLst/>
+                  <a:uLnTx/>
+                  <a:uFillTx/>
+                  <a:latin typeface="Calibri"/>
+                  <a:ea typeface="+mn-ea"/>
+                  <a:cs typeface="+mn-cs"/>
+                </a:endParaRPr>
+              </a:p>
+            </p:txBody>
+          </p:sp>
+          <p:sp>
+            <p:nvSpPr>
+              <p:cNvPr id="117" name="Rectangle 116">
+                <a:extLst>
+                  <a:ext uri="{FF2B5EF4-FFF2-40B4-BE49-F238E27FC236}">
+                    <a16:creationId xmlns:a16="http://schemas.microsoft.com/office/drawing/2014/main" id="{6730C00D-D05B-4F7E-8C22-64352AD143BE}"/>
+                  </a:ext>
+                </a:extLst>
+              </p:cNvPr>
+              <p:cNvSpPr/>
+              <p:nvPr/>
+            </p:nvSpPr>
+            <p:spPr>
+              <a:xfrm>
+                <a:off x="9733758" y="3274801"/>
+                <a:ext cx="127850" cy="320630"/>
+              </a:xfrm>
+              <a:prstGeom prst="rect">
+                <a:avLst/>
+              </a:prstGeom>
+              <a:solidFill>
+                <a:srgbClr val="7030A0"/>
+              </a:solidFill>
+              <a:ln w="9525" cap="flat" cmpd="sng" algn="ctr">
+                <a:solidFill>
+                  <a:srgbClr val="7030A0"/>
+                </a:solidFill>
+                <a:prstDash val="solid"/>
+              </a:ln>
+              <a:effectLst/>
+            </p:spPr>
+            <p:txBody>
+              <a:bodyPr rtlCol="0" anchor="ctr"/>
+              <a:lstStyle/>
+              <a:p>
+                <a:pPr marL="0" marR="0" lvl="0" indent="0" algn="ctr" defTabSz="914400" eaLnBrk="1" fontAlgn="auto" latinLnBrk="0" hangingPunct="1">
+                  <a:lnSpc>
+                    <a:spcPct val="100000"/>
+                  </a:lnSpc>
+                  <a:spcBef>
+                    <a:spcPts val="0"/>
+                  </a:spcBef>
+                  <a:spcAft>
+                    <a:spcPts val="0"/>
+                  </a:spcAft>
+                  <a:buClrTx/>
+                  <a:buSzTx/>
+                  <a:buFontTx/>
+                  <a:buNone/>
+                  <a:tabLst/>
+                  <a:defRPr/>
+                </a:pPr>
+                <a:endParaRPr kumimoji="0" lang="en-SG" sz="1400" b="0" i="0" u="none" strike="noStrike" kern="0" cap="none" spc="0" normalizeH="0" baseline="0" noProof="0">
+                  <a:ln>
+                    <a:noFill/>
+                  </a:ln>
+                  <a:solidFill>
+                    <a:prstClr val="black"/>
+                  </a:solidFill>
+                  <a:effectLst/>
+                  <a:uLnTx/>
+                  <a:uFillTx/>
+                  <a:latin typeface="Calibri"/>
+                  <a:ea typeface="+mn-ea"/>
+                  <a:cs typeface="+mn-cs"/>
+                </a:endParaRPr>
+              </a:p>
+            </p:txBody>
+          </p:sp>
+          <p:cxnSp>
+            <p:nvCxnSpPr>
+              <p:cNvPr id="118" name="Straight Arrow Connector 117">
+                <a:extLst>
+                  <a:ext uri="{FF2B5EF4-FFF2-40B4-BE49-F238E27FC236}">
+                    <a16:creationId xmlns:a16="http://schemas.microsoft.com/office/drawing/2014/main" id="{B212CB4F-C742-4AF4-AC5C-C0146043F935}"/>
+                  </a:ext>
+                </a:extLst>
+              </p:cNvPr>
+              <p:cNvCxnSpPr>
+                <a:cxnSpLocks/>
+              </p:cNvCxnSpPr>
+              <p:nvPr/>
+            </p:nvCxnSpPr>
+            <p:spPr>
+              <a:xfrm>
+                <a:off x="8700920" y="3571706"/>
+                <a:ext cx="1015836" cy="485"/>
+              </a:xfrm>
+              <a:prstGeom prst="straightConnector1">
+                <a:avLst/>
+              </a:prstGeom>
+              <a:noFill/>
+              <a:ln w="19050" cap="flat" cmpd="sng" algn="ctr">
+                <a:solidFill>
+                  <a:srgbClr val="7030A0"/>
+                </a:solidFill>
+                <a:prstDash val="sysDash"/>
+                <a:headEnd type="arrow" w="med" len="med"/>
+                <a:tailEnd type="none" w="med" len="med"/>
+              </a:ln>
+              <a:effectLst/>
+            </p:spPr>
+          </p:cxnSp>
+        </p:grpSp>
       </p:grpSp>
-      <p:pic>
-        <p:nvPicPr>
-          <p:cNvPr id="3" name="Picture 2">
-            <a:extLst>
-              <a:ext uri="{FF2B5EF4-FFF2-40B4-BE49-F238E27FC236}">
-                <a16:creationId xmlns:a16="http://schemas.microsoft.com/office/drawing/2014/main" id="{3509008D-12D0-48DD-A1D4-BD419C8322F3}"/>
-              </a:ext>
-            </a:extLst>
-          </p:cNvPr>
-          <p:cNvPicPr>
-            <a:picLocks noChangeAspect="1"/>
-          </p:cNvPicPr>
-          <p:nvPr/>
-        </p:nvPicPr>
-        <p:blipFill>
-          <a:blip r:embed="rId3"/>
-          <a:stretch>
-            <a:fillRect/>
-          </a:stretch>
-        </p:blipFill>
-        <p:spPr>
-          <a:xfrm>
-            <a:off x="0" y="1787608"/>
-            <a:ext cx="9144000" cy="3282784"/>
-          </a:xfrm>
-          <a:prstGeom prst="rect">
-            <a:avLst/>
-          </a:prstGeom>
-        </p:spPr>
-      </p:pic>
     </p:spTree>
     <p:extLst>
       <p:ext uri="{BB962C8B-B14F-4D97-AF65-F5344CB8AC3E}">

</xml_diff>

<commit_message>
edited documentation and diagrams
</commit_message>
<xml_diff>
--- a/docs/diagrams/BudgetCommandSequenceDiagram.pptx
+++ b/docs/diagrams/BudgetCommandSequenceDiagram.pptx
@@ -208,7 +208,7 @@
           <a:p>
             <a:fld id="{C8E77166-2E47-4FB3-9736-67392969F435}" type="datetimeFigureOut">
               <a:rPr lang="en-SG" smtClean="0"/>
-              <a:t>11/11/2018</a:t>
+              <a:t>12/11/2018</a:t>
             </a:fld>
             <a:endParaRPr lang="en-SG"/>
           </a:p>
@@ -740,7 +740,7 @@
             <a:fld id="{1D8BD707-D9CF-40AE-B4C6-C98DA3205C09}" type="datetimeFigureOut">
               <a:rPr lang="en-US" smtClean="0"/>
               <a:pPr/>
-              <a:t>11/11/2018</a:t>
+              <a:t>11/12/2018</a:t>
             </a:fld>
             <a:endParaRPr lang="en-US"/>
           </a:p>
@@ -905,7 +905,7 @@
             <a:fld id="{1D8BD707-D9CF-40AE-B4C6-C98DA3205C09}" type="datetimeFigureOut">
               <a:rPr lang="en-US" smtClean="0"/>
               <a:pPr/>
-              <a:t>11/11/2018</a:t>
+              <a:t>11/12/2018</a:t>
             </a:fld>
             <a:endParaRPr lang="en-US"/>
           </a:p>
@@ -1080,7 +1080,7 @@
             <a:fld id="{1D8BD707-D9CF-40AE-B4C6-C98DA3205C09}" type="datetimeFigureOut">
               <a:rPr lang="en-US" smtClean="0"/>
               <a:pPr/>
-              <a:t>11/11/2018</a:t>
+              <a:t>11/12/2018</a:t>
             </a:fld>
             <a:endParaRPr lang="en-US"/>
           </a:p>
@@ -1245,7 +1245,7 @@
             <a:fld id="{1D8BD707-D9CF-40AE-B4C6-C98DA3205C09}" type="datetimeFigureOut">
               <a:rPr lang="en-US" smtClean="0"/>
               <a:pPr/>
-              <a:t>11/11/2018</a:t>
+              <a:t>11/12/2018</a:t>
             </a:fld>
             <a:endParaRPr lang="en-US"/>
           </a:p>
@@ -1487,7 +1487,7 @@
             <a:fld id="{1D8BD707-D9CF-40AE-B4C6-C98DA3205C09}" type="datetimeFigureOut">
               <a:rPr lang="en-US" smtClean="0"/>
               <a:pPr/>
-              <a:t>11/11/2018</a:t>
+              <a:t>11/12/2018</a:t>
             </a:fld>
             <a:endParaRPr lang="en-US"/>
           </a:p>
@@ -1769,7 +1769,7 @@
             <a:fld id="{1D8BD707-D9CF-40AE-B4C6-C98DA3205C09}" type="datetimeFigureOut">
               <a:rPr lang="en-US" smtClean="0"/>
               <a:pPr/>
-              <a:t>11/11/2018</a:t>
+              <a:t>11/12/2018</a:t>
             </a:fld>
             <a:endParaRPr lang="en-US"/>
           </a:p>
@@ -2185,7 +2185,7 @@
             <a:fld id="{1D8BD707-D9CF-40AE-B4C6-C98DA3205C09}" type="datetimeFigureOut">
               <a:rPr lang="en-US" smtClean="0"/>
               <a:pPr/>
-              <a:t>11/11/2018</a:t>
+              <a:t>11/12/2018</a:t>
             </a:fld>
             <a:endParaRPr lang="en-US"/>
           </a:p>
@@ -2299,7 +2299,7 @@
             <a:fld id="{1D8BD707-D9CF-40AE-B4C6-C98DA3205C09}" type="datetimeFigureOut">
               <a:rPr lang="en-US" smtClean="0"/>
               <a:pPr/>
-              <a:t>11/11/2018</a:t>
+              <a:t>11/12/2018</a:t>
             </a:fld>
             <a:endParaRPr lang="en-US"/>
           </a:p>
@@ -2391,7 +2391,7 @@
             <a:fld id="{1D8BD707-D9CF-40AE-B4C6-C98DA3205C09}" type="datetimeFigureOut">
               <a:rPr lang="en-US" smtClean="0"/>
               <a:pPr/>
-              <a:t>11/11/2018</a:t>
+              <a:t>11/12/2018</a:t>
             </a:fld>
             <a:endParaRPr lang="en-US"/>
           </a:p>
@@ -2663,7 +2663,7 @@
             <a:fld id="{1D8BD707-D9CF-40AE-B4C6-C98DA3205C09}" type="datetimeFigureOut">
               <a:rPr lang="en-US" smtClean="0"/>
               <a:pPr/>
-              <a:t>11/11/2018</a:t>
+              <a:t>11/12/2018</a:t>
             </a:fld>
             <a:endParaRPr lang="en-US"/>
           </a:p>
@@ -2912,7 +2912,7 @@
             <a:fld id="{1D8BD707-D9CF-40AE-B4C6-C98DA3205C09}" type="datetimeFigureOut">
               <a:rPr lang="en-US" smtClean="0"/>
               <a:pPr/>
-              <a:t>11/11/2018</a:t>
+              <a:t>11/12/2018</a:t>
             </a:fld>
             <a:endParaRPr lang="en-US"/>
           </a:p>
@@ -3120,7 +3120,7 @@
             <a:fld id="{1D8BD707-D9CF-40AE-B4C6-C98DA3205C09}" type="datetimeFigureOut">
               <a:rPr lang="en-US" smtClean="0"/>
               <a:pPr/>
-              <a:t>11/11/2018</a:t>
+              <a:t>11/12/2018</a:t>
             </a:fld>
             <a:endParaRPr lang="en-US"/>
           </a:p>
@@ -3505,10 +3505,10 @@
         </p:nvGrpSpPr>
         <p:grpSpPr>
           <a:xfrm>
-            <a:off x="-1981198" y="133368"/>
-            <a:ext cx="12882916" cy="4400926"/>
-            <a:chOff x="-1981198" y="133368"/>
-            <a:chExt cx="12882916" cy="4400926"/>
+            <a:off x="-1981198" y="0"/>
+            <a:ext cx="13106398" cy="4534294"/>
+            <a:chOff x="-1981198" y="0"/>
+            <a:chExt cx="13106398" cy="4534294"/>
           </a:xfrm>
         </p:grpSpPr>
         <p:sp>
@@ -3525,8 +3525,8 @@
           </p:nvSpPr>
           <p:spPr>
             <a:xfrm>
-              <a:off x="6456305" y="133368"/>
-              <a:ext cx="3903825" cy="4400926"/>
+              <a:off x="6456305" y="0"/>
+              <a:ext cx="4668895" cy="4534294"/>
             </a:xfrm>
             <a:prstGeom prst="roundRect">
               <a:avLst>
@@ -3614,8 +3614,8 @@
           </p:nvSpPr>
           <p:spPr>
             <a:xfrm>
-              <a:off x="302012" y="147658"/>
-              <a:ext cx="5863964" cy="4343400"/>
+              <a:off x="-533401" y="0"/>
+              <a:ext cx="6841691" cy="4534294"/>
             </a:xfrm>
             <a:prstGeom prst="roundRect">
               <a:avLst>

</xml_diff>